<commit_message>
Added references to Presentation
</commit_message>
<xml_diff>
--- a/scripts/CAP512.pptx
+++ b/scripts/CAP512.pptx
@@ -127,6 +127,65 @@
     </p:ext>
   </p:extLst>
 </p:presentation>
+</file>
+
+<file path=ppt/changesInfos/changesInfo1.xml><?xml version="1.0" encoding="utf-8"?>
+<pc:chgInfo xmlns:a="http://schemas.openxmlformats.org/drawingml/2006/main" xmlns:r="http://schemas.openxmlformats.org/officeDocument/2006/relationships" xmlns:ac="http://schemas.microsoft.com/office/drawing/2013/main/command" xmlns:pc="http://schemas.microsoft.com/office/powerpoint/2013/main/command">
+  <pc:docChgLst>
+    <pc:chgData name="Christopher Acornley" userId="bbc264c4-ceb7-4165-9c6e-ab9636a383ef" providerId="ADAL" clId="{8E6D76F1-D7AE-4917-A651-8C73AC01DF94}"/>
+    <pc:docChg chg="custSel modSld">
+      <pc:chgData name="Christopher Acornley" userId="bbc264c4-ceb7-4165-9c6e-ab9636a383ef" providerId="ADAL" clId="{8E6D76F1-D7AE-4917-A651-8C73AC01DF94}" dt="2023-06-08T09:02:22.989" v="69"/>
+      <pc:docMkLst>
+        <pc:docMk/>
+      </pc:docMkLst>
+      <pc:sldChg chg="modSp mod">
+        <pc:chgData name="Christopher Acornley" userId="bbc264c4-ceb7-4165-9c6e-ab9636a383ef" providerId="ADAL" clId="{8E6D76F1-D7AE-4917-A651-8C73AC01DF94}" dt="2023-06-08T08:57:33.991" v="11" actId="20577"/>
+        <pc:sldMkLst>
+          <pc:docMk/>
+          <pc:sldMk cId="1487700712" sldId="256"/>
+        </pc:sldMkLst>
+        <pc:spChg chg="mod">
+          <ac:chgData name="Christopher Acornley" userId="bbc264c4-ceb7-4165-9c6e-ab9636a383ef" providerId="ADAL" clId="{8E6D76F1-D7AE-4917-A651-8C73AC01DF94}" dt="2023-06-08T08:57:33.991" v="11" actId="20577"/>
+          <ac:spMkLst>
+            <pc:docMk/>
+            <pc:sldMk cId="1487700712" sldId="256"/>
+            <ac:spMk id="2" creationId="{C02C5318-1A1E-49D0-B2E2-A4B0FA9E8A40}"/>
+          </ac:spMkLst>
+        </pc:spChg>
+      </pc:sldChg>
+      <pc:sldChg chg="modSp mod">
+        <pc:chgData name="Christopher Acornley" userId="bbc264c4-ceb7-4165-9c6e-ab9636a383ef" providerId="ADAL" clId="{8E6D76F1-D7AE-4917-A651-8C73AC01DF94}" dt="2023-06-08T08:57:43.398" v="36" actId="20577"/>
+        <pc:sldMkLst>
+          <pc:docMk/>
+          <pc:sldMk cId="3260005894" sldId="262"/>
+        </pc:sldMkLst>
+        <pc:spChg chg="mod">
+          <ac:chgData name="Christopher Acornley" userId="bbc264c4-ceb7-4165-9c6e-ab9636a383ef" providerId="ADAL" clId="{8E6D76F1-D7AE-4917-A651-8C73AC01DF94}" dt="2023-06-08T08:57:43.398" v="36" actId="20577"/>
+          <ac:spMkLst>
+            <pc:docMk/>
+            <pc:sldMk cId="3260005894" sldId="262"/>
+            <ac:spMk id="3" creationId="{DAE9E2D5-3E7C-12B5-F2B4-4D153305E279}"/>
+          </ac:spMkLst>
+        </pc:spChg>
+      </pc:sldChg>
+      <pc:sldChg chg="modSp mod">
+        <pc:chgData name="Christopher Acornley" userId="bbc264c4-ceb7-4165-9c6e-ab9636a383ef" providerId="ADAL" clId="{8E6D76F1-D7AE-4917-A651-8C73AC01DF94}" dt="2023-06-08T09:02:22.989" v="69"/>
+        <pc:sldMkLst>
+          <pc:docMk/>
+          <pc:sldMk cId="215993404" sldId="264"/>
+        </pc:sldMkLst>
+        <pc:spChg chg="mod">
+          <ac:chgData name="Christopher Acornley" userId="bbc264c4-ceb7-4165-9c6e-ab9636a383ef" providerId="ADAL" clId="{8E6D76F1-D7AE-4917-A651-8C73AC01DF94}" dt="2023-06-08T09:02:22.989" v="69"/>
+          <ac:spMkLst>
+            <pc:docMk/>
+            <pc:sldMk cId="215993404" sldId="264"/>
+            <ac:spMk id="3" creationId="{DAE9E2D5-3E7C-12B5-F2B4-4D153305E279}"/>
+          </ac:spMkLst>
+        </pc:spChg>
+      </pc:sldChg>
+    </pc:docChg>
+  </pc:docChgLst>
+</pc:chgInfo>
 </file>
 
 <file path=ppt/diagrams/colors1.xml><?xml version="1.0" encoding="utf-8"?>
@@ -6627,7 +6686,7 @@
           <a:p>
             <a:fld id="{AF869721-F543-4A6C-BF9D-65D7CC540427}" type="datetimeFigureOut">
               <a:rPr lang="en-US" smtClean="0"/>
-              <a:t>6/7/2023</a:t>
+              <a:t>6/8/2023</a:t>
             </a:fld>
             <a:endParaRPr lang="en-US" dirty="0"/>
           </a:p>
@@ -6804,7 +6863,7 @@
           <a:p>
             <a:fld id="{C732326A-4C88-4AFB-AA5B-5919D81DFF5B}" type="datetimeFigureOut">
               <a:rPr lang="en-US" smtClean="0"/>
-              <a:t>6/7/2023</a:t>
+              <a:t>6/8/2023</a:t>
             </a:fld>
             <a:endParaRPr lang="en-US" dirty="0"/>
           </a:p>
@@ -7653,7 +7712,7 @@
             <a:fld id="{B61BEF0D-F0BB-DE4B-95CE-6DB70DBA9567}" type="datetimeFigureOut">
               <a:rPr lang="en-US" smtClean="0"/>
               <a:pPr/>
-              <a:t>6/7/2023</a:t>
+              <a:t>6/8/2023</a:t>
             </a:fld>
             <a:endParaRPr lang="en-US" dirty="0"/>
           </a:p>
@@ -7917,7 +7976,7 @@
             <a:fld id="{B61BEF0D-F0BB-DE4B-95CE-6DB70DBA9567}" type="datetimeFigureOut">
               <a:rPr lang="en-US" smtClean="0"/>
               <a:pPr/>
-              <a:t>6/7/2023</a:t>
+              <a:t>6/8/2023</a:t>
             </a:fld>
             <a:endParaRPr lang="en-US" dirty="0"/>
           </a:p>
@@ -8154,7 +8213,7 @@
             <a:fld id="{B61BEF0D-F0BB-DE4B-95CE-6DB70DBA9567}" type="datetimeFigureOut">
               <a:rPr lang="en-US" smtClean="0"/>
               <a:pPr/>
-              <a:t>6/7/2023</a:t>
+              <a:t>6/8/2023</a:t>
             </a:fld>
             <a:endParaRPr lang="en-US" dirty="0"/>
           </a:p>
@@ -8396,7 +8455,7 @@
             <a:fld id="{B61BEF0D-F0BB-DE4B-95CE-6DB70DBA9567}" type="datetimeFigureOut">
               <a:rPr lang="en-US" smtClean="0"/>
               <a:pPr/>
-              <a:t>6/7/2023</a:t>
+              <a:t>6/8/2023</a:t>
             </a:fld>
             <a:endParaRPr lang="en-US" dirty="0"/>
           </a:p>
@@ -8705,7 +8764,7 @@
             <a:fld id="{B61BEF0D-F0BB-DE4B-95CE-6DB70DBA9567}" type="datetimeFigureOut">
               <a:rPr lang="en-US" smtClean="0"/>
               <a:pPr/>
-              <a:t>6/7/2023</a:t>
+              <a:t>6/8/2023</a:t>
             </a:fld>
             <a:endParaRPr lang="en-US" dirty="0"/>
           </a:p>
@@ -9009,7 +9068,7 @@
             <a:fld id="{B61BEF0D-F0BB-DE4B-95CE-6DB70DBA9567}" type="datetimeFigureOut">
               <a:rPr lang="en-US" smtClean="0"/>
               <a:pPr/>
-              <a:t>6/7/2023</a:t>
+              <a:t>6/8/2023</a:t>
             </a:fld>
             <a:endParaRPr lang="en-US" dirty="0"/>
           </a:p>
@@ -9433,7 +9492,7 @@
             <a:fld id="{B61BEF0D-F0BB-DE4B-95CE-6DB70DBA9567}" type="datetimeFigureOut">
               <a:rPr lang="en-US" smtClean="0"/>
               <a:pPr/>
-              <a:t>6/7/2023</a:t>
+              <a:t>6/8/2023</a:t>
             </a:fld>
             <a:endParaRPr lang="en-US" dirty="0"/>
           </a:p>
@@ -9530,7 +9589,7 @@
             <a:fld id="{B61BEF0D-F0BB-DE4B-95CE-6DB70DBA9567}" type="datetimeFigureOut">
               <a:rPr lang="en-US" smtClean="0"/>
               <a:pPr/>
-              <a:t>6/7/2023</a:t>
+              <a:t>6/8/2023</a:t>
             </a:fld>
             <a:endParaRPr lang="en-US" dirty="0"/>
           </a:p>
@@ -9694,7 +9753,7 @@
             <a:fld id="{B61BEF0D-F0BB-DE4B-95CE-6DB70DBA9567}" type="datetimeFigureOut">
               <a:rPr lang="en-US" smtClean="0"/>
               <a:pPr/>
-              <a:t>6/7/2023</a:t>
+              <a:t>6/8/2023</a:t>
             </a:fld>
             <a:endParaRPr lang="en-US" dirty="0"/>
           </a:p>
@@ -10074,7 +10133,7 @@
             <a:fld id="{B61BEF0D-F0BB-DE4B-95CE-6DB70DBA9567}" type="datetimeFigureOut">
               <a:rPr lang="en-US" smtClean="0"/>
               <a:pPr/>
-              <a:t>6/7/2023</a:t>
+              <a:t>6/8/2023</a:t>
             </a:fld>
             <a:endParaRPr lang="en-US" dirty="0"/>
           </a:p>
@@ -10365,7 +10424,7 @@
             <a:fld id="{B61BEF0D-F0BB-DE4B-95CE-6DB70DBA9567}" type="datetimeFigureOut">
               <a:rPr lang="en-US" smtClean="0"/>
               <a:pPr/>
-              <a:t>6/7/2023</a:t>
+              <a:t>6/8/2023</a:t>
             </a:fld>
             <a:endParaRPr lang="en-US" dirty="0"/>
           </a:p>
@@ -10578,7 +10637,7 @@
             <a:fld id="{B61BEF0D-F0BB-DE4B-95CE-6DB70DBA9567}" type="datetimeFigureOut">
               <a:rPr lang="en-US" smtClean="0"/>
               <a:pPr/>
-              <a:t>6/7/2023</a:t>
+              <a:t>6/8/2023</a:t>
             </a:fld>
             <a:endParaRPr lang="en-US" dirty="0"/>
           </a:p>
@@ -11561,7 +11620,7 @@
                   <a:schemeClr val="bg1"/>
                 </a:solidFill>
               </a:rPr>
-              <a:t>Student Attendance and performance correlation study</a:t>
+              <a:t>Student Attendance and performance RELATIONSHIP study</a:t>
             </a:r>
           </a:p>
         </p:txBody>
@@ -11687,7 +11746,7 @@
           <a:p>
             <a:r>
               <a:rPr lang="en-US" dirty="0"/>
-              <a:t>Investigate if there is a positive correlation between student attendance to live lectures and their grade.</a:t>
+              <a:t>Investigate if there is a relationship between student attendance to live lectures and their grade.</a:t>
             </a:r>
           </a:p>
           <a:p>
@@ -11801,13 +11860,332 @@
         </p:nvSpPr>
         <p:spPr/>
         <p:txBody>
-          <a:bodyPr/>
+          <a:bodyPr>
+            <a:normAutofit fontScale="62500" lnSpcReduction="20000"/>
+          </a:bodyPr>
           <a:lstStyle/>
           <a:p>
             <a:r>
               <a:rPr lang="en-US" dirty="0"/>
               <a:t>Attendance vs Grades</a:t>
             </a:r>
+          </a:p>
+          <a:p>
+            <a:pPr marL="0" indent="0">
+              <a:buNone/>
+            </a:pPr>
+            <a:endParaRPr lang="en-US" dirty="0"/>
+          </a:p>
+          <a:p>
+            <a:pPr marL="0" indent="0">
+              <a:buNone/>
+            </a:pPr>
+            <a:r>
+              <a:rPr lang="en-GB" dirty="0">
+                <a:hlinkClick r:id="rId2"/>
+              </a:rPr>
+              <a:t>Class Attendance in College (sagepub.com)</a:t>
+            </a:r>
+            <a:r>
+              <a:rPr lang="en-GB" dirty="0"/>
+              <a:t> </a:t>
+            </a:r>
+          </a:p>
+          <a:p>
+            <a:pPr marL="0" indent="0">
+              <a:buNone/>
+            </a:pPr>
+            <a:r>
+              <a:rPr lang="en-GB" b="0" i="0" dirty="0" err="1">
+                <a:solidFill>
+                  <a:srgbClr val="222222"/>
+                </a:solidFill>
+                <a:effectLst/>
+                <a:latin typeface="Arial" panose="020B0604020202020204" pitchFamily="34" charset="0"/>
+              </a:rPr>
+              <a:t>Credé</a:t>
+            </a:r>
+            <a:r>
+              <a:rPr lang="en-GB" b="0" i="0" dirty="0">
+                <a:solidFill>
+                  <a:srgbClr val="222222"/>
+                </a:solidFill>
+                <a:effectLst/>
+                <a:latin typeface="Arial" panose="020B0604020202020204" pitchFamily="34" charset="0"/>
+              </a:rPr>
+              <a:t>, M., </a:t>
+            </a:r>
+            <a:r>
+              <a:rPr lang="en-GB" b="0" i="0" dirty="0" err="1">
+                <a:solidFill>
+                  <a:srgbClr val="222222"/>
+                </a:solidFill>
+                <a:effectLst/>
+                <a:latin typeface="Arial" panose="020B0604020202020204" pitchFamily="34" charset="0"/>
+              </a:rPr>
+              <a:t>Roch</a:t>
+            </a:r>
+            <a:r>
+              <a:rPr lang="en-GB" b="0" i="0" dirty="0">
+                <a:solidFill>
+                  <a:srgbClr val="222222"/>
+                </a:solidFill>
+                <a:effectLst/>
+                <a:latin typeface="Arial" panose="020B0604020202020204" pitchFamily="34" charset="0"/>
+              </a:rPr>
+              <a:t>, S.G. and </a:t>
+            </a:r>
+            <a:r>
+              <a:rPr lang="en-GB" b="0" i="0" dirty="0" err="1">
+                <a:solidFill>
+                  <a:srgbClr val="222222"/>
+                </a:solidFill>
+                <a:effectLst/>
+                <a:latin typeface="Arial" panose="020B0604020202020204" pitchFamily="34" charset="0"/>
+              </a:rPr>
+              <a:t>Kieszczynka</a:t>
+            </a:r>
+            <a:r>
+              <a:rPr lang="en-GB" b="0" i="0" dirty="0">
+                <a:solidFill>
+                  <a:srgbClr val="222222"/>
+                </a:solidFill>
+                <a:effectLst/>
+                <a:latin typeface="Arial" panose="020B0604020202020204" pitchFamily="34" charset="0"/>
+              </a:rPr>
+              <a:t>, U.M., 2010. Class attendance in college: A meta-analytic review of the relationship of class attendance with grades and student characteristics. </a:t>
+            </a:r>
+            <a:r>
+              <a:rPr lang="en-GB" b="0" i="1" dirty="0">
+                <a:solidFill>
+                  <a:srgbClr val="222222"/>
+                </a:solidFill>
+                <a:effectLst/>
+                <a:latin typeface="Arial" panose="020B0604020202020204" pitchFamily="34" charset="0"/>
+              </a:rPr>
+              <a:t>Review of Educational Research</a:t>
+            </a:r>
+            <a:r>
+              <a:rPr lang="en-GB" b="0" i="0" dirty="0">
+                <a:solidFill>
+                  <a:srgbClr val="222222"/>
+                </a:solidFill>
+                <a:effectLst/>
+                <a:latin typeface="Arial" panose="020B0604020202020204" pitchFamily="34" charset="0"/>
+              </a:rPr>
+              <a:t>, </a:t>
+            </a:r>
+            <a:r>
+              <a:rPr lang="en-GB" b="0" i="1" dirty="0">
+                <a:solidFill>
+                  <a:srgbClr val="222222"/>
+                </a:solidFill>
+                <a:effectLst/>
+                <a:latin typeface="Arial" panose="020B0604020202020204" pitchFamily="34" charset="0"/>
+              </a:rPr>
+              <a:t>80</a:t>
+            </a:r>
+            <a:r>
+              <a:rPr lang="en-GB" b="0" i="0" dirty="0">
+                <a:solidFill>
+                  <a:srgbClr val="222222"/>
+                </a:solidFill>
+                <a:effectLst/>
+                <a:latin typeface="Arial" panose="020B0604020202020204" pitchFamily="34" charset="0"/>
+              </a:rPr>
+              <a:t>(2), pp.272-295.</a:t>
+            </a:r>
+          </a:p>
+          <a:p>
+            <a:pPr marL="0" indent="0">
+              <a:buNone/>
+            </a:pPr>
+            <a:endParaRPr lang="en-US" dirty="0"/>
+          </a:p>
+          <a:p>
+            <a:pPr marL="0" indent="0">
+              <a:buNone/>
+            </a:pPr>
+            <a:r>
+              <a:rPr lang="en-GB" dirty="0">
+                <a:hlinkClick r:id="rId3"/>
+              </a:rPr>
+              <a:t>A correlation between attendance and grades in a first-year psychology class. (apa.org)</a:t>
+            </a:r>
+            <a:endParaRPr lang="en-US" dirty="0"/>
+          </a:p>
+          <a:p>
+            <a:pPr marL="0" indent="0">
+              <a:buNone/>
+            </a:pPr>
+            <a:r>
+              <a:rPr lang="en-GB" b="0" i="0" dirty="0">
+                <a:solidFill>
+                  <a:srgbClr val="333333"/>
+                </a:solidFill>
+                <a:effectLst/>
+                <a:latin typeface="Arial" panose="020B0604020202020204" pitchFamily="34" charset="0"/>
+              </a:rPr>
+              <a:t>Gunn, K. P. (1993). A correlation between attendance and grades in a first-year psychology class. </a:t>
+            </a:r>
+            <a:r>
+              <a:rPr lang="en-GB" b="0" i="1" dirty="0">
+                <a:solidFill>
+                  <a:srgbClr val="333333"/>
+                </a:solidFill>
+                <a:effectLst/>
+                <a:latin typeface="Arial" panose="020B0604020202020204" pitchFamily="34" charset="0"/>
+              </a:rPr>
+              <a:t>Canadian Psychology / </a:t>
+            </a:r>
+            <a:r>
+              <a:rPr lang="en-GB" b="0" i="1" dirty="0" err="1">
+                <a:solidFill>
+                  <a:srgbClr val="333333"/>
+                </a:solidFill>
+                <a:effectLst/>
+                <a:latin typeface="Arial" panose="020B0604020202020204" pitchFamily="34" charset="0"/>
+              </a:rPr>
+              <a:t>Psychologie</a:t>
+            </a:r>
+            <a:r>
+              <a:rPr lang="en-GB" b="0" i="1" dirty="0">
+                <a:solidFill>
+                  <a:srgbClr val="333333"/>
+                </a:solidFill>
+                <a:effectLst/>
+                <a:latin typeface="Arial" panose="020B0604020202020204" pitchFamily="34" charset="0"/>
+              </a:rPr>
+              <a:t> </a:t>
+            </a:r>
+            <a:r>
+              <a:rPr lang="en-GB" b="0" i="1" dirty="0" err="1">
+                <a:solidFill>
+                  <a:srgbClr val="333333"/>
+                </a:solidFill>
+                <a:effectLst/>
+                <a:latin typeface="Arial" panose="020B0604020202020204" pitchFamily="34" charset="0"/>
+              </a:rPr>
+              <a:t>canadienne</a:t>
+            </a:r>
+            <a:r>
+              <a:rPr lang="en-GB" b="0" i="1" dirty="0">
+                <a:solidFill>
+                  <a:srgbClr val="333333"/>
+                </a:solidFill>
+                <a:effectLst/>
+                <a:latin typeface="Arial" panose="020B0604020202020204" pitchFamily="34" charset="0"/>
+              </a:rPr>
+              <a:t>, 34</a:t>
+            </a:r>
+            <a:r>
+              <a:rPr lang="en-GB" b="0" i="0" dirty="0">
+                <a:solidFill>
+                  <a:srgbClr val="333333"/>
+                </a:solidFill>
+                <a:effectLst/>
+                <a:latin typeface="Arial" panose="020B0604020202020204" pitchFamily="34" charset="0"/>
+              </a:rPr>
+              <a:t>(2), 201–202. </a:t>
+            </a:r>
+            <a:r>
+              <a:rPr lang="en-GB" b="0" i="0" u="none" strike="noStrike" dirty="0">
+                <a:solidFill>
+                  <a:srgbClr val="2C72B7"/>
+                </a:solidFill>
+                <a:effectLst/>
+                <a:latin typeface="Arial" panose="020B0604020202020204" pitchFamily="34" charset="0"/>
+                <a:hlinkClick r:id="rId4"/>
+              </a:rPr>
+              <a:t>https://doi.org/10.1037/h0078770</a:t>
+            </a:r>
+            <a:endParaRPr lang="en-GB" b="0" i="0" u="none" strike="noStrike" dirty="0">
+              <a:solidFill>
+                <a:srgbClr val="2C72B7"/>
+              </a:solidFill>
+              <a:effectLst/>
+              <a:latin typeface="Arial" panose="020B0604020202020204" pitchFamily="34" charset="0"/>
+            </a:endParaRPr>
+          </a:p>
+          <a:p>
+            <a:pPr marL="0" indent="0">
+              <a:buNone/>
+            </a:pPr>
+            <a:endParaRPr lang="en-US" dirty="0"/>
+          </a:p>
+          <a:p>
+            <a:pPr marL="0" indent="0">
+              <a:buNone/>
+            </a:pPr>
+            <a:r>
+              <a:rPr lang="en-GB" dirty="0">
+                <a:hlinkClick r:id="rId5"/>
+              </a:rPr>
+              <a:t>Attendance and performance – ProQuest</a:t>
+            </a:r>
+            <a:endParaRPr lang="en-GB" dirty="0"/>
+          </a:p>
+          <a:p>
+            <a:pPr marL="0" indent="0">
+              <a:buNone/>
+            </a:pPr>
+            <a:r>
+              <a:rPr lang="en-GB" b="0" i="0" dirty="0">
+                <a:solidFill>
+                  <a:srgbClr val="555555"/>
+                </a:solidFill>
+                <a:effectLst/>
+                <a:latin typeface="verdana" panose="020B0604030504040204" pitchFamily="34" charset="0"/>
+              </a:rPr>
+              <a:t>MOORE, R., 2003. Attendance and performance. </a:t>
+            </a:r>
+            <a:r>
+              <a:rPr lang="en-GB" b="0" i="1" dirty="0">
+                <a:solidFill>
+                  <a:srgbClr val="555555"/>
+                </a:solidFill>
+                <a:effectLst/>
+                <a:latin typeface="verdana" panose="020B0604030504040204" pitchFamily="34" charset="0"/>
+              </a:rPr>
+              <a:t>Journal of College Science Teaching, </a:t>
+            </a:r>
+            <a:r>
+              <a:rPr lang="en-GB" b="1" i="0" dirty="0">
+                <a:solidFill>
+                  <a:srgbClr val="555555"/>
+                </a:solidFill>
+                <a:effectLst/>
+                <a:latin typeface="verdana" panose="020B0604030504040204" pitchFamily="34" charset="0"/>
+              </a:rPr>
+              <a:t>32</a:t>
+            </a:r>
+            <a:r>
+              <a:rPr lang="en-GB" b="0" i="0" dirty="0">
+                <a:solidFill>
+                  <a:srgbClr val="555555"/>
+                </a:solidFill>
+                <a:effectLst/>
+                <a:latin typeface="verdana" panose="020B0604030504040204" pitchFamily="34" charset="0"/>
+              </a:rPr>
+              <a:t>(6), pp. </a:t>
+            </a:r>
+            <a:r>
+              <a:rPr lang="en-GB" b="0" i="0">
+                <a:solidFill>
+                  <a:srgbClr val="555555"/>
+                </a:solidFill>
+                <a:effectLst/>
+                <a:latin typeface="verdana" panose="020B0604030504040204" pitchFamily="34" charset="0"/>
+              </a:rPr>
+              <a:t>367-371.</a:t>
+            </a:r>
+            <a:endParaRPr lang="en-US" dirty="0"/>
+          </a:p>
+          <a:p>
+            <a:pPr marL="0" indent="0">
+              <a:buNone/>
+            </a:pPr>
+            <a:endParaRPr lang="en-US" dirty="0"/>
           </a:p>
           <a:p>
             <a:r>

</xml_diff>

<commit_message>
Basic analysis of grade and attendance data
</commit_message>
<xml_diff>
--- a/scripts/CAP512.pptx
+++ b/scripts/CAP512.pptx
@@ -5,10 +5,10 @@
     <p:sldMasterId id="2147483672" r:id="rId1"/>
   </p:sldMasterIdLst>
   <p:notesMasterIdLst>
-    <p:notesMasterId r:id="rId13"/>
+    <p:notesMasterId r:id="rId22"/>
   </p:notesMasterIdLst>
   <p:handoutMasterIdLst>
-    <p:handoutMasterId r:id="rId14"/>
+    <p:handoutMasterId r:id="rId23"/>
   </p:handoutMasterIdLst>
   <p:sldIdLst>
     <p:sldId id="256" r:id="rId2"/>
@@ -19,9 +19,18 @@
     <p:sldId id="265" r:id="rId7"/>
     <p:sldId id="266" r:id="rId8"/>
     <p:sldId id="261" r:id="rId9"/>
-    <p:sldId id="258" r:id="rId10"/>
-    <p:sldId id="259" r:id="rId11"/>
-    <p:sldId id="260" r:id="rId12"/>
+    <p:sldId id="269" r:id="rId10"/>
+    <p:sldId id="258" r:id="rId11"/>
+    <p:sldId id="271" r:id="rId12"/>
+    <p:sldId id="272" r:id="rId13"/>
+    <p:sldId id="273" r:id="rId14"/>
+    <p:sldId id="275" r:id="rId15"/>
+    <p:sldId id="276" r:id="rId16"/>
+    <p:sldId id="277" r:id="rId17"/>
+    <p:sldId id="278" r:id="rId18"/>
+    <p:sldId id="259" r:id="rId19"/>
+    <p:sldId id="270" r:id="rId20"/>
+    <p:sldId id="260" r:id="rId21"/>
   </p:sldIdLst>
   <p:sldSz cx="12192000" cy="6858000"/>
   <p:notesSz cx="6858000" cy="9144000"/>
@@ -1761,9 +1770,14 @@
         <a:bodyPr/>
         <a:lstStyle/>
         <a:p>
+          <a:pPr>
+            <a:lnSpc>
+              <a:spcPct val="100000"/>
+            </a:lnSpc>
+          </a:pPr>
           <a:r>
             <a:rPr lang="en-ZA" dirty="0"/>
-            <a:t>Network</a:t>
+            <a:t>Correlation</a:t>
           </a:r>
           <a:endParaRPr lang="en-US" dirty="0"/>
         </a:p>
@@ -1798,9 +1812,14 @@
         <a:bodyPr/>
         <a:lstStyle/>
         <a:p>
+          <a:pPr>
+            <a:lnSpc>
+              <a:spcPct val="100000"/>
+            </a:lnSpc>
+          </a:pPr>
           <a:r>
             <a:rPr lang="en-US" dirty="0"/>
-            <a:t>Satellite</a:t>
+            <a:t>Covariance</a:t>
           </a:r>
         </a:p>
       </dgm:t>
@@ -1834,9 +1853,14 @@
         <a:bodyPr/>
         <a:lstStyle/>
         <a:p>
+          <a:pPr>
+            <a:lnSpc>
+              <a:spcPct val="100000"/>
+            </a:lnSpc>
+          </a:pPr>
           <a:r>
             <a:rPr lang="en-US" dirty="0"/>
-            <a:t>Link</a:t>
+            <a:t>Linear Regression</a:t>
           </a:r>
         </a:p>
       </dgm:t>
@@ -1892,9 +1916,6 @@
             <a:fillRect/>
           </a:stretch>
         </a:blipFill>
-        <a:ln>
-          <a:noFill/>
-        </a:ln>
       </dgm:spPr>
       <dgm:extLst>
         <a:ext uri="{E40237B7-FDA0-4F09-8148-C483321AD2D9}">
@@ -1941,9 +1962,6 @@
             <a:fillRect/>
           </a:stretch>
         </a:blipFill>
-        <a:ln>
-          <a:noFill/>
-        </a:ln>
       </dgm:spPr>
       <dgm:extLst>
         <a:ext uri="{E40237B7-FDA0-4F09-8148-C483321AD2D9}">
@@ -1978,9 +1996,6 @@
         <a:blipFill>
           <a:blip xmlns:r="http://schemas.openxmlformats.org/officeDocument/2006/relationships" r:embed="rId5">
             <a:extLst>
-              <a:ext uri="{28A0092B-C50C-407E-A947-70E740481C1C}">
-                <a14:useLocalDpi xmlns:a14="http://schemas.microsoft.com/office/drawing/2010/main" val="0"/>
-              </a:ext>
               <a:ext uri="{96DAC541-7B7A-43D3-8B79-37D633B846F1}">
                 <asvg:svgBlip xmlns:asvg="http://schemas.microsoft.com/office/drawing/2016/SVG/main" r:embed="rId6"/>
               </a:ext>
@@ -1991,13 +2006,10 @@
             <a:fillRect/>
           </a:stretch>
         </a:blipFill>
-        <a:ln>
-          <a:noFill/>
-        </a:ln>
       </dgm:spPr>
       <dgm:extLst>
         <a:ext uri="{E40237B7-FDA0-4F09-8148-C483321AD2D9}">
-          <dgm14:cNvPr xmlns:dgm14="http://schemas.microsoft.com/office/drawing/2010/diagram" id="0" name="" descr="Link"/>
+          <dgm14:cNvPr xmlns:dgm14="http://schemas.microsoft.com/office/drawing/2010/diagram" id="0" name="" descr="Upward trend with solid fill"/>
         </a:ext>
       </dgm:extLst>
     </dgm:pt>
@@ -2188,7 +2200,7 @@
         </a:p>
       </dgm:t>
     </dgm:pt>
-    <dgm:pt modelId="{57806726-6E60-4ACC-9C1C-7DF9CC365A10}" type="pres">
+    <dgm:pt modelId="{D1AD7F36-BF92-483F-A496-EC6417DE0EE1}" type="pres">
       <dgm:prSet presAssocID="{7E5AA53B-3EEE-4DE4-BB81-9044890C2946}" presName="Name0" presStyleCnt="0">
         <dgm:presLayoutVars>
           <dgm:chMax val="7"/>
@@ -2198,31 +2210,31 @@
       </dgm:prSet>
       <dgm:spPr/>
     </dgm:pt>
-    <dgm:pt modelId="{90561C55-3C6E-4D53-85E1-2C50BCDDA392}" type="pres">
+    <dgm:pt modelId="{D6F06811-6D69-4FB4-A00C-6FE236C5C33A}" type="pres">
       <dgm:prSet presAssocID="{7E5AA53B-3EEE-4DE4-BB81-9044890C2946}" presName="Name1" presStyleCnt="0"/>
       <dgm:spPr/>
     </dgm:pt>
-    <dgm:pt modelId="{B6CD42EC-5AD4-4004-AE5B-47EDA668DAA8}" type="pres">
+    <dgm:pt modelId="{FEEC7568-C8EA-4BF6-9C7E-E8C3A723DCE9}" type="pres">
       <dgm:prSet presAssocID="{7E5AA53B-3EEE-4DE4-BB81-9044890C2946}" presName="cycle" presStyleCnt="0"/>
       <dgm:spPr/>
     </dgm:pt>
-    <dgm:pt modelId="{963B8EE3-40CC-4A0A-B420-D0BF920973CE}" type="pres">
+    <dgm:pt modelId="{217D7E9F-A4FE-4817-A03E-70DACA9A4C36}" type="pres">
       <dgm:prSet presAssocID="{7E5AA53B-3EEE-4DE4-BB81-9044890C2946}" presName="srcNode" presStyleLbl="node1" presStyleIdx="0" presStyleCnt="3"/>
       <dgm:spPr/>
     </dgm:pt>
-    <dgm:pt modelId="{D79B43FC-100B-4A0D-A4D5-0D2D04B99064}" type="pres">
+    <dgm:pt modelId="{A83BA02F-1538-4C3C-8F19-2C9D546A9200}" type="pres">
       <dgm:prSet presAssocID="{7E5AA53B-3EEE-4DE4-BB81-9044890C2946}" presName="conn" presStyleLbl="parChTrans1D2" presStyleIdx="0" presStyleCnt="1"/>
       <dgm:spPr/>
     </dgm:pt>
-    <dgm:pt modelId="{3CAD8DA1-8D53-445C-ACE8-D8449E4F0F55}" type="pres">
+    <dgm:pt modelId="{278549DD-3F00-4605-B672-4C6AFAE043C3}" type="pres">
       <dgm:prSet presAssocID="{7E5AA53B-3EEE-4DE4-BB81-9044890C2946}" presName="extraNode" presStyleLbl="node1" presStyleIdx="0" presStyleCnt="3"/>
       <dgm:spPr/>
     </dgm:pt>
-    <dgm:pt modelId="{429CABD1-4116-474B-81BF-735E2CA9DD00}" type="pres">
+    <dgm:pt modelId="{EB43B4D6-73D0-4822-98A3-4BACF9621E62}" type="pres">
       <dgm:prSet presAssocID="{7E5AA53B-3EEE-4DE4-BB81-9044890C2946}" presName="dstNode" presStyleLbl="node1" presStyleIdx="0" presStyleCnt="3"/>
       <dgm:spPr/>
     </dgm:pt>
-    <dgm:pt modelId="{58319267-C71E-43C9-94E1-827D0616C7A7}" type="pres">
+    <dgm:pt modelId="{E1CFC215-5C5E-4272-B166-EA39CD1EB0D4}" type="pres">
       <dgm:prSet presAssocID="{6750AC01-D39D-4F3A-9DC8-2A211EE986A2}" presName="text_1" presStyleLbl="node1" presStyleIdx="0" presStyleCnt="3">
         <dgm:presLayoutVars>
           <dgm:bulletEnabled val="1"/>
@@ -2230,15 +2242,15 @@
       </dgm:prSet>
       <dgm:spPr/>
     </dgm:pt>
-    <dgm:pt modelId="{79F9B8A9-2412-4B74-84A9-69422DB81CDC}" type="pres">
+    <dgm:pt modelId="{DDC7EC21-0662-4FBF-AF76-E43978C665C9}" type="pres">
       <dgm:prSet presAssocID="{6750AC01-D39D-4F3A-9DC8-2A211EE986A2}" presName="accent_1" presStyleCnt="0"/>
       <dgm:spPr/>
     </dgm:pt>
-    <dgm:pt modelId="{07CB3071-D555-47DA-A36A-69EB91531FD8}" type="pres">
+    <dgm:pt modelId="{DE9DC315-C057-4AB3-9A7B-80E27896B872}" type="pres">
       <dgm:prSet presAssocID="{6750AC01-D39D-4F3A-9DC8-2A211EE986A2}" presName="accentRepeatNode" presStyleLbl="solidFgAcc1" presStyleIdx="0" presStyleCnt="3"/>
       <dgm:spPr/>
     </dgm:pt>
-    <dgm:pt modelId="{95DE6538-27BD-44AF-A1A8-CA8F6B10FDD2}" type="pres">
+    <dgm:pt modelId="{3F75CE54-F8AB-4041-87EA-79CD69DEAB56}" type="pres">
       <dgm:prSet presAssocID="{0BEF68B8-1228-47BB-83B5-7B9CD1E3F84E}" presName="text_2" presStyleLbl="node1" presStyleIdx="1" presStyleCnt="3">
         <dgm:presLayoutVars>
           <dgm:bulletEnabled val="1"/>
@@ -2246,15 +2258,15 @@
       </dgm:prSet>
       <dgm:spPr/>
     </dgm:pt>
-    <dgm:pt modelId="{312BDEE8-85BD-4F02-B35B-2CC8E701C98B}" type="pres">
+    <dgm:pt modelId="{01EE0206-62FD-4CCF-BD2A-3B59B04F47B0}" type="pres">
       <dgm:prSet presAssocID="{0BEF68B8-1228-47BB-83B5-7B9CD1E3F84E}" presName="accent_2" presStyleCnt="0"/>
       <dgm:spPr/>
     </dgm:pt>
-    <dgm:pt modelId="{3F8116AC-FAC3-4E95-9865-93CCFEB191B9}" type="pres">
+    <dgm:pt modelId="{35645705-094C-43B7-AC54-8AC826CD4EB0}" type="pres">
       <dgm:prSet presAssocID="{0BEF68B8-1228-47BB-83B5-7B9CD1E3F84E}" presName="accentRepeatNode" presStyleLbl="solidFgAcc1" presStyleIdx="1" presStyleCnt="3"/>
       <dgm:spPr/>
     </dgm:pt>
-    <dgm:pt modelId="{E131CE4A-9776-44F4-BC03-867682E21374}" type="pres">
+    <dgm:pt modelId="{E974F307-44AE-4E42-B7B4-B0D2483C372E}" type="pres">
       <dgm:prSet presAssocID="{5605D28D-2CE6-4513-8566-952984E21E14}" presName="text_3" presStyleLbl="node1" presStyleIdx="2" presStyleCnt="3">
         <dgm:presLayoutVars>
           <dgm:bulletEnabled val="1"/>
@@ -2262,39 +2274,39 @@
       </dgm:prSet>
       <dgm:spPr/>
     </dgm:pt>
-    <dgm:pt modelId="{AC9A216A-8375-48F9-A4E6-8E0B64C0209B}" type="pres">
+    <dgm:pt modelId="{BD9F826B-6BBA-4D16-87DC-18687C634AE3}" type="pres">
       <dgm:prSet presAssocID="{5605D28D-2CE6-4513-8566-952984E21E14}" presName="accent_3" presStyleCnt="0"/>
       <dgm:spPr/>
     </dgm:pt>
-    <dgm:pt modelId="{A965097E-32F1-4AB8-8C4E-2814A7596B2F}" type="pres">
+    <dgm:pt modelId="{1A8BB76A-363A-4BED-8365-017F35B5C49B}" type="pres">
       <dgm:prSet presAssocID="{5605D28D-2CE6-4513-8566-952984E21E14}" presName="accentRepeatNode" presStyleLbl="solidFgAcc1" presStyleIdx="2" presStyleCnt="3"/>
       <dgm:spPr/>
     </dgm:pt>
   </dgm:ptLst>
   <dgm:cxnLst>
-    <dgm:cxn modelId="{A11E3B12-1828-45A7-86C3-BB85832DF84D}" type="presOf" srcId="{CA077D98-8478-47EA-B6A9-99ACE60C64D4}" destId="{D79B43FC-100B-4A0D-A4D5-0D2D04B99064}" srcOrd="0" destOrd="0" presId="urn:microsoft.com/office/officeart/2008/layout/VerticalCurvedList"/>
+    <dgm:cxn modelId="{C6308A28-3B0F-47A1-8E0C-1DF08DB7CA46}" type="presOf" srcId="{0BEF68B8-1228-47BB-83B5-7B9CD1E3F84E}" destId="{3F75CE54-F8AB-4041-87EA-79CD69DEAB56}" srcOrd="0" destOrd="0" presId="urn:microsoft.com/office/officeart/2008/layout/VerticalCurvedList"/>
     <dgm:cxn modelId="{0B5DAE5F-BCDC-4BF7-A6E7-CF856886A64D}" srcId="{7E5AA53B-3EEE-4DE4-BB81-9044890C2946}" destId="{6750AC01-D39D-4F3A-9DC8-2A211EE986A2}" srcOrd="0" destOrd="0" parTransId="{720680DC-AAA4-4434-A582-60EBCC5BA355}" sibTransId="{CA077D98-8478-47EA-B6A9-99ACE60C64D4}"/>
-    <dgm:cxn modelId="{29DA474E-5DFA-4C66-882F-319C49ABBB19}" type="presOf" srcId="{6750AC01-D39D-4F3A-9DC8-2A211EE986A2}" destId="{58319267-C71E-43C9-94E1-827D0616C7A7}" srcOrd="0" destOrd="0" presId="urn:microsoft.com/office/officeart/2008/layout/VerticalCurvedList"/>
-    <dgm:cxn modelId="{7084AA77-BACB-46CB-AE4A-77B62D3ED1AF}" type="presOf" srcId="{5605D28D-2CE6-4513-8566-952984E21E14}" destId="{E131CE4A-9776-44F4-BC03-867682E21374}" srcOrd="0" destOrd="0" presId="urn:microsoft.com/office/officeart/2008/layout/VerticalCurvedList"/>
+    <dgm:cxn modelId="{5DB3906E-8214-42D3-A43C-D30BC5A2D23D}" type="presOf" srcId="{7E5AA53B-3EEE-4DE4-BB81-9044890C2946}" destId="{D1AD7F36-BF92-483F-A496-EC6417DE0EE1}" srcOrd="0" destOrd="0" presId="urn:microsoft.com/office/officeart/2008/layout/VerticalCurvedList"/>
     <dgm:cxn modelId="{EDEF4F82-1237-4639-A0F7-385C1897CE66}" srcId="{7E5AA53B-3EEE-4DE4-BB81-9044890C2946}" destId="{0BEF68B8-1228-47BB-83B5-7B9CD1E3F84E}" srcOrd="1" destOrd="0" parTransId="{ED3A4BC2-B75A-4952-A38B-A42B5995DF05}" sibTransId="{FD949706-EDCC-4ADC-8EDF-8EDA49C92325}"/>
     <dgm:cxn modelId="{FAF3F884-F0CF-440F-8CB1-B7648AB1B138}" srcId="{7E5AA53B-3EEE-4DE4-BB81-9044890C2946}" destId="{5605D28D-2CE6-4513-8566-952984E21E14}" srcOrd="2" destOrd="0" parTransId="{EB15AB98-362B-4E70-A3DA-995FC3E8BA79}" sibTransId="{823D1971-2C4D-4EC5-A874-2F463DE37109}"/>
-    <dgm:cxn modelId="{4F65CC8F-B5A8-40BE-A32B-05862B543D6A}" type="presOf" srcId="{7E5AA53B-3EEE-4DE4-BB81-9044890C2946}" destId="{57806726-6E60-4ACC-9C1C-7DF9CC365A10}" srcOrd="0" destOrd="0" presId="urn:microsoft.com/office/officeart/2008/layout/VerticalCurvedList"/>
-    <dgm:cxn modelId="{4A378892-5CCC-4F0D-8A38-4BEAECF30F24}" type="presOf" srcId="{0BEF68B8-1228-47BB-83B5-7B9CD1E3F84E}" destId="{95DE6538-27BD-44AF-A1A8-CA8F6B10FDD2}" srcOrd="0" destOrd="0" presId="urn:microsoft.com/office/officeart/2008/layout/VerticalCurvedList"/>
-    <dgm:cxn modelId="{4E25B52E-70EF-4A0F-B410-0B49263AF380}" type="presParOf" srcId="{57806726-6E60-4ACC-9C1C-7DF9CC365A10}" destId="{90561C55-3C6E-4D53-85E1-2C50BCDDA392}" srcOrd="0" destOrd="0" presId="urn:microsoft.com/office/officeart/2008/layout/VerticalCurvedList"/>
-    <dgm:cxn modelId="{2B3DD9E4-EC9C-4B92-B380-F89BF82E7CF3}" type="presParOf" srcId="{90561C55-3C6E-4D53-85E1-2C50BCDDA392}" destId="{B6CD42EC-5AD4-4004-AE5B-47EDA668DAA8}" srcOrd="0" destOrd="0" presId="urn:microsoft.com/office/officeart/2008/layout/VerticalCurvedList"/>
-    <dgm:cxn modelId="{EA357085-80A4-4D1D-9BD2-56B1E9A721FB}" type="presParOf" srcId="{B6CD42EC-5AD4-4004-AE5B-47EDA668DAA8}" destId="{963B8EE3-40CC-4A0A-B420-D0BF920973CE}" srcOrd="0" destOrd="0" presId="urn:microsoft.com/office/officeart/2008/layout/VerticalCurvedList"/>
-    <dgm:cxn modelId="{F175C6D0-411C-40FD-A19B-860D49F42061}" type="presParOf" srcId="{B6CD42EC-5AD4-4004-AE5B-47EDA668DAA8}" destId="{D79B43FC-100B-4A0D-A4D5-0D2D04B99064}" srcOrd="1" destOrd="0" presId="urn:microsoft.com/office/officeart/2008/layout/VerticalCurvedList"/>
-    <dgm:cxn modelId="{794BB944-68C0-47A5-9792-652802EB36AC}" type="presParOf" srcId="{B6CD42EC-5AD4-4004-AE5B-47EDA668DAA8}" destId="{3CAD8DA1-8D53-445C-ACE8-D8449E4F0F55}" srcOrd="2" destOrd="0" presId="urn:microsoft.com/office/officeart/2008/layout/VerticalCurvedList"/>
-    <dgm:cxn modelId="{B8CC75C4-3D1A-49E7-80D2-915668C1368C}" type="presParOf" srcId="{B6CD42EC-5AD4-4004-AE5B-47EDA668DAA8}" destId="{429CABD1-4116-474B-81BF-735E2CA9DD00}" srcOrd="3" destOrd="0" presId="urn:microsoft.com/office/officeart/2008/layout/VerticalCurvedList"/>
-    <dgm:cxn modelId="{28110BB8-F33F-498C-9A75-98364B05EFA5}" type="presParOf" srcId="{90561C55-3C6E-4D53-85E1-2C50BCDDA392}" destId="{58319267-C71E-43C9-94E1-827D0616C7A7}" srcOrd="1" destOrd="0" presId="urn:microsoft.com/office/officeart/2008/layout/VerticalCurvedList"/>
-    <dgm:cxn modelId="{3866F6C9-5521-48F2-B6C3-40C9896E1605}" type="presParOf" srcId="{90561C55-3C6E-4D53-85E1-2C50BCDDA392}" destId="{79F9B8A9-2412-4B74-84A9-69422DB81CDC}" srcOrd="2" destOrd="0" presId="urn:microsoft.com/office/officeart/2008/layout/VerticalCurvedList"/>
-    <dgm:cxn modelId="{D2205A4F-BB7A-4399-BC2F-78E18EC6EAFE}" type="presParOf" srcId="{79F9B8A9-2412-4B74-84A9-69422DB81CDC}" destId="{07CB3071-D555-47DA-A36A-69EB91531FD8}" srcOrd="0" destOrd="0" presId="urn:microsoft.com/office/officeart/2008/layout/VerticalCurvedList"/>
-    <dgm:cxn modelId="{602753E6-8A03-492B-861A-6B9532B5AA28}" type="presParOf" srcId="{90561C55-3C6E-4D53-85E1-2C50BCDDA392}" destId="{95DE6538-27BD-44AF-A1A8-CA8F6B10FDD2}" srcOrd="3" destOrd="0" presId="urn:microsoft.com/office/officeart/2008/layout/VerticalCurvedList"/>
-    <dgm:cxn modelId="{AEC540A3-E86A-4075-8BE4-263F4AFF4EA1}" type="presParOf" srcId="{90561C55-3C6E-4D53-85E1-2C50BCDDA392}" destId="{312BDEE8-85BD-4F02-B35B-2CC8E701C98B}" srcOrd="4" destOrd="0" presId="urn:microsoft.com/office/officeart/2008/layout/VerticalCurvedList"/>
-    <dgm:cxn modelId="{CD5D1014-B7CB-4B47-9A02-5FBF90928A73}" type="presParOf" srcId="{312BDEE8-85BD-4F02-B35B-2CC8E701C98B}" destId="{3F8116AC-FAC3-4E95-9865-93CCFEB191B9}" srcOrd="0" destOrd="0" presId="urn:microsoft.com/office/officeart/2008/layout/VerticalCurvedList"/>
-    <dgm:cxn modelId="{987EB7C0-CA3E-4874-85E0-01E9060A2D35}" type="presParOf" srcId="{90561C55-3C6E-4D53-85E1-2C50BCDDA392}" destId="{E131CE4A-9776-44F4-BC03-867682E21374}" srcOrd="5" destOrd="0" presId="urn:microsoft.com/office/officeart/2008/layout/VerticalCurvedList"/>
-    <dgm:cxn modelId="{91E55363-8DCA-455E-A203-06A9410994CB}" type="presParOf" srcId="{90561C55-3C6E-4D53-85E1-2C50BCDDA392}" destId="{AC9A216A-8375-48F9-A4E6-8E0B64C0209B}" srcOrd="6" destOrd="0" presId="urn:microsoft.com/office/officeart/2008/layout/VerticalCurvedList"/>
-    <dgm:cxn modelId="{D866D586-1293-4049-B6E3-B467C1D5ED64}" type="presParOf" srcId="{AC9A216A-8375-48F9-A4E6-8E0B64C0209B}" destId="{A965097E-32F1-4AB8-8C4E-2814A7596B2F}" srcOrd="0" destOrd="0" presId="urn:microsoft.com/office/officeart/2008/layout/VerticalCurvedList"/>
+    <dgm:cxn modelId="{DE6BDD99-1229-4A5B-9CC3-5300E52ACE06}" type="presOf" srcId="{CA077D98-8478-47EA-B6A9-99ACE60C64D4}" destId="{A83BA02F-1538-4C3C-8F19-2C9D546A9200}" srcOrd="0" destOrd="0" presId="urn:microsoft.com/office/officeart/2008/layout/VerticalCurvedList"/>
+    <dgm:cxn modelId="{DFAE04B6-C719-428B-B0B8-2D41ABBB881E}" type="presOf" srcId="{6750AC01-D39D-4F3A-9DC8-2A211EE986A2}" destId="{E1CFC215-5C5E-4272-B166-EA39CD1EB0D4}" srcOrd="0" destOrd="0" presId="urn:microsoft.com/office/officeart/2008/layout/VerticalCurvedList"/>
+    <dgm:cxn modelId="{5824CFED-9FE6-4DCC-9411-A7D9F8A00B57}" type="presOf" srcId="{5605D28D-2CE6-4513-8566-952984E21E14}" destId="{E974F307-44AE-4E42-B7B4-B0D2483C372E}" srcOrd="0" destOrd="0" presId="urn:microsoft.com/office/officeart/2008/layout/VerticalCurvedList"/>
+    <dgm:cxn modelId="{1ABFD6DD-05C3-4A91-953B-8535DCB0E877}" type="presParOf" srcId="{D1AD7F36-BF92-483F-A496-EC6417DE0EE1}" destId="{D6F06811-6D69-4FB4-A00C-6FE236C5C33A}" srcOrd="0" destOrd="0" presId="urn:microsoft.com/office/officeart/2008/layout/VerticalCurvedList"/>
+    <dgm:cxn modelId="{3FF811C0-A082-466F-B408-DD7D8D2FFFDB}" type="presParOf" srcId="{D6F06811-6D69-4FB4-A00C-6FE236C5C33A}" destId="{FEEC7568-C8EA-4BF6-9C7E-E8C3A723DCE9}" srcOrd="0" destOrd="0" presId="urn:microsoft.com/office/officeart/2008/layout/VerticalCurvedList"/>
+    <dgm:cxn modelId="{D8CE4306-8252-4C5C-9E62-C80D5E4C12C1}" type="presParOf" srcId="{FEEC7568-C8EA-4BF6-9C7E-E8C3A723DCE9}" destId="{217D7E9F-A4FE-4817-A03E-70DACA9A4C36}" srcOrd="0" destOrd="0" presId="urn:microsoft.com/office/officeart/2008/layout/VerticalCurvedList"/>
+    <dgm:cxn modelId="{AFE3FFE6-51FA-4C25-A617-BA7D0461C041}" type="presParOf" srcId="{FEEC7568-C8EA-4BF6-9C7E-E8C3A723DCE9}" destId="{A83BA02F-1538-4C3C-8F19-2C9D546A9200}" srcOrd="1" destOrd="0" presId="urn:microsoft.com/office/officeart/2008/layout/VerticalCurvedList"/>
+    <dgm:cxn modelId="{24DC5AF0-2A78-40B4-884D-47CAA541B019}" type="presParOf" srcId="{FEEC7568-C8EA-4BF6-9C7E-E8C3A723DCE9}" destId="{278549DD-3F00-4605-B672-4C6AFAE043C3}" srcOrd="2" destOrd="0" presId="urn:microsoft.com/office/officeart/2008/layout/VerticalCurvedList"/>
+    <dgm:cxn modelId="{21CDE903-75AA-4D1D-87D7-C9738546D1E9}" type="presParOf" srcId="{FEEC7568-C8EA-4BF6-9C7E-E8C3A723DCE9}" destId="{EB43B4D6-73D0-4822-98A3-4BACF9621E62}" srcOrd="3" destOrd="0" presId="urn:microsoft.com/office/officeart/2008/layout/VerticalCurvedList"/>
+    <dgm:cxn modelId="{501FF2AD-036A-44FB-9506-183AD96FC953}" type="presParOf" srcId="{D6F06811-6D69-4FB4-A00C-6FE236C5C33A}" destId="{E1CFC215-5C5E-4272-B166-EA39CD1EB0D4}" srcOrd="1" destOrd="0" presId="urn:microsoft.com/office/officeart/2008/layout/VerticalCurvedList"/>
+    <dgm:cxn modelId="{27FE2569-CE5B-4EBE-917D-7899DC8AFC3F}" type="presParOf" srcId="{D6F06811-6D69-4FB4-A00C-6FE236C5C33A}" destId="{DDC7EC21-0662-4FBF-AF76-E43978C665C9}" srcOrd="2" destOrd="0" presId="urn:microsoft.com/office/officeart/2008/layout/VerticalCurvedList"/>
+    <dgm:cxn modelId="{0D41F83D-7697-4DA0-A6F7-72D9C8378EAD}" type="presParOf" srcId="{DDC7EC21-0662-4FBF-AF76-E43978C665C9}" destId="{DE9DC315-C057-4AB3-9A7B-80E27896B872}" srcOrd="0" destOrd="0" presId="urn:microsoft.com/office/officeart/2008/layout/VerticalCurvedList"/>
+    <dgm:cxn modelId="{EA851C05-9AA5-480E-ADF6-48EBCE3D1910}" type="presParOf" srcId="{D6F06811-6D69-4FB4-A00C-6FE236C5C33A}" destId="{3F75CE54-F8AB-4041-87EA-79CD69DEAB56}" srcOrd="3" destOrd="0" presId="urn:microsoft.com/office/officeart/2008/layout/VerticalCurvedList"/>
+    <dgm:cxn modelId="{EEF46549-357D-4AEE-9878-7992E577C690}" type="presParOf" srcId="{D6F06811-6D69-4FB4-A00C-6FE236C5C33A}" destId="{01EE0206-62FD-4CCF-BD2A-3B59B04F47B0}" srcOrd="4" destOrd="0" presId="urn:microsoft.com/office/officeart/2008/layout/VerticalCurvedList"/>
+    <dgm:cxn modelId="{E1B4D889-704B-4085-B0F6-80F3D07DF126}" type="presParOf" srcId="{01EE0206-62FD-4CCF-BD2A-3B59B04F47B0}" destId="{35645705-094C-43B7-AC54-8AC826CD4EB0}" srcOrd="0" destOrd="0" presId="urn:microsoft.com/office/officeart/2008/layout/VerticalCurvedList"/>
+    <dgm:cxn modelId="{F0753CAA-C4F1-4B08-A712-A826153A9A53}" type="presParOf" srcId="{D6F06811-6D69-4FB4-A00C-6FE236C5C33A}" destId="{E974F307-44AE-4E42-B7B4-B0D2483C372E}" srcOrd="5" destOrd="0" presId="urn:microsoft.com/office/officeart/2008/layout/VerticalCurvedList"/>
+    <dgm:cxn modelId="{477F5E05-C225-4A66-8FD7-78F4F29AC1ED}" type="presParOf" srcId="{D6F06811-6D69-4FB4-A00C-6FE236C5C33A}" destId="{BD9F826B-6BBA-4D16-87DC-18687C634AE3}" srcOrd="6" destOrd="0" presId="urn:microsoft.com/office/officeart/2008/layout/VerticalCurvedList"/>
+    <dgm:cxn modelId="{62782ECC-DE07-4F08-8195-350BBAECF5F4}" type="presParOf" srcId="{BD9F826B-6BBA-4D16-87DC-18687C634AE3}" destId="{1A8BB76A-363A-4BED-8365-017F35B5C49B}" srcOrd="0" destOrd="0" presId="urn:microsoft.com/office/officeart/2008/layout/VerticalCurvedList"/>
   </dgm:cxnLst>
   <dgm:bg/>
   <dgm:whole/>
@@ -2341,7 +2353,15 @@
           </a:stretch>
         </a:blipFill>
         <a:ln w="22225" cap="rnd" cmpd="sng" algn="ctr">
-          <a:noFill/>
+          <a:solidFill>
+            <a:schemeClr val="lt1">
+              <a:alpha val="0"/>
+              <a:hueOff val="0"/>
+              <a:satOff val="0"/>
+              <a:lumOff val="0"/>
+              <a:alphaOff val="0"/>
+            </a:schemeClr>
+          </a:solidFill>
           <a:prstDash val="solid"/>
         </a:ln>
         <a:effectLst/>
@@ -2398,9 +2418,9 @@
         </a:bodyPr>
         <a:lstStyle/>
         <a:p>
-          <a:pPr marL="0" lvl="0" indent="0" algn="ctr" defTabSz="1600200">
+          <a:pPr marL="0" lvl="0" indent="0" algn="ctr" defTabSz="1555750">
             <a:lnSpc>
-              <a:spcPct val="90000"/>
+              <a:spcPct val="100000"/>
             </a:lnSpc>
             <a:spcBef>
               <a:spcPct val="0"/>
@@ -2411,10 +2431,10 @@
             <a:buNone/>
           </a:pPr>
           <a:r>
-            <a:rPr lang="en-ZA" sz="3600" kern="1200" dirty="0"/>
-            <a:t>Network</a:t>
+            <a:rPr lang="en-ZA" sz="3500" kern="1200" dirty="0"/>
+            <a:t>Correlation</a:t>
           </a:r>
-          <a:endParaRPr lang="en-US" sz="3600" kern="1200" dirty="0"/>
+          <a:endParaRPr lang="en-US" sz="3500" kern="1200" dirty="0"/>
         </a:p>
       </dsp:txBody>
       <dsp:txXfrm>
@@ -2451,7 +2471,15 @@
           </a:stretch>
         </a:blipFill>
         <a:ln w="22225" cap="rnd" cmpd="sng" algn="ctr">
-          <a:noFill/>
+          <a:solidFill>
+            <a:schemeClr val="lt1">
+              <a:alpha val="0"/>
+              <a:hueOff val="0"/>
+              <a:satOff val="0"/>
+              <a:lumOff val="0"/>
+              <a:alphaOff val="0"/>
+            </a:schemeClr>
+          </a:solidFill>
           <a:prstDash val="solid"/>
         </a:ln>
         <a:effectLst/>
@@ -2508,9 +2536,9 @@
         </a:bodyPr>
         <a:lstStyle/>
         <a:p>
-          <a:pPr marL="0" lvl="0" indent="0" algn="ctr" defTabSz="1600200">
+          <a:pPr marL="0" lvl="0" indent="0" algn="ctr" defTabSz="1555750">
             <a:lnSpc>
-              <a:spcPct val="90000"/>
+              <a:spcPct val="100000"/>
             </a:lnSpc>
             <a:spcBef>
               <a:spcPct val="0"/>
@@ -2521,8 +2549,8 @@
             <a:buNone/>
           </a:pPr>
           <a:r>
-            <a:rPr lang="en-US" sz="3600" kern="1200" dirty="0"/>
-            <a:t>Satellite</a:t>
+            <a:rPr lang="en-US" sz="3500" kern="1200" dirty="0"/>
+            <a:t>Covariance</a:t>
           </a:r>
         </a:p>
       </dsp:txBody>
@@ -2547,9 +2575,6 @@
         <a:blipFill>
           <a:blip xmlns:r="http://schemas.openxmlformats.org/officeDocument/2006/relationships" r:embed="rId5">
             <a:extLst>
-              <a:ext uri="{28A0092B-C50C-407E-A947-70E740481C1C}">
-                <a14:useLocalDpi xmlns:a14="http://schemas.microsoft.com/office/drawing/2010/main" val="0"/>
-              </a:ext>
               <a:ext uri="{96DAC541-7B7A-43D3-8B79-37D633B846F1}">
                 <asvg:svgBlip xmlns:asvg="http://schemas.microsoft.com/office/drawing/2016/SVG/main" r:embed="rId6"/>
               </a:ext>
@@ -2561,7 +2586,15 @@
           </a:stretch>
         </a:blipFill>
         <a:ln w="22225" cap="rnd" cmpd="sng" algn="ctr">
-          <a:noFill/>
+          <a:solidFill>
+            <a:schemeClr val="lt1">
+              <a:alpha val="0"/>
+              <a:hueOff val="0"/>
+              <a:satOff val="0"/>
+              <a:lumOff val="0"/>
+              <a:alphaOff val="0"/>
+            </a:schemeClr>
+          </a:solidFill>
           <a:prstDash val="solid"/>
         </a:ln>
         <a:effectLst/>
@@ -2618,9 +2651,9 @@
         </a:bodyPr>
         <a:lstStyle/>
         <a:p>
-          <a:pPr marL="0" lvl="0" indent="0" algn="ctr" defTabSz="1600200">
+          <a:pPr marL="0" lvl="0" indent="0" algn="ctr" defTabSz="1555750">
             <a:lnSpc>
-              <a:spcPct val="90000"/>
+              <a:spcPct val="100000"/>
             </a:lnSpc>
             <a:spcBef>
               <a:spcPct val="0"/>
@@ -2631,8 +2664,8 @@
             <a:buNone/>
           </a:pPr>
           <a:r>
-            <a:rPr lang="en-US" sz="3600" kern="1200" dirty="0"/>
-            <a:t>Link</a:t>
+            <a:rPr lang="en-US" sz="3500" kern="1200" dirty="0"/>
+            <a:t>Linear Regression</a:t>
           </a:r>
         </a:p>
       </dsp:txBody>
@@ -2653,7 +2686,7 @@
       <dsp:cNvGrpSpPr/>
     </dsp:nvGrpSpPr>
     <dsp:grpSpPr/>
-    <dsp:sp modelId="{D79B43FC-100B-4A0D-A4D5-0D2D04B99064}">
+    <dsp:sp modelId="{A83BA02F-1538-4C3C-8F19-2C9D546A9200}">
       <dsp:nvSpPr>
         <dsp:cNvPr id="0" name=""/>
         <dsp:cNvSpPr/>
@@ -2698,7 +2731,7 @@
         <a:fontRef idx="minor"/>
       </dsp:style>
     </dsp:sp>
-    <dsp:sp modelId="{58319267-C71E-43C9-94E1-827D0616C7A7}">
+    <dsp:sp modelId="{E1CFC215-5C5E-4272-B166-EA39CD1EB0D4}">
       <dsp:nvSpPr>
         <dsp:cNvPr id="0" name=""/>
         <dsp:cNvSpPr/>
@@ -2790,7 +2823,7 @@
         <a:ext cx="6310391" cy="712787"/>
       </dsp:txXfrm>
     </dsp:sp>
-    <dsp:sp modelId="{07CB3071-D555-47DA-A36A-69EB91531FD8}">
+    <dsp:sp modelId="{DE9DC315-C057-4AB3-9A7B-80E27896B872}">
       <dsp:nvSpPr>
         <dsp:cNvPr id="0" name=""/>
         <dsp:cNvSpPr/>
@@ -2837,7 +2870,7 @@
         <a:fontRef idx="minor"/>
       </dsp:style>
     </dsp:sp>
-    <dsp:sp modelId="{95DE6538-27BD-44AF-A1A8-CA8F6B10FDD2}">
+    <dsp:sp modelId="{3F75CE54-F8AB-4041-87EA-79CD69DEAB56}">
       <dsp:nvSpPr>
         <dsp:cNvPr id="0" name=""/>
         <dsp:cNvSpPr/>
@@ -2929,7 +2962,7 @@
         <a:ext cx="6051292" cy="712787"/>
       </dsp:txXfrm>
     </dsp:sp>
-    <dsp:sp modelId="{3F8116AC-FAC3-4E95-9865-93CCFEB191B9}">
+    <dsp:sp modelId="{35645705-094C-43B7-AC54-8AC826CD4EB0}">
       <dsp:nvSpPr>
         <dsp:cNvPr id="0" name=""/>
         <dsp:cNvSpPr/>
@@ -2976,7 +3009,7 @@
         <a:fontRef idx="minor"/>
       </dsp:style>
     </dsp:sp>
-    <dsp:sp modelId="{E131CE4A-9776-44F4-BC03-867682E21374}">
+    <dsp:sp modelId="{E974F307-44AE-4E42-B7B4-B0D2483C372E}">
       <dsp:nvSpPr>
         <dsp:cNvPr id="0" name=""/>
         <dsp:cNvSpPr/>
@@ -3068,7 +3101,7 @@
         <a:ext cx="6310391" cy="712787"/>
       </dsp:txXfrm>
     </dsp:sp>
-    <dsp:sp modelId="{A965097E-32F1-4AB8-8C4E-2814A7596B2F}">
+    <dsp:sp modelId="{1A8BB76A-363A-4BED-8365-017F35B5C49B}">
       <dsp:nvSpPr>
         <dsp:cNvPr id="0" name=""/>
         <dsp:cNvSpPr/>
@@ -6749,7 +6782,7 @@
           <a:p>
             <a:fld id="{AF869721-F543-4A6C-BF9D-65D7CC540427}" type="datetimeFigureOut">
               <a:rPr lang="en-US" smtClean="0"/>
-              <a:t>6/8/2023</a:t>
+              <a:t>6/9/2023</a:t>
             </a:fld>
             <a:endParaRPr lang="en-US" dirty="0"/>
           </a:p>
@@ -6926,7 +6959,7 @@
           <a:p>
             <a:fld id="{C732326A-4C88-4AFB-AA5B-5919D81DFF5B}" type="datetimeFigureOut">
               <a:rPr lang="en-US" smtClean="0"/>
-              <a:t>6/8/2023</a:t>
+              <a:t>6/9/2023</a:t>
             </a:fld>
             <a:endParaRPr lang="en-US" dirty="0"/>
           </a:p>
@@ -7426,7 +7459,7 @@
           <a:p>
             <a:fld id="{C6B3AB32-59DF-41F1-9618-EDFBF5049629}" type="slidenum">
               <a:rPr lang="en-US" smtClean="0"/>
-              <a:t>10</a:t>
+              <a:t>18</a:t>
             </a:fld>
             <a:endParaRPr lang="en-US" dirty="0"/>
           </a:p>
@@ -7510,7 +7543,7 @@
           <a:p>
             <a:fld id="{C6B3AB32-59DF-41F1-9618-EDFBF5049629}" type="slidenum">
               <a:rPr lang="en-US" smtClean="0"/>
-              <a:t>11</a:t>
+              <a:t>20</a:t>
             </a:fld>
             <a:endParaRPr lang="en-US" dirty="0"/>
           </a:p>
@@ -7775,7 +7808,7 @@
             <a:fld id="{B61BEF0D-F0BB-DE4B-95CE-6DB70DBA9567}" type="datetimeFigureOut">
               <a:rPr lang="en-US" smtClean="0"/>
               <a:pPr/>
-              <a:t>6/8/2023</a:t>
+              <a:t>6/9/2023</a:t>
             </a:fld>
             <a:endParaRPr lang="en-US" dirty="0"/>
           </a:p>
@@ -8039,7 +8072,7 @@
             <a:fld id="{B61BEF0D-F0BB-DE4B-95CE-6DB70DBA9567}" type="datetimeFigureOut">
               <a:rPr lang="en-US" smtClean="0"/>
               <a:pPr/>
-              <a:t>6/8/2023</a:t>
+              <a:t>6/9/2023</a:t>
             </a:fld>
             <a:endParaRPr lang="en-US" dirty="0"/>
           </a:p>
@@ -8276,7 +8309,7 @@
             <a:fld id="{B61BEF0D-F0BB-DE4B-95CE-6DB70DBA9567}" type="datetimeFigureOut">
               <a:rPr lang="en-US" smtClean="0"/>
               <a:pPr/>
-              <a:t>6/8/2023</a:t>
+              <a:t>6/9/2023</a:t>
             </a:fld>
             <a:endParaRPr lang="en-US" dirty="0"/>
           </a:p>
@@ -8518,7 +8551,7 @@
             <a:fld id="{B61BEF0D-F0BB-DE4B-95CE-6DB70DBA9567}" type="datetimeFigureOut">
               <a:rPr lang="en-US" smtClean="0"/>
               <a:pPr/>
-              <a:t>6/8/2023</a:t>
+              <a:t>6/9/2023</a:t>
             </a:fld>
             <a:endParaRPr lang="en-US" dirty="0"/>
           </a:p>
@@ -8827,7 +8860,7 @@
             <a:fld id="{B61BEF0D-F0BB-DE4B-95CE-6DB70DBA9567}" type="datetimeFigureOut">
               <a:rPr lang="en-US" smtClean="0"/>
               <a:pPr/>
-              <a:t>6/8/2023</a:t>
+              <a:t>6/9/2023</a:t>
             </a:fld>
             <a:endParaRPr lang="en-US" dirty="0"/>
           </a:p>
@@ -9131,7 +9164,7 @@
             <a:fld id="{B61BEF0D-F0BB-DE4B-95CE-6DB70DBA9567}" type="datetimeFigureOut">
               <a:rPr lang="en-US" smtClean="0"/>
               <a:pPr/>
-              <a:t>6/8/2023</a:t>
+              <a:t>6/9/2023</a:t>
             </a:fld>
             <a:endParaRPr lang="en-US" dirty="0"/>
           </a:p>
@@ -9555,7 +9588,7 @@
             <a:fld id="{B61BEF0D-F0BB-DE4B-95CE-6DB70DBA9567}" type="datetimeFigureOut">
               <a:rPr lang="en-US" smtClean="0"/>
               <a:pPr/>
-              <a:t>6/8/2023</a:t>
+              <a:t>6/9/2023</a:t>
             </a:fld>
             <a:endParaRPr lang="en-US" dirty="0"/>
           </a:p>
@@ -9652,7 +9685,7 @@
             <a:fld id="{B61BEF0D-F0BB-DE4B-95CE-6DB70DBA9567}" type="datetimeFigureOut">
               <a:rPr lang="en-US" smtClean="0"/>
               <a:pPr/>
-              <a:t>6/8/2023</a:t>
+              <a:t>6/9/2023</a:t>
             </a:fld>
             <a:endParaRPr lang="en-US" dirty="0"/>
           </a:p>
@@ -9816,7 +9849,7 @@
             <a:fld id="{B61BEF0D-F0BB-DE4B-95CE-6DB70DBA9567}" type="datetimeFigureOut">
               <a:rPr lang="en-US" smtClean="0"/>
               <a:pPr/>
-              <a:t>6/8/2023</a:t>
+              <a:t>6/9/2023</a:t>
             </a:fld>
             <a:endParaRPr lang="en-US" dirty="0"/>
           </a:p>
@@ -10196,7 +10229,7 @@
             <a:fld id="{B61BEF0D-F0BB-DE4B-95CE-6DB70DBA9567}" type="datetimeFigureOut">
               <a:rPr lang="en-US" smtClean="0"/>
               <a:pPr/>
-              <a:t>6/8/2023</a:t>
+              <a:t>6/9/2023</a:t>
             </a:fld>
             <a:endParaRPr lang="en-US" dirty="0"/>
           </a:p>
@@ -10487,7 +10520,7 @@
             <a:fld id="{B61BEF0D-F0BB-DE4B-95CE-6DB70DBA9567}" type="datetimeFigureOut">
               <a:rPr lang="en-US" smtClean="0"/>
               <a:pPr/>
-              <a:t>6/8/2023</a:t>
+              <a:t>6/9/2023</a:t>
             </a:fld>
             <a:endParaRPr lang="en-US" dirty="0"/>
           </a:p>
@@ -10700,7 +10733,7 @@
             <a:fld id="{B61BEF0D-F0BB-DE4B-95CE-6DB70DBA9567}" type="datetimeFigureOut">
               <a:rPr lang="en-US" smtClean="0"/>
               <a:pPr/>
-              <a:t>6/8/2023</a:t>
+              <a:t>6/9/2023</a:t>
             </a:fld>
             <a:endParaRPr lang="en-US" dirty="0"/>
           </a:p>
@@ -11743,6 +11776,1937 @@
 <file path=ppt/slides/slide10.xml><?xml version="1.0" encoding="utf-8"?>
 <p:sld xmlns:a="http://schemas.openxmlformats.org/drawingml/2006/main" xmlns:r="http://schemas.openxmlformats.org/officeDocument/2006/relationships" xmlns:p="http://schemas.openxmlformats.org/presentationml/2006/main">
   <p:cSld>
+    <p:spTree>
+      <p:nvGrpSpPr>
+        <p:cNvPr id="1" name=""/>
+        <p:cNvGrpSpPr/>
+        <p:nvPr/>
+      </p:nvGrpSpPr>
+      <p:grpSpPr>
+        <a:xfrm>
+          <a:off x="0" y="0"/>
+          <a:ext cx="0" cy="0"/>
+          <a:chOff x="0" y="0"/>
+          <a:chExt cx="0" cy="0"/>
+        </a:xfrm>
+      </p:grpSpPr>
+      <p:sp>
+        <p:nvSpPr>
+          <p:cNvPr id="2" name="Title 1">
+            <a:extLst>
+              <a:ext uri="{FF2B5EF4-FFF2-40B4-BE49-F238E27FC236}">
+                <a16:creationId xmlns:a16="http://schemas.microsoft.com/office/drawing/2014/main" id="{921633EB-7DCB-4DDC-80AF-C885A3EE1245}"/>
+              </a:ext>
+            </a:extLst>
+          </p:cNvPr>
+          <p:cNvSpPr>
+            <a:spLocks noGrp="1"/>
+          </p:cNvSpPr>
+          <p:nvPr>
+            <p:ph type="title"/>
+          </p:nvPr>
+        </p:nvSpPr>
+        <p:spPr/>
+        <p:txBody>
+          <a:bodyPr/>
+          <a:lstStyle/>
+          <a:p>
+            <a:r>
+              <a:rPr lang="en-US" dirty="0"/>
+              <a:t>Grade Data</a:t>
+            </a:r>
+          </a:p>
+        </p:txBody>
+      </p:sp>
+      <p:sp>
+        <p:nvSpPr>
+          <p:cNvPr id="4" name="Content Placeholder 3">
+            <a:extLst>
+              <a:ext uri="{FF2B5EF4-FFF2-40B4-BE49-F238E27FC236}">
+                <a16:creationId xmlns:a16="http://schemas.microsoft.com/office/drawing/2014/main" id="{42D5E002-1C68-0A1B-39F4-AD4EA6416E54}"/>
+              </a:ext>
+            </a:extLst>
+          </p:cNvPr>
+          <p:cNvSpPr>
+            <a:spLocks noGrp="1"/>
+          </p:cNvSpPr>
+          <p:nvPr>
+            <p:ph sz="half" idx="1"/>
+          </p:nvPr>
+        </p:nvSpPr>
+        <p:spPr/>
+        <p:txBody>
+          <a:bodyPr/>
+          <a:lstStyle/>
+          <a:p>
+            <a:r>
+              <a:rPr lang="en-US" dirty="0"/>
+              <a:t>Grade Distribution over the three years.</a:t>
+            </a:r>
+          </a:p>
+          <a:p>
+            <a:r>
+              <a:rPr lang="en-GB" dirty="0"/>
+              <a:t>Observations:</a:t>
+            </a:r>
+          </a:p>
+          <a:p>
+            <a:pPr lvl="1"/>
+            <a:r>
+              <a:rPr lang="en-GB" dirty="0"/>
+              <a:t>2021-2022 year, no students recorded as MF or F, only a relatively small number of NS grades</a:t>
+            </a:r>
+          </a:p>
+          <a:p>
+            <a:pPr lvl="1"/>
+            <a:r>
+              <a:rPr lang="en-GB" dirty="0"/>
+              <a:t>Median for 2020-2021 and 2022-2023 are the same, however general performance appears to have dropped.</a:t>
+            </a:r>
+            <a:endParaRPr lang="en-US" dirty="0"/>
+          </a:p>
+        </p:txBody>
+      </p:sp>
+      <p:pic>
+        <p:nvPicPr>
+          <p:cNvPr id="8" name="Content Placeholder 7" descr="A picture containing text, diagram, screenshot, rectangle&#10;&#10;Description automatically generated">
+            <a:extLst>
+              <a:ext uri="{FF2B5EF4-FFF2-40B4-BE49-F238E27FC236}">
+                <a16:creationId xmlns:a16="http://schemas.microsoft.com/office/drawing/2014/main" id="{42651790-8BAE-6A96-CED7-AB08B5AEAF8A}"/>
+              </a:ext>
+            </a:extLst>
+          </p:cNvPr>
+          <p:cNvPicPr>
+            <a:picLocks noGrp="1" noChangeAspect="1"/>
+          </p:cNvPicPr>
+          <p:nvPr>
+            <p:ph sz="half" idx="2"/>
+          </p:nvPr>
+        </p:nvPicPr>
+        <p:blipFill>
+          <a:blip r:embed="rId2"/>
+          <a:stretch>
+            <a:fillRect/>
+          </a:stretch>
+        </p:blipFill>
+        <p:spPr>
+          <a:xfrm>
+            <a:off x="6188419" y="2017635"/>
+            <a:ext cx="4840365" cy="4840365"/>
+          </a:xfrm>
+        </p:spPr>
+      </p:pic>
+    </p:spTree>
+    <p:extLst>
+      <p:ext uri="{BB962C8B-B14F-4D97-AF65-F5344CB8AC3E}">
+        <p14:creationId xmlns:p14="http://schemas.microsoft.com/office/powerpoint/2010/main" val="497607547"/>
+      </p:ext>
+    </p:extLst>
+  </p:cSld>
+  <p:clrMapOvr>
+    <a:masterClrMapping/>
+  </p:clrMapOvr>
+</p:sld>
+</file>
+
+<file path=ppt/slides/slide11.xml><?xml version="1.0" encoding="utf-8"?>
+<p:sld xmlns:a="http://schemas.openxmlformats.org/drawingml/2006/main" xmlns:r="http://schemas.openxmlformats.org/officeDocument/2006/relationships" xmlns:p="http://schemas.openxmlformats.org/presentationml/2006/main">
+  <p:cSld>
+    <p:spTree>
+      <p:nvGrpSpPr>
+        <p:cNvPr id="1" name=""/>
+        <p:cNvGrpSpPr/>
+        <p:nvPr/>
+      </p:nvGrpSpPr>
+      <p:grpSpPr>
+        <a:xfrm>
+          <a:off x="0" y="0"/>
+          <a:ext cx="0" cy="0"/>
+          <a:chOff x="0" y="0"/>
+          <a:chExt cx="0" cy="0"/>
+        </a:xfrm>
+      </p:grpSpPr>
+      <p:sp>
+        <p:nvSpPr>
+          <p:cNvPr id="2" name="Title 1">
+            <a:extLst>
+              <a:ext uri="{FF2B5EF4-FFF2-40B4-BE49-F238E27FC236}">
+                <a16:creationId xmlns:a16="http://schemas.microsoft.com/office/drawing/2014/main" id="{921633EB-7DCB-4DDC-80AF-C885A3EE1245}"/>
+              </a:ext>
+            </a:extLst>
+          </p:cNvPr>
+          <p:cNvSpPr>
+            <a:spLocks noGrp="1"/>
+          </p:cNvSpPr>
+          <p:nvPr>
+            <p:ph type="title"/>
+          </p:nvPr>
+        </p:nvSpPr>
+        <p:spPr/>
+        <p:txBody>
+          <a:bodyPr/>
+          <a:lstStyle/>
+          <a:p>
+            <a:r>
+              <a:rPr lang="en-US" dirty="0"/>
+              <a:t>Grade Data</a:t>
+            </a:r>
+          </a:p>
+        </p:txBody>
+      </p:sp>
+      <p:pic>
+        <p:nvPicPr>
+          <p:cNvPr id="20" name="Content Placeholder 19" descr="A picture containing text, diagram, screenshot, line&#10;&#10;Description automatically generated">
+            <a:extLst>
+              <a:ext uri="{FF2B5EF4-FFF2-40B4-BE49-F238E27FC236}">
+                <a16:creationId xmlns:a16="http://schemas.microsoft.com/office/drawing/2014/main" id="{996B68EB-BA2A-A868-4AE5-26A32E6156DF}"/>
+              </a:ext>
+            </a:extLst>
+          </p:cNvPr>
+          <p:cNvPicPr>
+            <a:picLocks noGrp="1" noChangeAspect="1"/>
+          </p:cNvPicPr>
+          <p:nvPr>
+            <p:ph sz="half" idx="2"/>
+          </p:nvPr>
+        </p:nvPicPr>
+        <p:blipFill>
+          <a:blip r:embed="rId2"/>
+          <a:stretch>
+            <a:fillRect/>
+          </a:stretch>
+        </p:blipFill>
+        <p:spPr>
+          <a:xfrm>
+            <a:off x="4279106" y="2227262"/>
+            <a:ext cx="3633787" cy="3633787"/>
+          </a:xfrm>
+        </p:spPr>
+      </p:pic>
+      <p:pic>
+        <p:nvPicPr>
+          <p:cNvPr id="18" name="Content Placeholder 17" descr="A picture containing text, diagram, font, design&#10;&#10;Description automatically generated">
+            <a:extLst>
+              <a:ext uri="{FF2B5EF4-FFF2-40B4-BE49-F238E27FC236}">
+                <a16:creationId xmlns:a16="http://schemas.microsoft.com/office/drawing/2014/main" id="{4839D6D5-2B41-944C-1C99-69736E0DFBD4}"/>
+              </a:ext>
+            </a:extLst>
+          </p:cNvPr>
+          <p:cNvPicPr>
+            <a:picLocks noGrp="1" noChangeAspect="1"/>
+          </p:cNvPicPr>
+          <p:nvPr>
+            <p:ph sz="half" idx="1"/>
+          </p:nvPr>
+        </p:nvPicPr>
+        <p:blipFill>
+          <a:blip r:embed="rId3"/>
+          <a:stretch>
+            <a:fillRect/>
+          </a:stretch>
+        </p:blipFill>
+        <p:spPr>
+          <a:xfrm>
+            <a:off x="581193" y="2227262"/>
+            <a:ext cx="3633787" cy="3633787"/>
+          </a:xfrm>
+        </p:spPr>
+      </p:pic>
+      <p:pic>
+        <p:nvPicPr>
+          <p:cNvPr id="22" name="Picture 21" descr="A picture containing text, diagram, screenshot, font&#10;&#10;Description automatically generated">
+            <a:extLst>
+              <a:ext uri="{FF2B5EF4-FFF2-40B4-BE49-F238E27FC236}">
+                <a16:creationId xmlns:a16="http://schemas.microsoft.com/office/drawing/2014/main" id="{A2645ED6-F5DD-B44C-6AF8-A1ECB0E6B71D}"/>
+              </a:ext>
+            </a:extLst>
+          </p:cNvPr>
+          <p:cNvPicPr>
+            <a:picLocks noChangeAspect="1"/>
+          </p:cNvPicPr>
+          <p:nvPr/>
+        </p:nvPicPr>
+        <p:blipFill>
+          <a:blip r:embed="rId4"/>
+          <a:stretch>
+            <a:fillRect/>
+          </a:stretch>
+        </p:blipFill>
+        <p:spPr>
+          <a:xfrm>
+            <a:off x="7977020" y="2227261"/>
+            <a:ext cx="3633787" cy="3633787"/>
+          </a:xfrm>
+          <a:prstGeom prst="rect">
+            <a:avLst/>
+          </a:prstGeom>
+        </p:spPr>
+      </p:pic>
+    </p:spTree>
+    <p:extLst>
+      <p:ext uri="{BB962C8B-B14F-4D97-AF65-F5344CB8AC3E}">
+        <p14:creationId xmlns:p14="http://schemas.microsoft.com/office/powerpoint/2010/main" val="3003786350"/>
+      </p:ext>
+    </p:extLst>
+  </p:cSld>
+  <p:clrMapOvr>
+    <a:masterClrMapping/>
+  </p:clrMapOvr>
+</p:sld>
+</file>
+
+<file path=ppt/slides/slide12.xml><?xml version="1.0" encoding="utf-8"?>
+<p:sld xmlns:a="http://schemas.openxmlformats.org/drawingml/2006/main" xmlns:r="http://schemas.openxmlformats.org/officeDocument/2006/relationships" xmlns:p="http://schemas.openxmlformats.org/presentationml/2006/main">
+  <p:cSld>
+    <p:spTree>
+      <p:nvGrpSpPr>
+        <p:cNvPr id="1" name=""/>
+        <p:cNvGrpSpPr/>
+        <p:nvPr/>
+      </p:nvGrpSpPr>
+      <p:grpSpPr>
+        <a:xfrm>
+          <a:off x="0" y="0"/>
+          <a:ext cx="0" cy="0"/>
+          <a:chOff x="0" y="0"/>
+          <a:chExt cx="0" cy="0"/>
+        </a:xfrm>
+      </p:grpSpPr>
+      <p:sp>
+        <p:nvSpPr>
+          <p:cNvPr id="2" name="Title 1">
+            <a:extLst>
+              <a:ext uri="{FF2B5EF4-FFF2-40B4-BE49-F238E27FC236}">
+                <a16:creationId xmlns:a16="http://schemas.microsoft.com/office/drawing/2014/main" id="{921633EB-7DCB-4DDC-80AF-C885A3EE1245}"/>
+              </a:ext>
+            </a:extLst>
+          </p:cNvPr>
+          <p:cNvSpPr>
+            <a:spLocks noGrp="1"/>
+          </p:cNvSpPr>
+          <p:nvPr>
+            <p:ph type="title"/>
+          </p:nvPr>
+        </p:nvSpPr>
+        <p:spPr/>
+        <p:txBody>
+          <a:bodyPr/>
+          <a:lstStyle/>
+          <a:p>
+            <a:r>
+              <a:rPr lang="en-US" dirty="0"/>
+              <a:t>Grade Data</a:t>
+            </a:r>
+          </a:p>
+        </p:txBody>
+      </p:sp>
+      <p:sp>
+        <p:nvSpPr>
+          <p:cNvPr id="4" name="Content Placeholder 3">
+            <a:extLst>
+              <a:ext uri="{FF2B5EF4-FFF2-40B4-BE49-F238E27FC236}">
+                <a16:creationId xmlns:a16="http://schemas.microsoft.com/office/drawing/2014/main" id="{15465504-73D4-37DA-85FF-7C8DD5BC71AF}"/>
+              </a:ext>
+            </a:extLst>
+          </p:cNvPr>
+          <p:cNvSpPr>
+            <a:spLocks noGrp="1"/>
+          </p:cNvSpPr>
+          <p:nvPr>
+            <p:ph sz="half" idx="1"/>
+          </p:nvPr>
+        </p:nvSpPr>
+        <p:spPr/>
+        <p:txBody>
+          <a:bodyPr/>
+          <a:lstStyle/>
+          <a:p>
+            <a:r>
+              <a:rPr lang="en-US" dirty="0"/>
+              <a:t>Heavy focus on upper grades. </a:t>
+            </a:r>
+          </a:p>
+          <a:p>
+            <a:r>
+              <a:rPr lang="en-US" dirty="0"/>
+              <a:t>No Marginal Fail or Fail grades, only 4 NS submissions.</a:t>
+            </a:r>
+          </a:p>
+          <a:p>
+            <a:r>
+              <a:rPr lang="en-US" dirty="0"/>
+              <a:t>Total students: 70</a:t>
+            </a:r>
+          </a:p>
+        </p:txBody>
+      </p:sp>
+      <p:pic>
+        <p:nvPicPr>
+          <p:cNvPr id="12" name="Content Placeholder 11" descr="A picture containing text, diagram, screenshot, line&#10;&#10;Description automatically generated">
+            <a:extLst>
+              <a:ext uri="{FF2B5EF4-FFF2-40B4-BE49-F238E27FC236}">
+                <a16:creationId xmlns:a16="http://schemas.microsoft.com/office/drawing/2014/main" id="{3E395732-DD74-A97D-BC22-2AF6224408DF}"/>
+              </a:ext>
+            </a:extLst>
+          </p:cNvPr>
+          <p:cNvPicPr>
+            <a:picLocks noGrp="1" noChangeAspect="1"/>
+          </p:cNvPicPr>
+          <p:nvPr>
+            <p:ph sz="half" idx="2"/>
+          </p:nvPr>
+        </p:nvPicPr>
+        <p:blipFill>
+          <a:blip r:embed="rId2"/>
+          <a:stretch>
+            <a:fillRect/>
+          </a:stretch>
+        </p:blipFill>
+        <p:spPr>
+          <a:xfrm>
+            <a:off x="7082631" y="2945722"/>
+            <a:ext cx="3633787" cy="3633787"/>
+          </a:xfrm>
+        </p:spPr>
+      </p:pic>
+      <p:graphicFrame>
+        <p:nvGraphicFramePr>
+          <p:cNvPr id="13" name="Table 13">
+            <a:extLst>
+              <a:ext uri="{FF2B5EF4-FFF2-40B4-BE49-F238E27FC236}">
+                <a16:creationId xmlns:a16="http://schemas.microsoft.com/office/drawing/2014/main" id="{ADB90C79-1E2A-934C-4812-5B4609E89014}"/>
+              </a:ext>
+            </a:extLst>
+          </p:cNvPr>
+          <p:cNvGraphicFramePr>
+            <a:graphicFrameLocks noGrp="1"/>
+          </p:cNvGraphicFramePr>
+          <p:nvPr>
+            <p:extLst>
+              <p:ext uri="{D42A27DB-BD31-4B8C-83A1-F6EECF244321}">
+                <p14:modId xmlns:p14="http://schemas.microsoft.com/office/powerpoint/2010/main" val="3401523753"/>
+              </p:ext>
+            </p:extLst>
+          </p:nvPr>
+        </p:nvGraphicFramePr>
+        <p:xfrm>
+          <a:off x="6775934" y="2390845"/>
+          <a:ext cx="4247177" cy="387554"/>
+        </p:xfrm>
+        <a:graphic>
+          <a:graphicData uri="http://schemas.openxmlformats.org/drawingml/2006/table">
+            <a:tbl>
+              <a:tblPr firstRow="1" bandRow="1">
+                <a:tableStyleId>{5C22544A-7EE6-4342-B048-85BDC9FD1C3A}</a:tableStyleId>
+              </a:tblPr>
+              <a:tblGrid>
+                <a:gridCol w="386107">
+                  <a:extLst>
+                    <a:ext uri="{9D8B030D-6E8A-4147-A177-3AD203B41FA5}">
+                      <a16:colId xmlns:a16="http://schemas.microsoft.com/office/drawing/2014/main" val="2045186618"/>
+                    </a:ext>
+                  </a:extLst>
+                </a:gridCol>
+                <a:gridCol w="386107">
+                  <a:extLst>
+                    <a:ext uri="{9D8B030D-6E8A-4147-A177-3AD203B41FA5}">
+                      <a16:colId xmlns:a16="http://schemas.microsoft.com/office/drawing/2014/main" val="3608372454"/>
+                    </a:ext>
+                  </a:extLst>
+                </a:gridCol>
+                <a:gridCol w="386107">
+                  <a:extLst>
+                    <a:ext uri="{9D8B030D-6E8A-4147-A177-3AD203B41FA5}">
+                      <a16:colId xmlns:a16="http://schemas.microsoft.com/office/drawing/2014/main" val="363617069"/>
+                    </a:ext>
+                  </a:extLst>
+                </a:gridCol>
+                <a:gridCol w="386107">
+                  <a:extLst>
+                    <a:ext uri="{9D8B030D-6E8A-4147-A177-3AD203B41FA5}">
+                      <a16:colId xmlns:a16="http://schemas.microsoft.com/office/drawing/2014/main" val="4017101806"/>
+                    </a:ext>
+                  </a:extLst>
+                </a:gridCol>
+                <a:gridCol w="386107">
+                  <a:extLst>
+                    <a:ext uri="{9D8B030D-6E8A-4147-A177-3AD203B41FA5}">
+                      <a16:colId xmlns:a16="http://schemas.microsoft.com/office/drawing/2014/main" val="3206237433"/>
+                    </a:ext>
+                  </a:extLst>
+                </a:gridCol>
+                <a:gridCol w="386107">
+                  <a:extLst>
+                    <a:ext uri="{9D8B030D-6E8A-4147-A177-3AD203B41FA5}">
+                      <a16:colId xmlns:a16="http://schemas.microsoft.com/office/drawing/2014/main" val="2249127231"/>
+                    </a:ext>
+                  </a:extLst>
+                </a:gridCol>
+                <a:gridCol w="386107">
+                  <a:extLst>
+                    <a:ext uri="{9D8B030D-6E8A-4147-A177-3AD203B41FA5}">
+                      <a16:colId xmlns:a16="http://schemas.microsoft.com/office/drawing/2014/main" val="1705875377"/>
+                    </a:ext>
+                  </a:extLst>
+                </a:gridCol>
+                <a:gridCol w="386107">
+                  <a:extLst>
+                    <a:ext uri="{9D8B030D-6E8A-4147-A177-3AD203B41FA5}">
+                      <a16:colId xmlns:a16="http://schemas.microsoft.com/office/drawing/2014/main" val="2640942700"/>
+                    </a:ext>
+                  </a:extLst>
+                </a:gridCol>
+                <a:gridCol w="386107">
+                  <a:extLst>
+                    <a:ext uri="{9D8B030D-6E8A-4147-A177-3AD203B41FA5}">
+                      <a16:colId xmlns:a16="http://schemas.microsoft.com/office/drawing/2014/main" val="3178846657"/>
+                    </a:ext>
+                  </a:extLst>
+                </a:gridCol>
+                <a:gridCol w="386107">
+                  <a:extLst>
+                    <a:ext uri="{9D8B030D-6E8A-4147-A177-3AD203B41FA5}">
+                      <a16:colId xmlns:a16="http://schemas.microsoft.com/office/drawing/2014/main" val="1685616324"/>
+                    </a:ext>
+                  </a:extLst>
+                </a:gridCol>
+                <a:gridCol w="386107">
+                  <a:extLst>
+                    <a:ext uri="{9D8B030D-6E8A-4147-A177-3AD203B41FA5}">
+                      <a16:colId xmlns:a16="http://schemas.microsoft.com/office/drawing/2014/main" val="4264547713"/>
+                    </a:ext>
+                  </a:extLst>
+                </a:gridCol>
+              </a:tblGrid>
+              <a:tr h="193777">
+                <a:tc>
+                  <a:txBody>
+                    <a:bodyPr/>
+                    <a:lstStyle/>
+                    <a:p>
+                      <a:pPr algn="ctr"/>
+                      <a:r>
+                        <a:rPr lang="en-US" sz="900" dirty="0"/>
+                        <a:t>A+</a:t>
+                      </a:r>
+                      <a:endParaRPr lang="en-GB" sz="900" dirty="0"/>
+                    </a:p>
+                  </a:txBody>
+                  <a:tcPr marL="47781" marR="47781" marT="23890" marB="23890"/>
+                </a:tc>
+                <a:tc>
+                  <a:txBody>
+                    <a:bodyPr/>
+                    <a:lstStyle/>
+                    <a:p>
+                      <a:pPr algn="ctr"/>
+                      <a:r>
+                        <a:rPr lang="en-US" sz="900" dirty="0"/>
+                        <a:t>A</a:t>
+                      </a:r>
+                      <a:endParaRPr lang="en-GB" sz="900" dirty="0"/>
+                    </a:p>
+                  </a:txBody>
+                  <a:tcPr marL="47781" marR="47781" marT="23890" marB="23890"/>
+                </a:tc>
+                <a:tc>
+                  <a:txBody>
+                    <a:bodyPr/>
+                    <a:lstStyle/>
+                    <a:p>
+                      <a:pPr algn="ctr"/>
+                      <a:r>
+                        <a:rPr lang="en-US" sz="900" dirty="0"/>
+                        <a:t>B+ </a:t>
+                      </a:r>
+                      <a:endParaRPr lang="en-GB" sz="900" dirty="0"/>
+                    </a:p>
+                  </a:txBody>
+                  <a:tcPr marL="47781" marR="47781" marT="23890" marB="23890"/>
+                </a:tc>
+                <a:tc>
+                  <a:txBody>
+                    <a:bodyPr/>
+                    <a:lstStyle/>
+                    <a:p>
+                      <a:pPr algn="ctr"/>
+                      <a:r>
+                        <a:rPr lang="en-US" sz="900" dirty="0"/>
+                        <a:t>B</a:t>
+                      </a:r>
+                      <a:endParaRPr lang="en-GB" sz="900" dirty="0"/>
+                    </a:p>
+                  </a:txBody>
+                  <a:tcPr marL="47781" marR="47781" marT="23890" marB="23890"/>
+                </a:tc>
+                <a:tc>
+                  <a:txBody>
+                    <a:bodyPr/>
+                    <a:lstStyle/>
+                    <a:p>
+                      <a:pPr algn="ctr"/>
+                      <a:r>
+                        <a:rPr lang="en-US" sz="900" dirty="0"/>
+                        <a:t>C+</a:t>
+                      </a:r>
+                      <a:endParaRPr lang="en-GB" sz="900" dirty="0"/>
+                    </a:p>
+                  </a:txBody>
+                  <a:tcPr marL="47781" marR="47781" marT="23890" marB="23890"/>
+                </a:tc>
+                <a:tc>
+                  <a:txBody>
+                    <a:bodyPr/>
+                    <a:lstStyle/>
+                    <a:p>
+                      <a:pPr algn="ctr"/>
+                      <a:r>
+                        <a:rPr lang="en-US" sz="900" dirty="0"/>
+                        <a:t>C</a:t>
+                      </a:r>
+                      <a:endParaRPr lang="en-GB" sz="900" dirty="0"/>
+                    </a:p>
+                  </a:txBody>
+                  <a:tcPr marL="47781" marR="47781" marT="23890" marB="23890"/>
+                </a:tc>
+                <a:tc>
+                  <a:txBody>
+                    <a:bodyPr/>
+                    <a:lstStyle/>
+                    <a:p>
+                      <a:pPr algn="ctr"/>
+                      <a:r>
+                        <a:rPr lang="en-US" sz="900" dirty="0"/>
+                        <a:t>D+</a:t>
+                      </a:r>
+                      <a:endParaRPr lang="en-GB" sz="900" dirty="0"/>
+                    </a:p>
+                  </a:txBody>
+                  <a:tcPr marL="47781" marR="47781" marT="23890" marB="23890"/>
+                </a:tc>
+                <a:tc>
+                  <a:txBody>
+                    <a:bodyPr/>
+                    <a:lstStyle/>
+                    <a:p>
+                      <a:pPr algn="ctr"/>
+                      <a:r>
+                        <a:rPr lang="en-US" sz="900" dirty="0"/>
+                        <a:t>D</a:t>
+                      </a:r>
+                      <a:endParaRPr lang="en-GB" sz="900" dirty="0"/>
+                    </a:p>
+                  </a:txBody>
+                  <a:tcPr marL="47781" marR="47781" marT="23890" marB="23890"/>
+                </a:tc>
+                <a:tc>
+                  <a:txBody>
+                    <a:bodyPr/>
+                    <a:lstStyle/>
+                    <a:p>
+                      <a:pPr algn="ctr"/>
+                      <a:r>
+                        <a:rPr lang="en-US" sz="900" dirty="0"/>
+                        <a:t>MF</a:t>
+                      </a:r>
+                      <a:endParaRPr lang="en-GB" sz="900" dirty="0"/>
+                    </a:p>
+                  </a:txBody>
+                  <a:tcPr marL="47781" marR="47781" marT="23890" marB="23890"/>
+                </a:tc>
+                <a:tc>
+                  <a:txBody>
+                    <a:bodyPr/>
+                    <a:lstStyle/>
+                    <a:p>
+                      <a:pPr algn="ctr"/>
+                      <a:r>
+                        <a:rPr lang="en-US" sz="900" dirty="0"/>
+                        <a:t>F</a:t>
+                      </a:r>
+                      <a:endParaRPr lang="en-GB" sz="900" dirty="0"/>
+                    </a:p>
+                  </a:txBody>
+                  <a:tcPr marL="47781" marR="47781" marT="23890" marB="23890"/>
+                </a:tc>
+                <a:tc>
+                  <a:txBody>
+                    <a:bodyPr/>
+                    <a:lstStyle/>
+                    <a:p>
+                      <a:pPr algn="ctr"/>
+                      <a:r>
+                        <a:rPr lang="en-US" sz="900" dirty="0"/>
+                        <a:t>NS</a:t>
+                      </a:r>
+                      <a:endParaRPr lang="en-GB" sz="900" dirty="0"/>
+                    </a:p>
+                  </a:txBody>
+                  <a:tcPr marL="47781" marR="47781" marT="23890" marB="23890"/>
+                </a:tc>
+                <a:extLst>
+                  <a:ext uri="{0D108BD9-81ED-4DB2-BD59-A6C34878D82A}">
+                    <a16:rowId xmlns:a16="http://schemas.microsoft.com/office/drawing/2014/main" val="2082677582"/>
+                  </a:ext>
+                </a:extLst>
+              </a:tr>
+              <a:tr h="193777">
+                <a:tc>
+                  <a:txBody>
+                    <a:bodyPr/>
+                    <a:lstStyle/>
+                    <a:p>
+                      <a:pPr algn="ctr"/>
+                      <a:r>
+                        <a:rPr lang="en-US" sz="900" dirty="0"/>
+                        <a:t>8</a:t>
+                      </a:r>
+                      <a:endParaRPr lang="en-GB" sz="900" dirty="0"/>
+                    </a:p>
+                  </a:txBody>
+                  <a:tcPr marL="47781" marR="47781" marT="23890" marB="23890"/>
+                </a:tc>
+                <a:tc>
+                  <a:txBody>
+                    <a:bodyPr/>
+                    <a:lstStyle/>
+                    <a:p>
+                      <a:pPr algn="ctr"/>
+                      <a:r>
+                        <a:rPr lang="en-US" sz="900" dirty="0"/>
+                        <a:t>15</a:t>
+                      </a:r>
+                      <a:endParaRPr lang="en-GB" sz="900" dirty="0"/>
+                    </a:p>
+                  </a:txBody>
+                  <a:tcPr marL="47781" marR="47781" marT="23890" marB="23890"/>
+                </a:tc>
+                <a:tc>
+                  <a:txBody>
+                    <a:bodyPr/>
+                    <a:lstStyle/>
+                    <a:p>
+                      <a:pPr algn="ctr"/>
+                      <a:r>
+                        <a:rPr lang="en-US" sz="900" dirty="0"/>
+                        <a:t>14</a:t>
+                      </a:r>
+                      <a:endParaRPr lang="en-GB" sz="900" dirty="0"/>
+                    </a:p>
+                  </a:txBody>
+                  <a:tcPr marL="47781" marR="47781" marT="23890" marB="23890"/>
+                </a:tc>
+                <a:tc>
+                  <a:txBody>
+                    <a:bodyPr/>
+                    <a:lstStyle/>
+                    <a:p>
+                      <a:pPr algn="ctr"/>
+                      <a:r>
+                        <a:rPr lang="en-US" sz="900" dirty="0"/>
+                        <a:t>14</a:t>
+                      </a:r>
+                      <a:endParaRPr lang="en-GB" sz="900" dirty="0"/>
+                    </a:p>
+                  </a:txBody>
+                  <a:tcPr marL="47781" marR="47781" marT="23890" marB="23890"/>
+                </a:tc>
+                <a:tc>
+                  <a:txBody>
+                    <a:bodyPr/>
+                    <a:lstStyle/>
+                    <a:p>
+                      <a:pPr algn="ctr"/>
+                      <a:r>
+                        <a:rPr lang="en-US" sz="900" dirty="0"/>
+                        <a:t>7</a:t>
+                      </a:r>
+                      <a:endParaRPr lang="en-GB" sz="900" dirty="0"/>
+                    </a:p>
+                  </a:txBody>
+                  <a:tcPr marL="47781" marR="47781" marT="23890" marB="23890"/>
+                </a:tc>
+                <a:tc>
+                  <a:txBody>
+                    <a:bodyPr/>
+                    <a:lstStyle/>
+                    <a:p>
+                      <a:pPr algn="ctr"/>
+                      <a:r>
+                        <a:rPr lang="en-US" sz="900" dirty="0"/>
+                        <a:t>6</a:t>
+                      </a:r>
+                      <a:endParaRPr lang="en-GB" sz="900" dirty="0"/>
+                    </a:p>
+                  </a:txBody>
+                  <a:tcPr marL="47781" marR="47781" marT="23890" marB="23890"/>
+                </a:tc>
+                <a:tc>
+                  <a:txBody>
+                    <a:bodyPr/>
+                    <a:lstStyle/>
+                    <a:p>
+                      <a:pPr algn="ctr"/>
+                      <a:r>
+                        <a:rPr lang="en-US" sz="900" dirty="0"/>
+                        <a:t>1</a:t>
+                      </a:r>
+                      <a:endParaRPr lang="en-GB" sz="900" dirty="0"/>
+                    </a:p>
+                  </a:txBody>
+                  <a:tcPr marL="47781" marR="47781" marT="23890" marB="23890"/>
+                </a:tc>
+                <a:tc>
+                  <a:txBody>
+                    <a:bodyPr/>
+                    <a:lstStyle/>
+                    <a:p>
+                      <a:pPr algn="ctr"/>
+                      <a:r>
+                        <a:rPr lang="en-US" sz="900" dirty="0"/>
+                        <a:t>1</a:t>
+                      </a:r>
+                      <a:endParaRPr lang="en-GB" sz="900" dirty="0"/>
+                    </a:p>
+                  </a:txBody>
+                  <a:tcPr marL="47781" marR="47781" marT="23890" marB="23890"/>
+                </a:tc>
+                <a:tc>
+                  <a:txBody>
+                    <a:bodyPr/>
+                    <a:lstStyle/>
+                    <a:p>
+                      <a:pPr algn="ctr"/>
+                      <a:r>
+                        <a:rPr lang="en-US" sz="900" dirty="0"/>
+                        <a:t>0</a:t>
+                      </a:r>
+                      <a:endParaRPr lang="en-GB" sz="900" dirty="0"/>
+                    </a:p>
+                  </a:txBody>
+                  <a:tcPr marL="47781" marR="47781" marT="23890" marB="23890"/>
+                </a:tc>
+                <a:tc>
+                  <a:txBody>
+                    <a:bodyPr/>
+                    <a:lstStyle/>
+                    <a:p>
+                      <a:pPr algn="ctr"/>
+                      <a:r>
+                        <a:rPr lang="en-US" sz="900" dirty="0"/>
+                        <a:t>0</a:t>
+                      </a:r>
+                      <a:endParaRPr lang="en-GB" sz="900" dirty="0"/>
+                    </a:p>
+                  </a:txBody>
+                  <a:tcPr marL="47781" marR="47781" marT="23890" marB="23890"/>
+                </a:tc>
+                <a:tc>
+                  <a:txBody>
+                    <a:bodyPr/>
+                    <a:lstStyle/>
+                    <a:p>
+                      <a:pPr algn="ctr"/>
+                      <a:r>
+                        <a:rPr lang="en-US" sz="900" dirty="0"/>
+                        <a:t>4</a:t>
+                      </a:r>
+                      <a:endParaRPr lang="en-GB" sz="900" dirty="0"/>
+                    </a:p>
+                  </a:txBody>
+                  <a:tcPr marL="47781" marR="47781" marT="23890" marB="23890"/>
+                </a:tc>
+                <a:extLst>
+                  <a:ext uri="{0D108BD9-81ED-4DB2-BD59-A6C34878D82A}">
+                    <a16:rowId xmlns:a16="http://schemas.microsoft.com/office/drawing/2014/main" val="2152054619"/>
+                  </a:ext>
+                </a:extLst>
+              </a:tr>
+            </a:tbl>
+          </a:graphicData>
+        </a:graphic>
+      </p:graphicFrame>
+    </p:spTree>
+    <p:extLst>
+      <p:ext uri="{BB962C8B-B14F-4D97-AF65-F5344CB8AC3E}">
+        <p14:creationId xmlns:p14="http://schemas.microsoft.com/office/powerpoint/2010/main" val="773567961"/>
+      </p:ext>
+    </p:extLst>
+  </p:cSld>
+  <p:clrMapOvr>
+    <a:masterClrMapping/>
+  </p:clrMapOvr>
+</p:sld>
+</file>
+
+<file path=ppt/slides/slide13.xml><?xml version="1.0" encoding="utf-8"?>
+<p:sld xmlns:a="http://schemas.openxmlformats.org/drawingml/2006/main" xmlns:r="http://schemas.openxmlformats.org/officeDocument/2006/relationships" xmlns:p="http://schemas.openxmlformats.org/presentationml/2006/main">
+  <p:cSld>
+    <p:spTree>
+      <p:nvGrpSpPr>
+        <p:cNvPr id="1" name=""/>
+        <p:cNvGrpSpPr/>
+        <p:nvPr/>
+      </p:nvGrpSpPr>
+      <p:grpSpPr>
+        <a:xfrm>
+          <a:off x="0" y="0"/>
+          <a:ext cx="0" cy="0"/>
+          <a:chOff x="0" y="0"/>
+          <a:chExt cx="0" cy="0"/>
+        </a:xfrm>
+      </p:grpSpPr>
+      <p:sp>
+        <p:nvSpPr>
+          <p:cNvPr id="2" name="Title 1">
+            <a:extLst>
+              <a:ext uri="{FF2B5EF4-FFF2-40B4-BE49-F238E27FC236}">
+                <a16:creationId xmlns:a16="http://schemas.microsoft.com/office/drawing/2014/main" id="{921633EB-7DCB-4DDC-80AF-C885A3EE1245}"/>
+              </a:ext>
+            </a:extLst>
+          </p:cNvPr>
+          <p:cNvSpPr>
+            <a:spLocks noGrp="1"/>
+          </p:cNvSpPr>
+          <p:nvPr>
+            <p:ph type="title"/>
+          </p:nvPr>
+        </p:nvSpPr>
+        <p:spPr/>
+        <p:txBody>
+          <a:bodyPr/>
+          <a:lstStyle/>
+          <a:p>
+            <a:r>
+              <a:rPr lang="en-US" dirty="0"/>
+              <a:t>Grade Data</a:t>
+            </a:r>
+          </a:p>
+        </p:txBody>
+      </p:sp>
+      <p:sp>
+        <p:nvSpPr>
+          <p:cNvPr id="4" name="Content Placeholder 3">
+            <a:extLst>
+              <a:ext uri="{FF2B5EF4-FFF2-40B4-BE49-F238E27FC236}">
+                <a16:creationId xmlns:a16="http://schemas.microsoft.com/office/drawing/2014/main" id="{15465504-73D4-37DA-85FF-7C8DD5BC71AF}"/>
+              </a:ext>
+            </a:extLst>
+          </p:cNvPr>
+          <p:cNvSpPr>
+            <a:spLocks noGrp="1"/>
+          </p:cNvSpPr>
+          <p:nvPr>
+            <p:ph sz="half" idx="1"/>
+          </p:nvPr>
+        </p:nvSpPr>
+        <p:spPr/>
+        <p:txBody>
+          <a:bodyPr/>
+          <a:lstStyle/>
+          <a:p>
+            <a:r>
+              <a:rPr lang="en-US" dirty="0"/>
+              <a:t>Larger number of students did not submit (both count and percentage of cohort size).</a:t>
+            </a:r>
+          </a:p>
+          <a:p>
+            <a:pPr lvl="1"/>
+            <a:r>
+              <a:rPr lang="en-US" dirty="0"/>
+              <a:t>Assignment and grading criteria are the same.</a:t>
+            </a:r>
+          </a:p>
+          <a:p>
+            <a:r>
+              <a:rPr lang="en-US" dirty="0"/>
+              <a:t>Total students: 63</a:t>
+            </a:r>
+          </a:p>
+        </p:txBody>
+      </p:sp>
+      <p:graphicFrame>
+        <p:nvGraphicFramePr>
+          <p:cNvPr id="13" name="Table 13">
+            <a:extLst>
+              <a:ext uri="{FF2B5EF4-FFF2-40B4-BE49-F238E27FC236}">
+                <a16:creationId xmlns:a16="http://schemas.microsoft.com/office/drawing/2014/main" id="{ADB90C79-1E2A-934C-4812-5B4609E89014}"/>
+              </a:ext>
+            </a:extLst>
+          </p:cNvPr>
+          <p:cNvGraphicFramePr>
+            <a:graphicFrameLocks noGrp="1"/>
+          </p:cNvGraphicFramePr>
+          <p:nvPr>
+            <p:extLst>
+              <p:ext uri="{D42A27DB-BD31-4B8C-83A1-F6EECF244321}">
+                <p14:modId xmlns:p14="http://schemas.microsoft.com/office/powerpoint/2010/main" val="1800925282"/>
+              </p:ext>
+            </p:extLst>
+          </p:nvPr>
+        </p:nvGraphicFramePr>
+        <p:xfrm>
+          <a:off x="6775934" y="2390845"/>
+          <a:ext cx="4247177" cy="387554"/>
+        </p:xfrm>
+        <a:graphic>
+          <a:graphicData uri="http://schemas.openxmlformats.org/drawingml/2006/table">
+            <a:tbl>
+              <a:tblPr firstRow="1" bandRow="1">
+                <a:tableStyleId>{5C22544A-7EE6-4342-B048-85BDC9FD1C3A}</a:tableStyleId>
+              </a:tblPr>
+              <a:tblGrid>
+                <a:gridCol w="386107">
+                  <a:extLst>
+                    <a:ext uri="{9D8B030D-6E8A-4147-A177-3AD203B41FA5}">
+                      <a16:colId xmlns:a16="http://schemas.microsoft.com/office/drawing/2014/main" val="2045186618"/>
+                    </a:ext>
+                  </a:extLst>
+                </a:gridCol>
+                <a:gridCol w="386107">
+                  <a:extLst>
+                    <a:ext uri="{9D8B030D-6E8A-4147-A177-3AD203B41FA5}">
+                      <a16:colId xmlns:a16="http://schemas.microsoft.com/office/drawing/2014/main" val="3608372454"/>
+                    </a:ext>
+                  </a:extLst>
+                </a:gridCol>
+                <a:gridCol w="386107">
+                  <a:extLst>
+                    <a:ext uri="{9D8B030D-6E8A-4147-A177-3AD203B41FA5}">
+                      <a16:colId xmlns:a16="http://schemas.microsoft.com/office/drawing/2014/main" val="363617069"/>
+                    </a:ext>
+                  </a:extLst>
+                </a:gridCol>
+                <a:gridCol w="386107">
+                  <a:extLst>
+                    <a:ext uri="{9D8B030D-6E8A-4147-A177-3AD203B41FA5}">
+                      <a16:colId xmlns:a16="http://schemas.microsoft.com/office/drawing/2014/main" val="4017101806"/>
+                    </a:ext>
+                  </a:extLst>
+                </a:gridCol>
+                <a:gridCol w="386107">
+                  <a:extLst>
+                    <a:ext uri="{9D8B030D-6E8A-4147-A177-3AD203B41FA5}">
+                      <a16:colId xmlns:a16="http://schemas.microsoft.com/office/drawing/2014/main" val="3206237433"/>
+                    </a:ext>
+                  </a:extLst>
+                </a:gridCol>
+                <a:gridCol w="386107">
+                  <a:extLst>
+                    <a:ext uri="{9D8B030D-6E8A-4147-A177-3AD203B41FA5}">
+                      <a16:colId xmlns:a16="http://schemas.microsoft.com/office/drawing/2014/main" val="2249127231"/>
+                    </a:ext>
+                  </a:extLst>
+                </a:gridCol>
+                <a:gridCol w="386107">
+                  <a:extLst>
+                    <a:ext uri="{9D8B030D-6E8A-4147-A177-3AD203B41FA5}">
+                      <a16:colId xmlns:a16="http://schemas.microsoft.com/office/drawing/2014/main" val="1705875377"/>
+                    </a:ext>
+                  </a:extLst>
+                </a:gridCol>
+                <a:gridCol w="386107">
+                  <a:extLst>
+                    <a:ext uri="{9D8B030D-6E8A-4147-A177-3AD203B41FA5}">
+                      <a16:colId xmlns:a16="http://schemas.microsoft.com/office/drawing/2014/main" val="2640942700"/>
+                    </a:ext>
+                  </a:extLst>
+                </a:gridCol>
+                <a:gridCol w="386107">
+                  <a:extLst>
+                    <a:ext uri="{9D8B030D-6E8A-4147-A177-3AD203B41FA5}">
+                      <a16:colId xmlns:a16="http://schemas.microsoft.com/office/drawing/2014/main" val="3178846657"/>
+                    </a:ext>
+                  </a:extLst>
+                </a:gridCol>
+                <a:gridCol w="386107">
+                  <a:extLst>
+                    <a:ext uri="{9D8B030D-6E8A-4147-A177-3AD203B41FA5}">
+                      <a16:colId xmlns:a16="http://schemas.microsoft.com/office/drawing/2014/main" val="1685616324"/>
+                    </a:ext>
+                  </a:extLst>
+                </a:gridCol>
+                <a:gridCol w="386107">
+                  <a:extLst>
+                    <a:ext uri="{9D8B030D-6E8A-4147-A177-3AD203B41FA5}">
+                      <a16:colId xmlns:a16="http://schemas.microsoft.com/office/drawing/2014/main" val="4264547713"/>
+                    </a:ext>
+                  </a:extLst>
+                </a:gridCol>
+              </a:tblGrid>
+              <a:tr h="193777">
+                <a:tc>
+                  <a:txBody>
+                    <a:bodyPr/>
+                    <a:lstStyle/>
+                    <a:p>
+                      <a:pPr algn="ctr"/>
+                      <a:r>
+                        <a:rPr lang="en-US" sz="900" dirty="0"/>
+                        <a:t>A+</a:t>
+                      </a:r>
+                      <a:endParaRPr lang="en-GB" sz="900" dirty="0"/>
+                    </a:p>
+                  </a:txBody>
+                  <a:tcPr marL="47781" marR="47781" marT="23890" marB="23890"/>
+                </a:tc>
+                <a:tc>
+                  <a:txBody>
+                    <a:bodyPr/>
+                    <a:lstStyle/>
+                    <a:p>
+                      <a:pPr algn="ctr"/>
+                      <a:r>
+                        <a:rPr lang="en-US" sz="900" dirty="0"/>
+                        <a:t>A</a:t>
+                      </a:r>
+                      <a:endParaRPr lang="en-GB" sz="900" dirty="0"/>
+                    </a:p>
+                  </a:txBody>
+                  <a:tcPr marL="47781" marR="47781" marT="23890" marB="23890"/>
+                </a:tc>
+                <a:tc>
+                  <a:txBody>
+                    <a:bodyPr/>
+                    <a:lstStyle/>
+                    <a:p>
+                      <a:pPr algn="ctr"/>
+                      <a:r>
+                        <a:rPr lang="en-US" sz="900" dirty="0"/>
+                        <a:t>B+ </a:t>
+                      </a:r>
+                      <a:endParaRPr lang="en-GB" sz="900" dirty="0"/>
+                    </a:p>
+                  </a:txBody>
+                  <a:tcPr marL="47781" marR="47781" marT="23890" marB="23890"/>
+                </a:tc>
+                <a:tc>
+                  <a:txBody>
+                    <a:bodyPr/>
+                    <a:lstStyle/>
+                    <a:p>
+                      <a:pPr algn="ctr"/>
+                      <a:r>
+                        <a:rPr lang="en-US" sz="900" dirty="0"/>
+                        <a:t>B</a:t>
+                      </a:r>
+                      <a:endParaRPr lang="en-GB" sz="900" dirty="0"/>
+                    </a:p>
+                  </a:txBody>
+                  <a:tcPr marL="47781" marR="47781" marT="23890" marB="23890"/>
+                </a:tc>
+                <a:tc>
+                  <a:txBody>
+                    <a:bodyPr/>
+                    <a:lstStyle/>
+                    <a:p>
+                      <a:pPr algn="ctr"/>
+                      <a:r>
+                        <a:rPr lang="en-US" sz="900" dirty="0"/>
+                        <a:t>C+</a:t>
+                      </a:r>
+                      <a:endParaRPr lang="en-GB" sz="900" dirty="0"/>
+                    </a:p>
+                  </a:txBody>
+                  <a:tcPr marL="47781" marR="47781" marT="23890" marB="23890"/>
+                </a:tc>
+                <a:tc>
+                  <a:txBody>
+                    <a:bodyPr/>
+                    <a:lstStyle/>
+                    <a:p>
+                      <a:pPr algn="ctr"/>
+                      <a:r>
+                        <a:rPr lang="en-US" sz="900" dirty="0"/>
+                        <a:t>C</a:t>
+                      </a:r>
+                      <a:endParaRPr lang="en-GB" sz="900" dirty="0"/>
+                    </a:p>
+                  </a:txBody>
+                  <a:tcPr marL="47781" marR="47781" marT="23890" marB="23890"/>
+                </a:tc>
+                <a:tc>
+                  <a:txBody>
+                    <a:bodyPr/>
+                    <a:lstStyle/>
+                    <a:p>
+                      <a:pPr algn="ctr"/>
+                      <a:r>
+                        <a:rPr lang="en-US" sz="900" dirty="0"/>
+                        <a:t>D+</a:t>
+                      </a:r>
+                      <a:endParaRPr lang="en-GB" sz="900" dirty="0"/>
+                    </a:p>
+                  </a:txBody>
+                  <a:tcPr marL="47781" marR="47781" marT="23890" marB="23890"/>
+                </a:tc>
+                <a:tc>
+                  <a:txBody>
+                    <a:bodyPr/>
+                    <a:lstStyle/>
+                    <a:p>
+                      <a:pPr algn="ctr"/>
+                      <a:r>
+                        <a:rPr lang="en-US" sz="900" dirty="0"/>
+                        <a:t>D</a:t>
+                      </a:r>
+                      <a:endParaRPr lang="en-GB" sz="900" dirty="0"/>
+                    </a:p>
+                  </a:txBody>
+                  <a:tcPr marL="47781" marR="47781" marT="23890" marB="23890"/>
+                </a:tc>
+                <a:tc>
+                  <a:txBody>
+                    <a:bodyPr/>
+                    <a:lstStyle/>
+                    <a:p>
+                      <a:pPr algn="ctr"/>
+                      <a:r>
+                        <a:rPr lang="en-US" sz="900" dirty="0"/>
+                        <a:t>MF</a:t>
+                      </a:r>
+                      <a:endParaRPr lang="en-GB" sz="900" dirty="0"/>
+                    </a:p>
+                  </a:txBody>
+                  <a:tcPr marL="47781" marR="47781" marT="23890" marB="23890"/>
+                </a:tc>
+                <a:tc>
+                  <a:txBody>
+                    <a:bodyPr/>
+                    <a:lstStyle/>
+                    <a:p>
+                      <a:pPr algn="ctr"/>
+                      <a:r>
+                        <a:rPr lang="en-US" sz="900" dirty="0"/>
+                        <a:t>F</a:t>
+                      </a:r>
+                      <a:endParaRPr lang="en-GB" sz="900" dirty="0"/>
+                    </a:p>
+                  </a:txBody>
+                  <a:tcPr marL="47781" marR="47781" marT="23890" marB="23890"/>
+                </a:tc>
+                <a:tc>
+                  <a:txBody>
+                    <a:bodyPr/>
+                    <a:lstStyle/>
+                    <a:p>
+                      <a:pPr algn="ctr"/>
+                      <a:r>
+                        <a:rPr lang="en-US" sz="900" dirty="0"/>
+                        <a:t>NS</a:t>
+                      </a:r>
+                      <a:endParaRPr lang="en-GB" sz="900" dirty="0"/>
+                    </a:p>
+                  </a:txBody>
+                  <a:tcPr marL="47781" marR="47781" marT="23890" marB="23890"/>
+                </a:tc>
+                <a:extLst>
+                  <a:ext uri="{0D108BD9-81ED-4DB2-BD59-A6C34878D82A}">
+                    <a16:rowId xmlns:a16="http://schemas.microsoft.com/office/drawing/2014/main" val="2082677582"/>
+                  </a:ext>
+                </a:extLst>
+              </a:tr>
+              <a:tr h="193777">
+                <a:tc>
+                  <a:txBody>
+                    <a:bodyPr/>
+                    <a:lstStyle/>
+                    <a:p>
+                      <a:pPr algn="ctr"/>
+                      <a:r>
+                        <a:rPr lang="en-US" sz="900" dirty="0"/>
+                        <a:t>3</a:t>
+                      </a:r>
+                      <a:endParaRPr lang="en-GB" sz="900" dirty="0"/>
+                    </a:p>
+                  </a:txBody>
+                  <a:tcPr marL="47781" marR="47781" marT="23890" marB="23890"/>
+                </a:tc>
+                <a:tc>
+                  <a:txBody>
+                    <a:bodyPr/>
+                    <a:lstStyle/>
+                    <a:p>
+                      <a:pPr algn="ctr"/>
+                      <a:r>
+                        <a:rPr lang="en-US" sz="900" dirty="0"/>
+                        <a:t>5</a:t>
+                      </a:r>
+                      <a:endParaRPr lang="en-GB" sz="900" dirty="0"/>
+                    </a:p>
+                  </a:txBody>
+                  <a:tcPr marL="47781" marR="47781" marT="23890" marB="23890"/>
+                </a:tc>
+                <a:tc>
+                  <a:txBody>
+                    <a:bodyPr/>
+                    <a:lstStyle/>
+                    <a:p>
+                      <a:pPr algn="ctr"/>
+                      <a:r>
+                        <a:rPr lang="en-US" sz="900" dirty="0"/>
+                        <a:t>5</a:t>
+                      </a:r>
+                      <a:endParaRPr lang="en-GB" sz="900" dirty="0"/>
+                    </a:p>
+                  </a:txBody>
+                  <a:tcPr marL="47781" marR="47781" marT="23890" marB="23890"/>
+                </a:tc>
+                <a:tc>
+                  <a:txBody>
+                    <a:bodyPr/>
+                    <a:lstStyle/>
+                    <a:p>
+                      <a:pPr algn="ctr"/>
+                      <a:r>
+                        <a:rPr lang="en-US" sz="900" dirty="0"/>
+                        <a:t>12</a:t>
+                      </a:r>
+                      <a:endParaRPr lang="en-GB" sz="900" dirty="0"/>
+                    </a:p>
+                  </a:txBody>
+                  <a:tcPr marL="47781" marR="47781" marT="23890" marB="23890"/>
+                </a:tc>
+                <a:tc>
+                  <a:txBody>
+                    <a:bodyPr/>
+                    <a:lstStyle/>
+                    <a:p>
+                      <a:pPr algn="ctr"/>
+                      <a:r>
+                        <a:rPr lang="en-US" sz="900" dirty="0"/>
+                        <a:t>7</a:t>
+                      </a:r>
+                      <a:endParaRPr lang="en-GB" sz="900" dirty="0"/>
+                    </a:p>
+                  </a:txBody>
+                  <a:tcPr marL="47781" marR="47781" marT="23890" marB="23890"/>
+                </a:tc>
+                <a:tc>
+                  <a:txBody>
+                    <a:bodyPr/>
+                    <a:lstStyle/>
+                    <a:p>
+                      <a:pPr algn="ctr"/>
+                      <a:r>
+                        <a:rPr lang="en-US" sz="900" dirty="0"/>
+                        <a:t>9</a:t>
+                      </a:r>
+                      <a:endParaRPr lang="en-GB" sz="900" dirty="0"/>
+                    </a:p>
+                  </a:txBody>
+                  <a:tcPr marL="47781" marR="47781" marT="23890" marB="23890"/>
+                </a:tc>
+                <a:tc>
+                  <a:txBody>
+                    <a:bodyPr/>
+                    <a:lstStyle/>
+                    <a:p>
+                      <a:pPr algn="ctr"/>
+                      <a:r>
+                        <a:rPr lang="en-US" sz="900" dirty="0"/>
+                        <a:t>2</a:t>
+                      </a:r>
+                      <a:endParaRPr lang="en-GB" sz="900" dirty="0"/>
+                    </a:p>
+                  </a:txBody>
+                  <a:tcPr marL="47781" marR="47781" marT="23890" marB="23890"/>
+                </a:tc>
+                <a:tc>
+                  <a:txBody>
+                    <a:bodyPr/>
+                    <a:lstStyle/>
+                    <a:p>
+                      <a:pPr algn="ctr"/>
+                      <a:r>
+                        <a:rPr lang="en-US" sz="900" dirty="0"/>
+                        <a:t>0</a:t>
+                      </a:r>
+                      <a:endParaRPr lang="en-GB" sz="900" dirty="0"/>
+                    </a:p>
+                  </a:txBody>
+                  <a:tcPr marL="47781" marR="47781" marT="23890" marB="23890"/>
+                </a:tc>
+                <a:tc>
+                  <a:txBody>
+                    <a:bodyPr/>
+                    <a:lstStyle/>
+                    <a:p>
+                      <a:pPr algn="ctr"/>
+                      <a:r>
+                        <a:rPr lang="en-US" sz="900" dirty="0"/>
+                        <a:t>8</a:t>
+                      </a:r>
+                      <a:endParaRPr lang="en-GB" sz="900" dirty="0"/>
+                    </a:p>
+                  </a:txBody>
+                  <a:tcPr marL="47781" marR="47781" marT="23890" marB="23890"/>
+                </a:tc>
+                <a:tc>
+                  <a:txBody>
+                    <a:bodyPr/>
+                    <a:lstStyle/>
+                    <a:p>
+                      <a:pPr algn="ctr"/>
+                      <a:r>
+                        <a:rPr lang="en-US" sz="900" dirty="0"/>
+                        <a:t>1</a:t>
+                      </a:r>
+                      <a:endParaRPr lang="en-GB" sz="900" dirty="0"/>
+                    </a:p>
+                  </a:txBody>
+                  <a:tcPr marL="47781" marR="47781" marT="23890" marB="23890"/>
+                </a:tc>
+                <a:tc>
+                  <a:txBody>
+                    <a:bodyPr/>
+                    <a:lstStyle/>
+                    <a:p>
+                      <a:pPr algn="ctr"/>
+                      <a:r>
+                        <a:rPr lang="en-US" sz="900" dirty="0"/>
+                        <a:t>11</a:t>
+                      </a:r>
+                      <a:endParaRPr lang="en-GB" sz="900" dirty="0"/>
+                    </a:p>
+                  </a:txBody>
+                  <a:tcPr marL="47781" marR="47781" marT="23890" marB="23890"/>
+                </a:tc>
+                <a:extLst>
+                  <a:ext uri="{0D108BD9-81ED-4DB2-BD59-A6C34878D82A}">
+                    <a16:rowId xmlns:a16="http://schemas.microsoft.com/office/drawing/2014/main" val="2152054619"/>
+                  </a:ext>
+                </a:extLst>
+              </a:tr>
+            </a:tbl>
+          </a:graphicData>
+        </a:graphic>
+      </p:graphicFrame>
+      <p:pic>
+        <p:nvPicPr>
+          <p:cNvPr id="7" name="Content Placeholder 6" descr="A picture containing text, diagram, screenshot, font&#10;&#10;Description automatically generated">
+            <a:extLst>
+              <a:ext uri="{FF2B5EF4-FFF2-40B4-BE49-F238E27FC236}">
+                <a16:creationId xmlns:a16="http://schemas.microsoft.com/office/drawing/2014/main" id="{8CB82672-6C0C-2DD9-0134-D81AB5BC54B2}"/>
+              </a:ext>
+            </a:extLst>
+          </p:cNvPr>
+          <p:cNvPicPr>
+            <a:picLocks noGrp="1" noChangeAspect="1"/>
+          </p:cNvPicPr>
+          <p:nvPr>
+            <p:ph sz="half" idx="2"/>
+          </p:nvPr>
+        </p:nvPicPr>
+        <p:blipFill>
+          <a:blip r:embed="rId2"/>
+          <a:stretch>
+            <a:fillRect/>
+          </a:stretch>
+        </p:blipFill>
+        <p:spPr>
+          <a:xfrm>
+            <a:off x="7082631" y="2940328"/>
+            <a:ext cx="3633787" cy="3633787"/>
+          </a:xfrm>
+        </p:spPr>
+      </p:pic>
+    </p:spTree>
+    <p:extLst>
+      <p:ext uri="{BB962C8B-B14F-4D97-AF65-F5344CB8AC3E}">
+        <p14:creationId xmlns:p14="http://schemas.microsoft.com/office/powerpoint/2010/main" val="1582912122"/>
+      </p:ext>
+    </p:extLst>
+  </p:cSld>
+  <p:clrMapOvr>
+    <a:masterClrMapping/>
+  </p:clrMapOvr>
+</p:sld>
+</file>
+
+<file path=ppt/slides/slide14.xml><?xml version="1.0" encoding="utf-8"?>
+<p:sld xmlns:a="http://schemas.openxmlformats.org/drawingml/2006/main" xmlns:r="http://schemas.openxmlformats.org/officeDocument/2006/relationships" xmlns:p="http://schemas.openxmlformats.org/presentationml/2006/main">
+  <p:cSld>
+    <p:spTree>
+      <p:nvGrpSpPr>
+        <p:cNvPr id="1" name=""/>
+        <p:cNvGrpSpPr/>
+        <p:nvPr/>
+      </p:nvGrpSpPr>
+      <p:grpSpPr>
+        <a:xfrm>
+          <a:off x="0" y="0"/>
+          <a:ext cx="0" cy="0"/>
+          <a:chOff x="0" y="0"/>
+          <a:chExt cx="0" cy="0"/>
+        </a:xfrm>
+      </p:grpSpPr>
+      <p:sp>
+        <p:nvSpPr>
+          <p:cNvPr id="2" name="Title 1">
+            <a:extLst>
+              <a:ext uri="{FF2B5EF4-FFF2-40B4-BE49-F238E27FC236}">
+                <a16:creationId xmlns:a16="http://schemas.microsoft.com/office/drawing/2014/main" id="{921633EB-7DCB-4DDC-80AF-C885A3EE1245}"/>
+              </a:ext>
+            </a:extLst>
+          </p:cNvPr>
+          <p:cNvSpPr>
+            <a:spLocks noGrp="1"/>
+          </p:cNvSpPr>
+          <p:nvPr>
+            <p:ph type="title"/>
+          </p:nvPr>
+        </p:nvSpPr>
+        <p:spPr/>
+        <p:txBody>
+          <a:bodyPr/>
+          <a:lstStyle/>
+          <a:p>
+            <a:r>
+              <a:rPr lang="en-US" dirty="0"/>
+              <a:t>Attendance Data</a:t>
+            </a:r>
+          </a:p>
+        </p:txBody>
+      </p:sp>
+      <p:sp>
+        <p:nvSpPr>
+          <p:cNvPr id="4" name="Content Placeholder 3">
+            <a:extLst>
+              <a:ext uri="{FF2B5EF4-FFF2-40B4-BE49-F238E27FC236}">
+                <a16:creationId xmlns:a16="http://schemas.microsoft.com/office/drawing/2014/main" id="{42D5E002-1C68-0A1B-39F4-AD4EA6416E54}"/>
+              </a:ext>
+            </a:extLst>
+          </p:cNvPr>
+          <p:cNvSpPr>
+            <a:spLocks noGrp="1"/>
+          </p:cNvSpPr>
+          <p:nvPr>
+            <p:ph sz="half" idx="1"/>
+          </p:nvPr>
+        </p:nvSpPr>
+        <p:spPr/>
+        <p:txBody>
+          <a:bodyPr/>
+          <a:lstStyle/>
+          <a:p>
+            <a:r>
+              <a:rPr lang="en-US" dirty="0"/>
+              <a:t>Attendance Percentage for last two years.</a:t>
+            </a:r>
+          </a:p>
+          <a:p>
+            <a:r>
+              <a:rPr lang="en-US" dirty="0"/>
+              <a:t>General attendance to practical's and lectures has increased.</a:t>
+            </a:r>
+          </a:p>
+        </p:txBody>
+      </p:sp>
+      <p:pic>
+        <p:nvPicPr>
+          <p:cNvPr id="8" name="Content Placeholder 7">
+            <a:extLst>
+              <a:ext uri="{FF2B5EF4-FFF2-40B4-BE49-F238E27FC236}">
+                <a16:creationId xmlns:a16="http://schemas.microsoft.com/office/drawing/2014/main" id="{42651790-8BAE-6A96-CED7-AB08B5AEAF8A}"/>
+              </a:ext>
+            </a:extLst>
+          </p:cNvPr>
+          <p:cNvPicPr>
+            <a:picLocks noGrp="1" noChangeAspect="1"/>
+          </p:cNvPicPr>
+          <p:nvPr>
+            <p:ph sz="half" idx="2"/>
+          </p:nvPr>
+        </p:nvPicPr>
+        <p:blipFill>
+          <a:blip r:embed="rId2"/>
+          <a:srcRect/>
+          <a:stretch/>
+        </p:blipFill>
+        <p:spPr>
+          <a:xfrm>
+            <a:off x="6188419" y="2017635"/>
+            <a:ext cx="4840365" cy="4840365"/>
+          </a:xfrm>
+        </p:spPr>
+      </p:pic>
+    </p:spTree>
+    <p:extLst>
+      <p:ext uri="{BB962C8B-B14F-4D97-AF65-F5344CB8AC3E}">
+        <p14:creationId xmlns:p14="http://schemas.microsoft.com/office/powerpoint/2010/main" val="1494101873"/>
+      </p:ext>
+    </p:extLst>
+  </p:cSld>
+  <p:clrMapOvr>
+    <a:masterClrMapping/>
+  </p:clrMapOvr>
+</p:sld>
+</file>
+
+<file path=ppt/slides/slide15.xml><?xml version="1.0" encoding="utf-8"?>
+<p:sld xmlns:a="http://schemas.openxmlformats.org/drawingml/2006/main" xmlns:r="http://schemas.openxmlformats.org/officeDocument/2006/relationships" xmlns:p="http://schemas.openxmlformats.org/presentationml/2006/main">
+  <p:cSld>
+    <p:spTree>
+      <p:nvGrpSpPr>
+        <p:cNvPr id="1" name=""/>
+        <p:cNvGrpSpPr/>
+        <p:nvPr/>
+      </p:nvGrpSpPr>
+      <p:grpSpPr>
+        <a:xfrm>
+          <a:off x="0" y="0"/>
+          <a:ext cx="0" cy="0"/>
+          <a:chOff x="0" y="0"/>
+          <a:chExt cx="0" cy="0"/>
+        </a:xfrm>
+      </p:grpSpPr>
+      <p:sp>
+        <p:nvSpPr>
+          <p:cNvPr id="2" name="Title 1">
+            <a:extLst>
+              <a:ext uri="{FF2B5EF4-FFF2-40B4-BE49-F238E27FC236}">
+                <a16:creationId xmlns:a16="http://schemas.microsoft.com/office/drawing/2014/main" id="{921633EB-7DCB-4DDC-80AF-C885A3EE1245}"/>
+              </a:ext>
+            </a:extLst>
+          </p:cNvPr>
+          <p:cNvSpPr>
+            <a:spLocks noGrp="1"/>
+          </p:cNvSpPr>
+          <p:nvPr>
+            <p:ph type="title"/>
+          </p:nvPr>
+        </p:nvSpPr>
+        <p:spPr/>
+        <p:txBody>
+          <a:bodyPr/>
+          <a:lstStyle/>
+          <a:p>
+            <a:r>
+              <a:rPr lang="en-US" dirty="0"/>
+              <a:t>Attendance Data</a:t>
+            </a:r>
+          </a:p>
+        </p:txBody>
+      </p:sp>
+      <p:sp>
+        <p:nvSpPr>
+          <p:cNvPr id="4" name="Content Placeholder 3">
+            <a:extLst>
+              <a:ext uri="{FF2B5EF4-FFF2-40B4-BE49-F238E27FC236}">
+                <a16:creationId xmlns:a16="http://schemas.microsoft.com/office/drawing/2014/main" id="{42D5E002-1C68-0A1B-39F4-AD4EA6416E54}"/>
+              </a:ext>
+            </a:extLst>
+          </p:cNvPr>
+          <p:cNvSpPr>
+            <a:spLocks noGrp="1"/>
+          </p:cNvSpPr>
+          <p:nvPr>
+            <p:ph sz="half" idx="1"/>
+          </p:nvPr>
+        </p:nvSpPr>
+        <p:spPr/>
+        <p:txBody>
+          <a:bodyPr/>
+          <a:lstStyle/>
+          <a:p>
+            <a:r>
+              <a:rPr lang="en-US" dirty="0"/>
+              <a:t>Low attendance has decreased, higher rates of attendance have increased.</a:t>
+            </a:r>
+          </a:p>
+          <a:p>
+            <a:r>
+              <a:rPr lang="en-US" dirty="0"/>
+              <a:t>Comparing with grades, appears to be a decrease in grade score despite the increase in attendance in comparison to the last year.</a:t>
+            </a:r>
+          </a:p>
+        </p:txBody>
+      </p:sp>
+      <p:pic>
+        <p:nvPicPr>
+          <p:cNvPr id="8" name="Content Placeholder 7">
+            <a:extLst>
+              <a:ext uri="{FF2B5EF4-FFF2-40B4-BE49-F238E27FC236}">
+                <a16:creationId xmlns:a16="http://schemas.microsoft.com/office/drawing/2014/main" id="{42651790-8BAE-6A96-CED7-AB08B5AEAF8A}"/>
+              </a:ext>
+            </a:extLst>
+          </p:cNvPr>
+          <p:cNvPicPr>
+            <a:picLocks noGrp="1" noChangeAspect="1"/>
+          </p:cNvPicPr>
+          <p:nvPr>
+            <p:ph sz="half" idx="2"/>
+          </p:nvPr>
+        </p:nvPicPr>
+        <p:blipFill>
+          <a:blip r:embed="rId2"/>
+          <a:srcRect/>
+          <a:stretch/>
+        </p:blipFill>
+        <p:spPr>
+          <a:xfrm>
+            <a:off x="6188419" y="2017635"/>
+            <a:ext cx="4840365" cy="4840365"/>
+          </a:xfrm>
+        </p:spPr>
+      </p:pic>
+    </p:spTree>
+    <p:extLst>
+      <p:ext uri="{BB962C8B-B14F-4D97-AF65-F5344CB8AC3E}">
+        <p14:creationId xmlns:p14="http://schemas.microsoft.com/office/powerpoint/2010/main" val="2290029014"/>
+      </p:ext>
+    </p:extLst>
+  </p:cSld>
+  <p:clrMapOvr>
+    <a:masterClrMapping/>
+  </p:clrMapOvr>
+</p:sld>
+</file>
+
+<file path=ppt/slides/slide16.xml><?xml version="1.0" encoding="utf-8"?>
+<p:sld xmlns:a="http://schemas.openxmlformats.org/drawingml/2006/main" xmlns:r="http://schemas.openxmlformats.org/officeDocument/2006/relationships" xmlns:p="http://schemas.openxmlformats.org/presentationml/2006/main">
+  <p:cSld>
+    <p:spTree>
+      <p:nvGrpSpPr>
+        <p:cNvPr id="1" name=""/>
+        <p:cNvGrpSpPr/>
+        <p:nvPr/>
+      </p:nvGrpSpPr>
+      <p:grpSpPr>
+        <a:xfrm>
+          <a:off x="0" y="0"/>
+          <a:ext cx="0" cy="0"/>
+          <a:chOff x="0" y="0"/>
+          <a:chExt cx="0" cy="0"/>
+        </a:xfrm>
+      </p:grpSpPr>
+      <p:sp>
+        <p:nvSpPr>
+          <p:cNvPr id="2" name="Title 1">
+            <a:extLst>
+              <a:ext uri="{FF2B5EF4-FFF2-40B4-BE49-F238E27FC236}">
+                <a16:creationId xmlns:a16="http://schemas.microsoft.com/office/drawing/2014/main" id="{921633EB-7DCB-4DDC-80AF-C885A3EE1245}"/>
+              </a:ext>
+            </a:extLst>
+          </p:cNvPr>
+          <p:cNvSpPr>
+            <a:spLocks noGrp="1"/>
+          </p:cNvSpPr>
+          <p:nvPr>
+            <p:ph type="title"/>
+          </p:nvPr>
+        </p:nvSpPr>
+        <p:spPr/>
+        <p:txBody>
+          <a:bodyPr/>
+          <a:lstStyle/>
+          <a:p>
+            <a:r>
+              <a:rPr lang="en-US" dirty="0"/>
+              <a:t>Attendance Data - Lectures</a:t>
+            </a:r>
+          </a:p>
+        </p:txBody>
+      </p:sp>
+      <p:sp>
+        <p:nvSpPr>
+          <p:cNvPr id="4" name="Content Placeholder 3">
+            <a:extLst>
+              <a:ext uri="{FF2B5EF4-FFF2-40B4-BE49-F238E27FC236}">
+                <a16:creationId xmlns:a16="http://schemas.microsoft.com/office/drawing/2014/main" id="{42D5E002-1C68-0A1B-39F4-AD4EA6416E54}"/>
+              </a:ext>
+            </a:extLst>
+          </p:cNvPr>
+          <p:cNvSpPr>
+            <a:spLocks noGrp="1"/>
+          </p:cNvSpPr>
+          <p:nvPr>
+            <p:ph sz="half" idx="1"/>
+          </p:nvPr>
+        </p:nvSpPr>
+        <p:spPr/>
+        <p:txBody>
+          <a:bodyPr/>
+          <a:lstStyle/>
+          <a:p>
+            <a:r>
+              <a:rPr lang="en-US" dirty="0"/>
+              <a:t>Low attendance has decreased, higher rates of attendance have increased.</a:t>
+            </a:r>
+          </a:p>
+          <a:p>
+            <a:r>
+              <a:rPr lang="en-US" dirty="0"/>
+              <a:t>Comparing with grades, appears to be a decrease in grade score despite the increase in attendance in comparison to the last year.</a:t>
+            </a:r>
+          </a:p>
+        </p:txBody>
+      </p:sp>
+      <p:pic>
+        <p:nvPicPr>
+          <p:cNvPr id="8" name="Content Placeholder 7">
+            <a:extLst>
+              <a:ext uri="{FF2B5EF4-FFF2-40B4-BE49-F238E27FC236}">
+                <a16:creationId xmlns:a16="http://schemas.microsoft.com/office/drawing/2014/main" id="{42651790-8BAE-6A96-CED7-AB08B5AEAF8A}"/>
+              </a:ext>
+            </a:extLst>
+          </p:cNvPr>
+          <p:cNvPicPr>
+            <a:picLocks noGrp="1" noChangeAspect="1"/>
+          </p:cNvPicPr>
+          <p:nvPr>
+            <p:ph sz="half" idx="2"/>
+          </p:nvPr>
+        </p:nvPicPr>
+        <p:blipFill>
+          <a:blip r:embed="rId2"/>
+          <a:srcRect/>
+          <a:stretch/>
+        </p:blipFill>
+        <p:spPr>
+          <a:xfrm>
+            <a:off x="6188419" y="2017635"/>
+            <a:ext cx="4840365" cy="4840365"/>
+          </a:xfrm>
+        </p:spPr>
+      </p:pic>
+    </p:spTree>
+    <p:extLst>
+      <p:ext uri="{BB962C8B-B14F-4D97-AF65-F5344CB8AC3E}">
+        <p14:creationId xmlns:p14="http://schemas.microsoft.com/office/powerpoint/2010/main" val="581795780"/>
+      </p:ext>
+    </p:extLst>
+  </p:cSld>
+  <p:clrMapOvr>
+    <a:masterClrMapping/>
+  </p:clrMapOvr>
+</p:sld>
+</file>
+
+<file path=ppt/slides/slide17.xml><?xml version="1.0" encoding="utf-8"?>
+<p:sld xmlns:a="http://schemas.openxmlformats.org/drawingml/2006/main" xmlns:r="http://schemas.openxmlformats.org/officeDocument/2006/relationships" xmlns:p="http://schemas.openxmlformats.org/presentationml/2006/main">
+  <p:cSld>
+    <p:spTree>
+      <p:nvGrpSpPr>
+        <p:cNvPr id="1" name=""/>
+        <p:cNvGrpSpPr/>
+        <p:nvPr/>
+      </p:nvGrpSpPr>
+      <p:grpSpPr>
+        <a:xfrm>
+          <a:off x="0" y="0"/>
+          <a:ext cx="0" cy="0"/>
+          <a:chOff x="0" y="0"/>
+          <a:chExt cx="0" cy="0"/>
+        </a:xfrm>
+      </p:grpSpPr>
+      <p:sp>
+        <p:nvSpPr>
+          <p:cNvPr id="2" name="Title 1">
+            <a:extLst>
+              <a:ext uri="{FF2B5EF4-FFF2-40B4-BE49-F238E27FC236}">
+                <a16:creationId xmlns:a16="http://schemas.microsoft.com/office/drawing/2014/main" id="{921633EB-7DCB-4DDC-80AF-C885A3EE1245}"/>
+              </a:ext>
+            </a:extLst>
+          </p:cNvPr>
+          <p:cNvSpPr>
+            <a:spLocks noGrp="1"/>
+          </p:cNvSpPr>
+          <p:nvPr>
+            <p:ph type="title"/>
+          </p:nvPr>
+        </p:nvSpPr>
+        <p:spPr/>
+        <p:txBody>
+          <a:bodyPr/>
+          <a:lstStyle/>
+          <a:p>
+            <a:r>
+              <a:rPr lang="en-US" dirty="0"/>
+              <a:t>Attendance Data - Practical's</a:t>
+            </a:r>
+          </a:p>
+        </p:txBody>
+      </p:sp>
+      <p:sp>
+        <p:nvSpPr>
+          <p:cNvPr id="4" name="Content Placeholder 3">
+            <a:extLst>
+              <a:ext uri="{FF2B5EF4-FFF2-40B4-BE49-F238E27FC236}">
+                <a16:creationId xmlns:a16="http://schemas.microsoft.com/office/drawing/2014/main" id="{42D5E002-1C68-0A1B-39F4-AD4EA6416E54}"/>
+              </a:ext>
+            </a:extLst>
+          </p:cNvPr>
+          <p:cNvSpPr>
+            <a:spLocks noGrp="1"/>
+          </p:cNvSpPr>
+          <p:nvPr>
+            <p:ph sz="half" idx="1"/>
+          </p:nvPr>
+        </p:nvSpPr>
+        <p:spPr/>
+        <p:txBody>
+          <a:bodyPr/>
+          <a:lstStyle/>
+          <a:p>
+            <a:r>
+              <a:rPr lang="en-US" dirty="0"/>
+              <a:t>Low attendance has decreased, higher rates of attendance have increased.</a:t>
+            </a:r>
+          </a:p>
+          <a:p>
+            <a:r>
+              <a:rPr lang="en-US" dirty="0"/>
+              <a:t>Comparing with grades, appears to be a decrease in grade score despite the increase in attendance in comparison to the last year.</a:t>
+            </a:r>
+          </a:p>
+        </p:txBody>
+      </p:sp>
+      <p:pic>
+        <p:nvPicPr>
+          <p:cNvPr id="8" name="Content Placeholder 7">
+            <a:extLst>
+              <a:ext uri="{FF2B5EF4-FFF2-40B4-BE49-F238E27FC236}">
+                <a16:creationId xmlns:a16="http://schemas.microsoft.com/office/drawing/2014/main" id="{42651790-8BAE-6A96-CED7-AB08B5AEAF8A}"/>
+              </a:ext>
+            </a:extLst>
+          </p:cNvPr>
+          <p:cNvPicPr>
+            <a:picLocks noGrp="1" noChangeAspect="1"/>
+          </p:cNvPicPr>
+          <p:nvPr>
+            <p:ph sz="half" idx="2"/>
+          </p:nvPr>
+        </p:nvPicPr>
+        <p:blipFill>
+          <a:blip r:embed="rId2"/>
+          <a:srcRect/>
+          <a:stretch/>
+        </p:blipFill>
+        <p:spPr>
+          <a:xfrm>
+            <a:off x="6188419" y="2017635"/>
+            <a:ext cx="4840365" cy="4840365"/>
+          </a:xfrm>
+        </p:spPr>
+      </p:pic>
+    </p:spTree>
+    <p:extLst>
+      <p:ext uri="{BB962C8B-B14F-4D97-AF65-F5344CB8AC3E}">
+        <p14:creationId xmlns:p14="http://schemas.microsoft.com/office/powerpoint/2010/main" val="687847675"/>
+      </p:ext>
+    </p:extLst>
+  </p:cSld>
+  <p:clrMapOvr>
+    <a:masterClrMapping/>
+  </p:clrMapOvr>
+</p:sld>
+</file>
+
+<file path=ppt/slides/slide18.xml><?xml version="1.0" encoding="utf-8"?>
+<p:sld xmlns:a="http://schemas.openxmlformats.org/drawingml/2006/main" xmlns:r="http://schemas.openxmlformats.org/officeDocument/2006/relationships" xmlns:p="http://schemas.openxmlformats.org/presentationml/2006/main">
+  <p:cSld>
     <p:bg>
       <p:bgPr>
         <a:solidFill>
@@ -12081,7 +14045,7 @@
             <a:pPr algn="ctr"/>
             <a:r>
               <a:rPr lang="en-US" dirty="0"/>
-              <a:t>Digital Communications</a:t>
+              <a:t>Further Development</a:t>
             </a:r>
           </a:p>
         </p:txBody>
@@ -12102,7 +14066,7 @@
             <p:ph idx="1"/>
             <p:extLst>
               <p:ext uri="{D42A27DB-BD31-4B8C-83A1-F6EECF244321}">
-                <p14:modId xmlns:p14="http://schemas.microsoft.com/office/powerpoint/2010/main" val="3961337641"/>
+                <p14:modId xmlns:p14="http://schemas.microsoft.com/office/powerpoint/2010/main" val="3931224430"/>
               </p:ext>
             </p:extLst>
           </p:nvPr>
@@ -12130,7 +14094,307 @@
 </p:sld>
 </file>
 
-<file path=ppt/slides/slide11.xml><?xml version="1.0" encoding="utf-8"?>
+<file path=ppt/slides/slide19.xml><?xml version="1.0" encoding="utf-8"?>
+<p:sld xmlns:a="http://schemas.openxmlformats.org/drawingml/2006/main" xmlns:r="http://schemas.openxmlformats.org/officeDocument/2006/relationships" xmlns:p="http://schemas.openxmlformats.org/presentationml/2006/main">
+  <p:cSld>
+    <p:spTree>
+      <p:nvGrpSpPr>
+        <p:cNvPr id="1" name=""/>
+        <p:cNvGrpSpPr/>
+        <p:nvPr/>
+      </p:nvGrpSpPr>
+      <p:grpSpPr>
+        <a:xfrm>
+          <a:off x="0" y="0"/>
+          <a:ext cx="0" cy="0"/>
+          <a:chOff x="0" y="0"/>
+          <a:chExt cx="0" cy="0"/>
+        </a:xfrm>
+      </p:grpSpPr>
+      <p:sp>
+        <p:nvSpPr>
+          <p:cNvPr id="2" name="Title 1">
+            <a:extLst>
+              <a:ext uri="{FF2B5EF4-FFF2-40B4-BE49-F238E27FC236}">
+                <a16:creationId xmlns:a16="http://schemas.microsoft.com/office/drawing/2014/main" id="{893057A3-A04F-232F-0FAC-02C377A544EC}"/>
+              </a:ext>
+            </a:extLst>
+          </p:cNvPr>
+          <p:cNvSpPr>
+            <a:spLocks noGrp="1"/>
+          </p:cNvSpPr>
+          <p:nvPr>
+            <p:ph type="title"/>
+          </p:nvPr>
+        </p:nvSpPr>
+        <p:spPr/>
+        <p:txBody>
+          <a:bodyPr/>
+          <a:lstStyle/>
+          <a:p>
+            <a:r>
+              <a:rPr lang="en-US" dirty="0"/>
+              <a:t>References</a:t>
+            </a:r>
+            <a:endParaRPr lang="en-GB" dirty="0"/>
+          </a:p>
+        </p:txBody>
+      </p:sp>
+      <p:sp>
+        <p:nvSpPr>
+          <p:cNvPr id="3" name="Content Placeholder 2">
+            <a:extLst>
+              <a:ext uri="{FF2B5EF4-FFF2-40B4-BE49-F238E27FC236}">
+                <a16:creationId xmlns:a16="http://schemas.microsoft.com/office/drawing/2014/main" id="{A9C16DC8-2E95-9526-1657-6E95C5B8A701}"/>
+              </a:ext>
+            </a:extLst>
+          </p:cNvPr>
+          <p:cNvSpPr>
+            <a:spLocks noGrp="1"/>
+          </p:cNvSpPr>
+          <p:nvPr>
+            <p:ph idx="1"/>
+          </p:nvPr>
+        </p:nvSpPr>
+        <p:spPr/>
+        <p:txBody>
+          <a:bodyPr/>
+          <a:lstStyle/>
+          <a:p>
+            <a:pPr marL="0" indent="0">
+              <a:buNone/>
+            </a:pPr>
+            <a:r>
+              <a:rPr lang="en-GB" b="0" i="0" dirty="0" err="1">
+                <a:solidFill>
+                  <a:schemeClr val="tx1"/>
+                </a:solidFill>
+                <a:effectLst/>
+                <a:latin typeface="Circular"/>
+              </a:rPr>
+              <a:t>Handschuh</a:t>
+            </a:r>
+            <a:r>
+              <a:rPr lang="en-GB" b="0" i="0" dirty="0">
+                <a:solidFill>
+                  <a:schemeClr val="tx1"/>
+                </a:solidFill>
+                <a:effectLst/>
+                <a:latin typeface="Circular"/>
+              </a:rPr>
+              <a:t>, H. (2005) ‘SHA Family (Secure Hash Algorithm)’, in van </a:t>
+            </a:r>
+            <a:r>
+              <a:rPr lang="en-GB" b="0" i="0" dirty="0" err="1">
+                <a:solidFill>
+                  <a:schemeClr val="tx1"/>
+                </a:solidFill>
+                <a:effectLst/>
+                <a:latin typeface="Circular"/>
+              </a:rPr>
+              <a:t>Tilborg</a:t>
+            </a:r>
+            <a:r>
+              <a:rPr lang="en-GB" b="0" i="0" dirty="0">
+                <a:solidFill>
+                  <a:schemeClr val="tx1"/>
+                </a:solidFill>
+                <a:effectLst/>
+                <a:latin typeface="Circular"/>
+              </a:rPr>
+              <a:t>, H. C. A. (ed.) </a:t>
+            </a:r>
+            <a:r>
+              <a:rPr lang="en-GB" b="0" i="1" dirty="0" err="1">
+                <a:solidFill>
+                  <a:schemeClr val="tx1"/>
+                </a:solidFill>
+                <a:effectLst/>
+                <a:latin typeface="Circular"/>
+              </a:rPr>
+              <a:t>Encyclopedia</a:t>
+            </a:r>
+            <a:r>
+              <a:rPr lang="en-GB" b="0" i="1" dirty="0">
+                <a:solidFill>
+                  <a:schemeClr val="tx1"/>
+                </a:solidFill>
+                <a:effectLst/>
+                <a:latin typeface="Circular"/>
+              </a:rPr>
+              <a:t> of Cryptography and Security</a:t>
+            </a:r>
+            <a:r>
+              <a:rPr lang="en-GB" b="0" i="0" dirty="0">
+                <a:solidFill>
+                  <a:schemeClr val="tx1"/>
+                </a:solidFill>
+                <a:effectLst/>
+                <a:latin typeface="Circular"/>
+              </a:rPr>
+              <a:t>. Boston, MA: Springer US, pp. 565–567. </a:t>
+            </a:r>
+            <a:r>
+              <a:rPr lang="en-GB" b="0" i="0" dirty="0" err="1">
+                <a:solidFill>
+                  <a:schemeClr val="tx1"/>
+                </a:solidFill>
+                <a:effectLst/>
+                <a:latin typeface="Circular"/>
+              </a:rPr>
+              <a:t>doi</a:t>
+            </a:r>
+            <a:r>
+              <a:rPr lang="en-GB" b="0" i="0" dirty="0">
+                <a:solidFill>
+                  <a:schemeClr val="tx1"/>
+                </a:solidFill>
+                <a:effectLst/>
+                <a:latin typeface="Circular"/>
+              </a:rPr>
+              <a:t>: 10.1007/0-387-23483-7_388.</a:t>
+            </a:r>
+            <a:endParaRPr lang="en-GB" dirty="0">
+              <a:solidFill>
+                <a:schemeClr val="tx1"/>
+              </a:solidFill>
+            </a:endParaRPr>
+          </a:p>
+        </p:txBody>
+      </p:sp>
+    </p:spTree>
+    <p:extLst>
+      <p:ext uri="{BB962C8B-B14F-4D97-AF65-F5344CB8AC3E}">
+        <p14:creationId xmlns:p14="http://schemas.microsoft.com/office/powerpoint/2010/main" val="3695867236"/>
+      </p:ext>
+    </p:extLst>
+  </p:cSld>
+  <p:clrMapOvr>
+    <a:masterClrMapping/>
+  </p:clrMapOvr>
+</p:sld>
+</file>
+
+<file path=ppt/slides/slide2.xml><?xml version="1.0" encoding="utf-8"?>
+<p:sld xmlns:a="http://schemas.openxmlformats.org/drawingml/2006/main" xmlns:r="http://schemas.openxmlformats.org/officeDocument/2006/relationships" xmlns:p="http://schemas.openxmlformats.org/presentationml/2006/main">
+  <p:cSld>
+    <p:spTree>
+      <p:nvGrpSpPr>
+        <p:cNvPr id="1" name=""/>
+        <p:cNvGrpSpPr/>
+        <p:nvPr/>
+      </p:nvGrpSpPr>
+      <p:grpSpPr>
+        <a:xfrm>
+          <a:off x="0" y="0"/>
+          <a:ext cx="0" cy="0"/>
+          <a:chOff x="0" y="0"/>
+          <a:chExt cx="0" cy="0"/>
+        </a:xfrm>
+      </p:grpSpPr>
+      <p:sp>
+        <p:nvSpPr>
+          <p:cNvPr id="2" name="Title 1">
+            <a:extLst>
+              <a:ext uri="{FF2B5EF4-FFF2-40B4-BE49-F238E27FC236}">
+                <a16:creationId xmlns:a16="http://schemas.microsoft.com/office/drawing/2014/main" id="{C7E0A70A-A506-742E-79FF-CCC404CE65C7}"/>
+              </a:ext>
+            </a:extLst>
+          </p:cNvPr>
+          <p:cNvSpPr>
+            <a:spLocks noGrp="1"/>
+          </p:cNvSpPr>
+          <p:nvPr>
+            <p:ph type="title"/>
+          </p:nvPr>
+        </p:nvSpPr>
+        <p:spPr/>
+        <p:txBody>
+          <a:bodyPr/>
+          <a:lstStyle/>
+          <a:p>
+            <a:r>
+              <a:rPr lang="en-US" dirty="0"/>
+              <a:t>STUDY AIM</a:t>
+            </a:r>
+            <a:endParaRPr lang="en-GB" dirty="0"/>
+          </a:p>
+        </p:txBody>
+      </p:sp>
+      <p:sp>
+        <p:nvSpPr>
+          <p:cNvPr id="3" name="Content Placeholder 2">
+            <a:extLst>
+              <a:ext uri="{FF2B5EF4-FFF2-40B4-BE49-F238E27FC236}">
+                <a16:creationId xmlns:a16="http://schemas.microsoft.com/office/drawing/2014/main" id="{DAE9E2D5-3E7C-12B5-F2B4-4D153305E279}"/>
+              </a:ext>
+            </a:extLst>
+          </p:cNvPr>
+          <p:cNvSpPr>
+            <a:spLocks noGrp="1"/>
+          </p:cNvSpPr>
+          <p:nvPr>
+            <p:ph idx="1"/>
+          </p:nvPr>
+        </p:nvSpPr>
+        <p:spPr/>
+        <p:txBody>
+          <a:bodyPr/>
+          <a:lstStyle/>
+          <a:p>
+            <a:r>
+              <a:rPr lang="en-US" dirty="0"/>
+              <a:t>Investigate if there is a relationship between student attendance to live lectures and their grade.</a:t>
+            </a:r>
+          </a:p>
+          <a:p>
+            <a:pPr lvl="1"/>
+            <a:r>
+              <a:rPr lang="en-US" dirty="0"/>
+              <a:t>This study is based on the basis that recorded versions of the lectures are available for students to view.</a:t>
+            </a:r>
+          </a:p>
+          <a:p>
+            <a:pPr lvl="1"/>
+            <a:r>
+              <a:rPr lang="en-US" dirty="0"/>
+              <a:t>Students can view the same material if they cannot or decide not to attend a lecture session.</a:t>
+            </a:r>
+          </a:p>
+          <a:p>
+            <a:pPr lvl="1"/>
+            <a:endParaRPr lang="en-US" dirty="0"/>
+          </a:p>
+          <a:p>
+            <a:r>
+              <a:rPr lang="en-US" dirty="0"/>
+              <a:t>Additional aim of the investigation is to determine if providing pre-recorded lectures is a suitable substitute to live lectures.</a:t>
+            </a:r>
+          </a:p>
+          <a:p>
+            <a:pPr lvl="1"/>
+            <a:r>
+              <a:rPr lang="en-US" dirty="0"/>
+              <a:t>This could mean teaching staff can focus on preparing the material ahead of term, freeing up their in-term teaching to respond to student queries, host more practical sessions, or live workshops for students.</a:t>
+            </a:r>
+            <a:endParaRPr lang="en-GB" dirty="0"/>
+          </a:p>
+        </p:txBody>
+      </p:sp>
+    </p:spTree>
+    <p:extLst>
+      <p:ext uri="{BB962C8B-B14F-4D97-AF65-F5344CB8AC3E}">
+        <p14:creationId xmlns:p14="http://schemas.microsoft.com/office/powerpoint/2010/main" val="3260005894"/>
+      </p:ext>
+    </p:extLst>
+  </p:cSld>
+  <p:clrMapOvr>
+    <a:masterClrMapping/>
+  </p:clrMapOvr>
+</p:sld>
+</file>
+
+<file path=ppt/slides/slide20.xml><?xml version="1.0" encoding="utf-8"?>
 <p:sld xmlns:a="http://schemas.openxmlformats.org/drawingml/2006/main" xmlns:r="http://schemas.openxmlformats.org/officeDocument/2006/relationships" xmlns:p="http://schemas.openxmlformats.org/presentationml/2006/main">
   <p:cSld>
     <p:bg>
@@ -12620,125 +14884,6 @@
 </p:sld>
 </file>
 
-<file path=ppt/slides/slide2.xml><?xml version="1.0" encoding="utf-8"?>
-<p:sld xmlns:a="http://schemas.openxmlformats.org/drawingml/2006/main" xmlns:r="http://schemas.openxmlformats.org/officeDocument/2006/relationships" xmlns:p="http://schemas.openxmlformats.org/presentationml/2006/main">
-  <p:cSld>
-    <p:spTree>
-      <p:nvGrpSpPr>
-        <p:cNvPr id="1" name=""/>
-        <p:cNvGrpSpPr/>
-        <p:nvPr/>
-      </p:nvGrpSpPr>
-      <p:grpSpPr>
-        <a:xfrm>
-          <a:off x="0" y="0"/>
-          <a:ext cx="0" cy="0"/>
-          <a:chOff x="0" y="0"/>
-          <a:chExt cx="0" cy="0"/>
-        </a:xfrm>
-      </p:grpSpPr>
-      <p:sp>
-        <p:nvSpPr>
-          <p:cNvPr id="2" name="Title 1">
-            <a:extLst>
-              <a:ext uri="{FF2B5EF4-FFF2-40B4-BE49-F238E27FC236}">
-                <a16:creationId xmlns:a16="http://schemas.microsoft.com/office/drawing/2014/main" id="{C7E0A70A-A506-742E-79FF-CCC404CE65C7}"/>
-              </a:ext>
-            </a:extLst>
-          </p:cNvPr>
-          <p:cNvSpPr>
-            <a:spLocks noGrp="1"/>
-          </p:cNvSpPr>
-          <p:nvPr>
-            <p:ph type="title"/>
-          </p:nvPr>
-        </p:nvSpPr>
-        <p:spPr/>
-        <p:txBody>
-          <a:bodyPr/>
-          <a:lstStyle/>
-          <a:p>
-            <a:r>
-              <a:rPr lang="en-US" dirty="0"/>
-              <a:t>STUDY AIM</a:t>
-            </a:r>
-            <a:endParaRPr lang="en-GB" dirty="0"/>
-          </a:p>
-        </p:txBody>
-      </p:sp>
-      <p:sp>
-        <p:nvSpPr>
-          <p:cNvPr id="3" name="Content Placeholder 2">
-            <a:extLst>
-              <a:ext uri="{FF2B5EF4-FFF2-40B4-BE49-F238E27FC236}">
-                <a16:creationId xmlns:a16="http://schemas.microsoft.com/office/drawing/2014/main" id="{DAE9E2D5-3E7C-12B5-F2B4-4D153305E279}"/>
-              </a:ext>
-            </a:extLst>
-          </p:cNvPr>
-          <p:cNvSpPr>
-            <a:spLocks noGrp="1"/>
-          </p:cNvSpPr>
-          <p:nvPr>
-            <p:ph idx="1"/>
-          </p:nvPr>
-        </p:nvSpPr>
-        <p:spPr/>
-        <p:txBody>
-          <a:bodyPr/>
-          <a:lstStyle/>
-          <a:p>
-            <a:r>
-              <a:rPr lang="en-US" dirty="0"/>
-              <a:t>Investigate if there is a relationship between student attendance to live lectures and their grade.</a:t>
-            </a:r>
-          </a:p>
-          <a:p>
-            <a:pPr lvl="1"/>
-            <a:r>
-              <a:rPr lang="en-US" dirty="0"/>
-              <a:t>This study is based on the basis that recorded versions of the lectures are available for students to view.</a:t>
-            </a:r>
-          </a:p>
-          <a:p>
-            <a:pPr lvl="1"/>
-            <a:r>
-              <a:rPr lang="en-US" dirty="0"/>
-              <a:t>Students can view the same material if they cannot or decide not to attend a lecture session.</a:t>
-            </a:r>
-          </a:p>
-          <a:p>
-            <a:pPr lvl="1"/>
-            <a:endParaRPr lang="en-US" dirty="0"/>
-          </a:p>
-          <a:p>
-            <a:r>
-              <a:rPr lang="en-US" dirty="0"/>
-              <a:t>Additional aim of the investigation is to determine if providing pre-recorded lectures is a suitable substitute to live lectures.</a:t>
-            </a:r>
-          </a:p>
-          <a:p>
-            <a:pPr lvl="1"/>
-            <a:r>
-              <a:rPr lang="en-US" dirty="0"/>
-              <a:t>This could mean teaching staff can focus on preparing the material ahead of term, freeing up their in-term teaching to respond to student queries, host more practical sessions, or live workshops for students.</a:t>
-            </a:r>
-            <a:endParaRPr lang="en-GB" dirty="0"/>
-          </a:p>
-        </p:txBody>
-      </p:sp>
-    </p:spTree>
-    <p:extLst>
-      <p:ext uri="{BB962C8B-B14F-4D97-AF65-F5344CB8AC3E}">
-        <p14:creationId xmlns:p14="http://schemas.microsoft.com/office/powerpoint/2010/main" val="3260005894"/>
-      </p:ext>
-    </p:extLst>
-  </p:cSld>
-  <p:clrMapOvr>
-    <a:masterClrMapping/>
-  </p:clrMapOvr>
-</p:sld>
-</file>
-
 <file path=ppt/slides/slide3.xml><?xml version="1.0" encoding="utf-8"?>
 <p:sld xmlns:a="http://schemas.openxmlformats.org/drawingml/2006/main" xmlns:r="http://schemas.openxmlformats.org/officeDocument/2006/relationships" xmlns:p="http://schemas.openxmlformats.org/presentationml/2006/main">
   <p:cSld>
@@ -13436,7 +15581,7 @@
           <a:p>
             <a:r>
               <a:rPr lang="en-US" dirty="0"/>
-              <a:t>Data Gathering methods</a:t>
+              <a:t>Data Gathering methodology</a:t>
             </a:r>
             <a:endParaRPr lang="en-GB" dirty="0"/>
           </a:p>
@@ -13549,14 +15694,35 @@
           <a:p>
             <a:r>
               <a:rPr lang="en-US" dirty="0"/>
-              <a:t>Ethics approval for this project was given based on the anonymizing of student identifications. To do this, the raw data gathered was collated into a single Spreadsheet for each year, and Student ID’s were hashed during a SHA256 Hashing algorithm &lt;REF&gt;.</a:t>
-            </a:r>
+              <a:t>Ethics approval for this project was given based on the anonymizing of student identifications. To do this, the raw data gathered was collated into a single Spreadsheet for each year, and Student ID’s were hashed during a SHA256 Hashing algorithm (</a:t>
+            </a:r>
+            <a:r>
+              <a:rPr lang="en-GB" b="0" i="0" dirty="0" err="1">
+                <a:solidFill>
+                  <a:schemeClr val="tx1"/>
+                </a:solidFill>
+                <a:effectLst/>
+                <a:latin typeface="Circular"/>
+              </a:rPr>
+              <a:t>Handschuh</a:t>
+            </a:r>
+            <a:r>
+              <a:rPr lang="en-GB" b="0" i="0" dirty="0">
+                <a:solidFill>
+                  <a:schemeClr val="tx1"/>
+                </a:solidFill>
+                <a:effectLst/>
+                <a:latin typeface="Circular"/>
+              </a:rPr>
+              <a:t>, 2005)</a:t>
+            </a:r>
+            <a:endParaRPr lang="en-US" dirty="0"/>
           </a:p>
           <a:p>
             <a:pPr lvl="1"/>
             <a:r>
               <a:rPr lang="en-US" dirty="0"/>
-              <a:t>Converts student number into a 256-bit hexadecimal value. Hashing processes was chosen due to the high security of the process (cannot convert Hash back into original value) and very low chance of collisions &lt;REF&gt;.</a:t>
+              <a:t>Converts student number into a 256-bit hexadecimal value. Hashing processes was chosen due to the high security of the process (cannot convert Hash back into original value) and very low chance of collisions.</a:t>
             </a:r>
           </a:p>
         </p:txBody>
@@ -13614,7 +15780,7 @@
           <a:p>
             <a:r>
               <a:rPr lang="en-US" dirty="0"/>
-              <a:t>Data Gathering methods</a:t>
+              <a:t>Data Gathering methodology</a:t>
             </a:r>
             <a:endParaRPr lang="en-GB" dirty="0"/>
           </a:p>
@@ -13907,7 +16073,7 @@
                   <a:srgbClr val="FFFEFF"/>
                 </a:solidFill>
               </a:rPr>
-              <a:t>Tech Requirements</a:t>
+              <a:t>Analysis Methodology</a:t>
             </a:r>
           </a:p>
         </p:txBody>
@@ -13928,7 +16094,7 @@
             <p:ph idx="1"/>
             <p:extLst>
               <p:ext uri="{D42A27DB-BD31-4B8C-83A1-F6EECF244321}">
-                <p14:modId xmlns:p14="http://schemas.microsoft.com/office/powerpoint/2010/main" val="1541187836"/>
+                <p14:modId xmlns:p14="http://schemas.microsoft.com/office/powerpoint/2010/main" val="2626715032"/>
               </p:ext>
             </p:extLst>
           </p:nvPr>
@@ -13978,7 +16144,7 @@
           <p:cNvPr id="2" name="Title 1">
             <a:extLst>
               <a:ext uri="{FF2B5EF4-FFF2-40B4-BE49-F238E27FC236}">
-                <a16:creationId xmlns:a16="http://schemas.microsoft.com/office/drawing/2014/main" id="{921633EB-7DCB-4DDC-80AF-C885A3EE1245}"/>
+                <a16:creationId xmlns:a16="http://schemas.microsoft.com/office/drawing/2014/main" id="{BD4CA9CC-5ADC-001A-4D31-8EC14B8E37D4}"/>
               </a:ext>
             </a:extLst>
           </p:cNvPr>
@@ -13996,80 +16162,88 @@
           <a:p>
             <a:r>
               <a:rPr lang="en-US" dirty="0"/>
-              <a:t>Competitive Landscape</a:t>
-            </a:r>
+              <a:t>Analysis methodology</a:t>
+            </a:r>
+            <a:endParaRPr lang="en-GB" dirty="0"/>
           </a:p>
         </p:txBody>
       </p:sp>
-      <p:pic>
-        <p:nvPicPr>
-          <p:cNvPr id="11" name="Content Placeholder 4" descr="Charts">
+      <p:sp>
+        <p:nvSpPr>
+          <p:cNvPr id="3" name="Content Placeholder 2">
             <a:extLst>
               <a:ext uri="{FF2B5EF4-FFF2-40B4-BE49-F238E27FC236}">
-                <a16:creationId xmlns:a16="http://schemas.microsoft.com/office/drawing/2014/main" id="{47D9BE16-119C-43B2-9AE6-18C4A150C0EF}"/>
+                <a16:creationId xmlns:a16="http://schemas.microsoft.com/office/drawing/2014/main" id="{121196E6-3603-F66B-72E8-8E7E5F53AC6C}"/>
               </a:ext>
             </a:extLst>
           </p:cNvPr>
-          <p:cNvPicPr>
-            <a:picLocks noGrp="1" noChangeAspect="1"/>
-          </p:cNvPicPr>
+          <p:cNvSpPr>
+            <a:spLocks noGrp="1"/>
+          </p:cNvSpPr>
           <p:nvPr>
-            <p:ph sz="half" idx="1"/>
+            <p:ph idx="1"/>
           </p:nvPr>
-        </p:nvPicPr>
-        <p:blipFill rotWithShape="1">
-          <a:blip r:embed="rId2" cstate="screen">
-            <a:extLst>
-              <a:ext uri="{28A0092B-C50C-407E-A947-70E740481C1C}">
-                <a14:useLocalDpi xmlns:a14="http://schemas.microsoft.com/office/drawing/2010/main"/>
-              </a:ext>
-            </a:extLst>
-          </a:blip>
-          <a:stretch/>
-        </p:blipFill>
-        <p:spPr>
-          <a:xfrm>
-            <a:off x="581025" y="2231480"/>
-            <a:ext cx="5422900" cy="3625353"/>
-          </a:xfrm>
-        </p:spPr>
-      </p:pic>
-      <p:pic>
-        <p:nvPicPr>
-          <p:cNvPr id="18" name="Content Placeholder 17" descr="Chart placeholder">
-            <a:extLst>
-              <a:ext uri="{FF2B5EF4-FFF2-40B4-BE49-F238E27FC236}">
-                <a16:creationId xmlns:a16="http://schemas.microsoft.com/office/drawing/2014/main" id="{BFEA8EC1-23A4-4843-A9C3-AE771D73392A}"/>
-              </a:ext>
-            </a:extLst>
-          </p:cNvPr>
-          <p:cNvPicPr>
-            <a:picLocks noGrp="1" noChangeAspect="1"/>
-          </p:cNvPicPr>
-          <p:nvPr>
-            <p:ph sz="half" idx="2"/>
-          </p:nvPr>
-        </p:nvPicPr>
-        <p:blipFill>
-          <a:blip r:embed="rId3"/>
-          <a:stretch>
-            <a:fillRect/>
-          </a:stretch>
-        </p:blipFill>
-        <p:spPr>
-          <a:xfrm>
-            <a:off x="6201811" y="2571845"/>
-            <a:ext cx="5395428" cy="2944623"/>
-          </a:xfrm>
-          <a:prstGeom prst="rect">
-            <a:avLst/>
-          </a:prstGeom>
-        </p:spPr>
-      </p:pic>
+        </p:nvSpPr>
+        <p:spPr/>
+        <p:txBody>
+          <a:bodyPr>
+            <a:normAutofit/>
+          </a:bodyPr>
+          <a:lstStyle/>
+          <a:p>
+            <a:r>
+              <a:rPr lang="en-US" dirty="0"/>
+              <a:t>Overview</a:t>
+            </a:r>
+          </a:p>
+          <a:p>
+            <a:endParaRPr lang="en-US" dirty="0"/>
+          </a:p>
+          <a:p>
+            <a:r>
+              <a:rPr lang="en-US" dirty="0"/>
+              <a:t>Correlation (Pearson, Kendall &amp; Spearman)</a:t>
+            </a:r>
+          </a:p>
+          <a:p>
+            <a:pPr lvl="1"/>
+            <a:r>
+              <a:rPr lang="en-US" dirty="0"/>
+              <a:t>Grade vs Overall Attendance (%)</a:t>
+            </a:r>
+          </a:p>
+          <a:p>
+            <a:pPr lvl="1"/>
+            <a:r>
+              <a:rPr lang="en-US" dirty="0"/>
+              <a:t>Grade vs Lecture Attendance (%)</a:t>
+            </a:r>
+          </a:p>
+          <a:p>
+            <a:pPr marL="0" indent="0">
+              <a:buNone/>
+            </a:pPr>
+            <a:endParaRPr lang="en-US" dirty="0"/>
+          </a:p>
+          <a:p>
+            <a:r>
+              <a:rPr lang="en-US" dirty="0"/>
+              <a:t>Linear Regression</a:t>
+            </a:r>
+          </a:p>
+          <a:p>
+            <a:pPr lvl="1"/>
+            <a:r>
+              <a:rPr lang="en-US" dirty="0"/>
+              <a:t>Grade vs Attendance</a:t>
+            </a:r>
+          </a:p>
+        </p:txBody>
+      </p:sp>
     </p:spTree>
     <p:extLst>
       <p:ext uri="{BB962C8B-B14F-4D97-AF65-F5344CB8AC3E}">
-        <p14:creationId xmlns:p14="http://schemas.microsoft.com/office/powerpoint/2010/main" val="497607547"/>
+        <p14:creationId xmlns:p14="http://schemas.microsoft.com/office/powerpoint/2010/main" val="255211022"/>
       </p:ext>
     </p:extLst>
   </p:cSld>

</xml_diff>

<commit_message>
Updated powerpoint with images. Need to fill in analysis of the data.
</commit_message>
<xml_diff>
--- a/scripts/CAP512.pptx
+++ b/scripts/CAP512.pptx
@@ -5,10 +5,10 @@
     <p:sldMasterId id="2147483672" r:id="rId1"/>
   </p:sldMasterIdLst>
   <p:notesMasterIdLst>
-    <p:notesMasterId r:id="rId24"/>
+    <p:notesMasterId r:id="rId33"/>
   </p:notesMasterIdLst>
   <p:handoutMasterIdLst>
-    <p:handoutMasterId r:id="rId25"/>
+    <p:handoutMasterId r:id="rId34"/>
   </p:handoutMasterIdLst>
   <p:sldIdLst>
     <p:sldId id="256" r:id="rId2"/>
@@ -31,8 +31,17 @@
     <p:sldId id="282" r:id="rId19"/>
     <p:sldId id="283" r:id="rId20"/>
     <p:sldId id="291" r:id="rId21"/>
-    <p:sldId id="270" r:id="rId22"/>
-    <p:sldId id="260" r:id="rId23"/>
+    <p:sldId id="293" r:id="rId22"/>
+    <p:sldId id="294" r:id="rId23"/>
+    <p:sldId id="295" r:id="rId24"/>
+    <p:sldId id="297" r:id="rId25"/>
+    <p:sldId id="298" r:id="rId26"/>
+    <p:sldId id="299" r:id="rId27"/>
+    <p:sldId id="300" r:id="rId28"/>
+    <p:sldId id="301" r:id="rId29"/>
+    <p:sldId id="302" r:id="rId30"/>
+    <p:sldId id="270" r:id="rId31"/>
+    <p:sldId id="260" r:id="rId32"/>
   </p:sldIdLst>
   <p:sldSz cx="12192000" cy="6858000"/>
   <p:notesSz cx="6858000" cy="9144000"/>
@@ -1078,7 +1087,7 @@
           </a:pPr>
           <a:r>
             <a:rPr lang="en-US" dirty="0"/>
-            <a:t>Correlation</a:t>
+            <a:t>Correlation &amp; Covariance</a:t>
           </a:r>
         </a:p>
       </dgm:t>
@@ -1119,7 +1128,7 @@
           </a:pPr>
           <a:r>
             <a:rPr lang="en-US" dirty="0"/>
-            <a:t>Linear Regression</a:t>
+            <a:t>Network Predictions</a:t>
           </a:r>
         </a:p>
       </dgm:t>
@@ -1539,7 +1548,7 @@
           </a:pPr>
           <a:r>
             <a:rPr lang="en-US" sz="3500" kern="1200" dirty="0"/>
-            <a:t>Correlation</a:t>
+            <a:t>Correlation &amp; Covariance</a:t>
           </a:r>
         </a:p>
       </dsp:txBody>
@@ -1678,7 +1687,7 @@
           </a:pPr>
           <a:r>
             <a:rPr lang="en-US" sz="3500" kern="1200" dirty="0"/>
-            <a:t>Linear Regression</a:t>
+            <a:t>Network Predictions</a:t>
           </a:r>
         </a:p>
       </dsp:txBody>
@@ -4821,7 +4830,7 @@
           <a:p>
             <a:fld id="{C6B3AB32-59DF-41F1-9618-EDFBF5049629}" type="slidenum">
               <a:rPr lang="en-US" smtClean="0"/>
-              <a:t>22</a:t>
+              <a:t>31</a:t>
             </a:fld>
             <a:endParaRPr lang="en-US" dirty="0"/>
           </a:p>
@@ -12465,7 +12474,7 @@
             <p:ph sz="half" idx="2"/>
             <p:extLst>
               <p:ext uri="{D42A27DB-BD31-4B8C-83A1-F6EECF244321}">
-                <p14:modId xmlns:p14="http://schemas.microsoft.com/office/powerpoint/2010/main" val="638242072"/>
+                <p14:modId xmlns:p14="http://schemas.microsoft.com/office/powerpoint/2010/main" val="798515959"/>
               </p:ext>
             </p:extLst>
           </p:nvPr>
@@ -12877,10 +12886,10 @@
                     <a:p>
                       <a:pPr algn="ctr"/>
                       <a:r>
-                        <a:rPr lang="en-US" sz="1000" b="0" dirty="0"/>
+                        <a:rPr lang="en-US" sz="1100" b="0" dirty="0"/>
                         <a:t>2020-2021</a:t>
                       </a:r>
-                      <a:endParaRPr lang="en-GB" sz="1000" b="0" dirty="0"/>
+                      <a:endParaRPr lang="en-GB" sz="1100" b="0" dirty="0"/>
                     </a:p>
                   </a:txBody>
                   <a:tcPr/>
@@ -12892,10 +12901,10 @@
                     <a:p>
                       <a:pPr algn="ctr"/>
                       <a:r>
-                        <a:rPr lang="en-US" sz="1000" b="0" dirty="0"/>
+                        <a:rPr lang="en-US" sz="1100" b="0" dirty="0"/>
                         <a:t>2.458</a:t>
                       </a:r>
-                      <a:endParaRPr lang="en-GB" sz="1000" b="0" dirty="0"/>
+                      <a:endParaRPr lang="en-GB" sz="1100" b="0" dirty="0"/>
                     </a:p>
                   </a:txBody>
                   <a:tcPr/>
@@ -12907,10 +12916,10 @@
                     <a:p>
                       <a:pPr algn="ctr"/>
                       <a:r>
-                        <a:rPr lang="en-US" sz="1000" b="0" dirty="0"/>
+                        <a:rPr lang="en-US" sz="1100" b="0" dirty="0"/>
                         <a:t>2.5</a:t>
                       </a:r>
-                      <a:endParaRPr lang="en-GB" sz="1000" b="0" dirty="0"/>
+                      <a:endParaRPr lang="en-GB" sz="1100" b="0" dirty="0"/>
                     </a:p>
                   </a:txBody>
                   <a:tcPr/>
@@ -12922,10 +12931,10 @@
                     <a:p>
                       <a:pPr algn="ctr"/>
                       <a:r>
-                        <a:rPr lang="en-US" sz="1000" b="0" dirty="0"/>
+                        <a:rPr lang="en-US" sz="1100" b="0" dirty="0"/>
                         <a:t>N/A</a:t>
                       </a:r>
-                      <a:endParaRPr lang="en-GB" sz="1000" b="0" dirty="0"/>
+                      <a:endParaRPr lang="en-GB" sz="1100" b="0" dirty="0"/>
                     </a:p>
                   </a:txBody>
                   <a:tcPr/>
@@ -12937,10 +12946,10 @@
                     <a:p>
                       <a:pPr algn="ctr"/>
                       <a:r>
-                        <a:rPr lang="en-US" sz="1000" b="0" dirty="0"/>
+                        <a:rPr lang="en-US" sz="1100" b="0" dirty="0"/>
                         <a:t>N/A</a:t>
                       </a:r>
-                      <a:endParaRPr lang="en-GB" sz="1000" b="0" dirty="0"/>
+                      <a:endParaRPr lang="en-GB" sz="1100" b="0" dirty="0"/>
                     </a:p>
                   </a:txBody>
                   <a:tcPr/>
@@ -12952,10 +12961,10 @@
                     <a:p>
                       <a:pPr algn="ctr"/>
                       <a:r>
-                        <a:rPr lang="en-US" sz="1000" b="0" dirty="0"/>
+                        <a:rPr lang="en-US" sz="1100" b="0" dirty="0"/>
                         <a:t>N/A</a:t>
                       </a:r>
-                      <a:endParaRPr lang="en-GB" sz="1000" b="0" dirty="0"/>
+                      <a:endParaRPr lang="en-GB" sz="1100" b="0" dirty="0"/>
                     </a:p>
                   </a:txBody>
                   <a:tcPr/>
@@ -12967,10 +12976,10 @@
                     <a:p>
                       <a:pPr algn="ctr"/>
                       <a:r>
-                        <a:rPr lang="en-US" sz="1000" b="0" dirty="0"/>
+                        <a:rPr lang="en-US" sz="1100" b="0" dirty="0"/>
                         <a:t>N/A</a:t>
                       </a:r>
-                      <a:endParaRPr lang="en-GB" sz="1000" b="0" dirty="0"/>
+                      <a:endParaRPr lang="en-GB" sz="1100" b="0" dirty="0"/>
                     </a:p>
                   </a:txBody>
                   <a:tcPr/>
@@ -12982,10 +12991,10 @@
                     <a:p>
                       <a:pPr algn="ctr"/>
                       <a:r>
-                        <a:rPr lang="en-US" sz="1000" b="0" dirty="0"/>
+                        <a:rPr lang="en-US" sz="1100" b="0" dirty="0"/>
                         <a:t>N/A</a:t>
                       </a:r>
-                      <a:endParaRPr lang="en-GB" sz="1000" b="0" dirty="0"/>
+                      <a:endParaRPr lang="en-GB" sz="1100" b="0" dirty="0"/>
                     </a:p>
                   </a:txBody>
                   <a:tcPr/>
@@ -12997,10 +13006,10 @@
                     <a:p>
                       <a:pPr algn="ctr"/>
                       <a:r>
-                        <a:rPr lang="en-US" sz="1000" b="0" dirty="0"/>
+                        <a:rPr lang="en-US" sz="1100" b="0" dirty="0"/>
                         <a:t>N/A</a:t>
                       </a:r>
-                      <a:endParaRPr lang="en-GB" sz="1000" b="0" dirty="0"/>
+                      <a:endParaRPr lang="en-GB" sz="1100" b="0" dirty="0"/>
                     </a:p>
                   </a:txBody>
                   <a:tcPr/>
@@ -13012,10 +13021,10 @@
                     <a:p>
                       <a:pPr algn="ctr"/>
                       <a:r>
-                        <a:rPr lang="en-US" sz="1000" b="0" dirty="0"/>
+                        <a:rPr lang="en-US" sz="1100" b="0" dirty="0"/>
                         <a:t>N/A</a:t>
                       </a:r>
-                      <a:endParaRPr lang="en-GB" sz="1000" b="0" dirty="0"/>
+                      <a:endParaRPr lang="en-GB" sz="1100" b="0" dirty="0"/>
                     </a:p>
                   </a:txBody>
                   <a:tcPr/>
@@ -13027,10 +13036,10 @@
                     <a:p>
                       <a:pPr algn="ctr"/>
                       <a:r>
-                        <a:rPr lang="en-US" sz="1000" b="0" dirty="0"/>
+                        <a:rPr lang="en-US" sz="1100" b="0" dirty="0"/>
                         <a:t>N/A</a:t>
                       </a:r>
-                      <a:endParaRPr lang="en-GB" sz="1000" b="0" dirty="0"/>
+                      <a:endParaRPr lang="en-GB" sz="1100" b="0" dirty="0"/>
                     </a:p>
                   </a:txBody>
                   <a:tcPr/>
@@ -13049,10 +13058,10 @@
                     <a:p>
                       <a:pPr algn="ctr"/>
                       <a:r>
-                        <a:rPr lang="en-US" sz="1000" b="0" dirty="0"/>
+                        <a:rPr lang="en-US" sz="1100" b="0" dirty="0"/>
                         <a:t>2021-2022</a:t>
                       </a:r>
-                      <a:endParaRPr lang="en-GB" sz="1000" b="0" dirty="0"/>
+                      <a:endParaRPr lang="en-GB" sz="1100" b="0" dirty="0"/>
                     </a:p>
                   </a:txBody>
                   <a:tcPr/>
@@ -13064,10 +13073,10 @@
                     <a:p>
                       <a:pPr algn="ctr"/>
                       <a:r>
-                        <a:rPr lang="en-US" sz="1000" b="0" dirty="0"/>
+                        <a:rPr lang="en-US" sz="1100" b="0" dirty="0"/>
                         <a:t>3.129</a:t>
                       </a:r>
-                      <a:endParaRPr lang="en-GB" sz="1000" b="0" dirty="0"/>
+                      <a:endParaRPr lang="en-GB" sz="1100" b="0" dirty="0"/>
                     </a:p>
                   </a:txBody>
                   <a:tcPr/>
@@ -13079,10 +13088,10 @@
                     <a:p>
                       <a:pPr algn="ctr"/>
                       <a:r>
-                        <a:rPr lang="en-US" sz="1000" b="0" dirty="0"/>
+                        <a:rPr lang="en-US" sz="1100" b="0" dirty="0"/>
                         <a:t>3.5</a:t>
                       </a:r>
-                      <a:endParaRPr lang="en-GB" sz="1000" b="0" dirty="0"/>
+                      <a:endParaRPr lang="en-GB" sz="1100" b="0" dirty="0"/>
                     </a:p>
                   </a:txBody>
                   <a:tcPr/>
@@ -13094,10 +13103,10 @@
                     <a:p>
                       <a:pPr algn="ctr"/>
                       <a:r>
-                        <a:rPr lang="en-US" sz="1000" b="0" dirty="0"/>
+                        <a:rPr lang="en-US" sz="1100" b="0" dirty="0"/>
                         <a:t>29.69</a:t>
                       </a:r>
-                      <a:endParaRPr lang="en-GB" sz="1000" b="0" dirty="0"/>
+                      <a:endParaRPr lang="en-GB" sz="1100" b="0" dirty="0"/>
                     </a:p>
                   </a:txBody>
                   <a:tcPr/>
@@ -13109,10 +13118,10 @@
                     <a:p>
                       <a:pPr algn="ctr"/>
                       <a:r>
-                        <a:rPr lang="en-US" sz="1000" b="0" dirty="0"/>
+                        <a:rPr lang="en-US" sz="1100" b="0" dirty="0"/>
                         <a:t>30</a:t>
                       </a:r>
-                      <a:endParaRPr lang="en-GB" sz="1000" b="0" dirty="0"/>
+                      <a:endParaRPr lang="en-GB" sz="1100" b="0" dirty="0"/>
                     </a:p>
                   </a:txBody>
                   <a:tcPr/>
@@ -13124,10 +13133,10 @@
                     <a:p>
                       <a:pPr algn="ctr"/>
                       <a:r>
-                        <a:rPr lang="en-US" sz="1000" b="0" dirty="0"/>
+                        <a:rPr lang="en-US" sz="1100" b="0" dirty="0"/>
                         <a:t>46.84</a:t>
                       </a:r>
-                      <a:endParaRPr lang="en-GB" sz="1000" b="0" dirty="0"/>
+                      <a:endParaRPr lang="en-GB" sz="1100" b="0" dirty="0"/>
                     </a:p>
                   </a:txBody>
                   <a:tcPr/>
@@ -13139,10 +13148,10 @@
                     <a:p>
                       <a:pPr algn="ctr"/>
                       <a:r>
-                        <a:rPr lang="en-US" sz="1000" b="0" dirty="0"/>
+                        <a:rPr lang="en-US" sz="1100" b="0" dirty="0"/>
                         <a:t>48</a:t>
                       </a:r>
-                      <a:endParaRPr lang="en-GB" sz="1000" b="0" dirty="0"/>
+                      <a:endParaRPr lang="en-GB" sz="1100" b="0" dirty="0"/>
                     </a:p>
                   </a:txBody>
                   <a:tcPr/>
@@ -13154,10 +13163,10 @@
                     <a:p>
                       <a:pPr algn="ctr"/>
                       <a:r>
-                        <a:rPr lang="en-US" sz="1000" b="0" dirty="0"/>
+                        <a:rPr lang="en-US" sz="1100" b="0" dirty="0"/>
                         <a:t>46.5</a:t>
                       </a:r>
-                      <a:endParaRPr lang="en-GB" sz="1000" b="0" dirty="0"/>
+                      <a:endParaRPr lang="en-GB" sz="1100" b="0" dirty="0"/>
                     </a:p>
                   </a:txBody>
                   <a:tcPr/>
@@ -13169,10 +13178,10 @@
                     <a:p>
                       <a:pPr algn="ctr"/>
                       <a:r>
-                        <a:rPr lang="en-US" sz="1000" b="0" dirty="0"/>
+                        <a:rPr lang="en-US" sz="1100" b="0" dirty="0"/>
                         <a:t>44</a:t>
                       </a:r>
-                      <a:endParaRPr lang="en-GB" sz="1000" b="0" dirty="0"/>
+                      <a:endParaRPr lang="en-GB" sz="1100" b="0" dirty="0"/>
                     </a:p>
                   </a:txBody>
                   <a:tcPr/>
@@ -13184,10 +13193,10 @@
                     <a:p>
                       <a:pPr algn="ctr"/>
                       <a:r>
-                        <a:rPr lang="en-US" sz="1000" b="0" dirty="0"/>
+                        <a:rPr lang="en-US" sz="1100" b="0" dirty="0"/>
                         <a:t>47.03</a:t>
                       </a:r>
-                      <a:endParaRPr lang="en-GB" sz="1000" b="0" dirty="0"/>
+                      <a:endParaRPr lang="en-GB" sz="1100" b="0" dirty="0"/>
                     </a:p>
                   </a:txBody>
                   <a:tcPr/>
@@ -13199,10 +13208,10 @@
                     <a:p>
                       <a:pPr algn="ctr"/>
                       <a:r>
-                        <a:rPr lang="en-US" sz="1000" b="0" dirty="0"/>
+                        <a:rPr lang="en-US" sz="1100" b="0" dirty="0"/>
                         <a:t>42</a:t>
                       </a:r>
-                      <a:endParaRPr lang="en-GB" sz="1000" b="0" dirty="0"/>
+                      <a:endParaRPr lang="en-GB" sz="1100" b="0" dirty="0"/>
                     </a:p>
                   </a:txBody>
                   <a:tcPr/>
@@ -13221,10 +13230,10 @@
                     <a:p>
                       <a:pPr algn="ctr"/>
                       <a:r>
-                        <a:rPr lang="en-US" sz="1000" b="0" dirty="0"/>
+                        <a:rPr lang="en-US" sz="1100" b="0" dirty="0"/>
                         <a:t>2022-2023</a:t>
                       </a:r>
-                      <a:endParaRPr lang="en-GB" sz="1000" b="0" dirty="0"/>
+                      <a:endParaRPr lang="en-GB" sz="1100" b="0" dirty="0"/>
                     </a:p>
                   </a:txBody>
                   <a:tcPr/>
@@ -13236,10 +13245,10 @@
                     <a:p>
                       <a:pPr algn="ctr"/>
                       <a:r>
-                        <a:rPr lang="en-US" sz="1000" b="0" dirty="0"/>
+                        <a:rPr lang="en-US" sz="1100" b="0" dirty="0"/>
                         <a:t>2.056</a:t>
                       </a:r>
-                      <a:endParaRPr lang="en-GB" sz="1000" b="0" dirty="0"/>
+                      <a:endParaRPr lang="en-GB" sz="1100" b="0" dirty="0"/>
                     </a:p>
                   </a:txBody>
                   <a:tcPr/>
@@ -13251,10 +13260,10 @@
                     <a:p>
                       <a:pPr algn="ctr"/>
                       <a:r>
-                        <a:rPr lang="en-US" sz="1000" b="0" dirty="0"/>
+                        <a:rPr lang="en-US" sz="1100" b="0" dirty="0"/>
                         <a:t>2.5</a:t>
                       </a:r>
-                      <a:endParaRPr lang="en-GB" sz="1000" b="0" dirty="0"/>
+                      <a:endParaRPr lang="en-GB" sz="1100" b="0" dirty="0"/>
                     </a:p>
                   </a:txBody>
                   <a:tcPr/>
@@ -13266,10 +13275,10 @@
                     <a:p>
                       <a:pPr algn="ctr"/>
                       <a:r>
-                        <a:rPr lang="en-US" sz="1000" b="0" dirty="0"/>
+                        <a:rPr lang="en-US" sz="1100" b="0" dirty="0"/>
                         <a:t>26.7</a:t>
                       </a:r>
-                      <a:endParaRPr lang="en-GB" sz="1000" b="0" dirty="0"/>
+                      <a:endParaRPr lang="en-GB" sz="1100" b="0" dirty="0"/>
                     </a:p>
                   </a:txBody>
                   <a:tcPr/>
@@ -13281,10 +13290,10 @@
                     <a:p>
                       <a:pPr algn="ctr"/>
                       <a:r>
-                        <a:rPr lang="en-US" sz="1000" b="0" dirty="0"/>
+                        <a:rPr lang="en-US" sz="1100" b="0" dirty="0"/>
                         <a:t>25</a:t>
                       </a:r>
-                      <a:endParaRPr lang="en-GB" sz="1000" b="0" dirty="0"/>
+                      <a:endParaRPr lang="en-GB" sz="1100" b="0" dirty="0"/>
                     </a:p>
                   </a:txBody>
                   <a:tcPr/>
@@ -13296,10 +13305,10 @@
                     <a:p>
                       <a:pPr algn="ctr"/>
                       <a:r>
-                        <a:rPr lang="en-US" sz="1000" b="0" dirty="0"/>
+                        <a:rPr lang="en-US" sz="1100" b="0" dirty="0"/>
                         <a:t>40.63</a:t>
                       </a:r>
-                      <a:endParaRPr lang="en-GB" sz="1000" b="0" dirty="0"/>
+                      <a:endParaRPr lang="en-GB" sz="1100" b="0" dirty="0"/>
                     </a:p>
                   </a:txBody>
                   <a:tcPr/>
@@ -13311,10 +13320,10 @@
                     <a:p>
                       <a:pPr algn="ctr"/>
                       <a:r>
-                        <a:rPr lang="en-US" sz="1000" b="0" dirty="0"/>
+                        <a:rPr lang="en-US" sz="1100" b="0" dirty="0"/>
                         <a:t>38</a:t>
                       </a:r>
-                      <a:endParaRPr lang="en-GB" sz="1000" b="0" dirty="0"/>
+                      <a:endParaRPr lang="en-GB" sz="1100" b="0" dirty="0"/>
                     </a:p>
                   </a:txBody>
                   <a:tcPr/>
@@ -13326,10 +13335,10 @@
                     <a:p>
                       <a:pPr algn="ctr"/>
                       <a:r>
-                        <a:rPr lang="en-US" sz="1000" b="0" dirty="0"/>
+                        <a:rPr lang="en-US" sz="1100" b="0" dirty="0"/>
                         <a:t>44.92</a:t>
                       </a:r>
-                      <a:endParaRPr lang="en-GB" sz="1000" b="0" dirty="0"/>
+                      <a:endParaRPr lang="en-GB" sz="1100" b="0" dirty="0"/>
                     </a:p>
                   </a:txBody>
                   <a:tcPr/>
@@ -13341,10 +13350,10 @@
                     <a:p>
                       <a:pPr algn="ctr"/>
                       <a:r>
-                        <a:rPr lang="en-US" sz="1000" b="0" dirty="0"/>
+                        <a:rPr lang="en-US" sz="1100" b="0" dirty="0"/>
                         <a:t>40</a:t>
                       </a:r>
-                      <a:endParaRPr lang="en-GB" sz="1000" b="0" dirty="0"/>
+                      <a:endParaRPr lang="en-GB" sz="1100" b="0" dirty="0"/>
                     </a:p>
                   </a:txBody>
                   <a:tcPr/>
@@ -13356,10 +13365,10 @@
                     <a:p>
                       <a:pPr algn="ctr"/>
                       <a:r>
-                        <a:rPr lang="en-US" sz="1000" b="0" dirty="0"/>
+                        <a:rPr lang="en-US" sz="1100" b="0" dirty="0"/>
                         <a:t>36.6</a:t>
                       </a:r>
-                      <a:endParaRPr lang="en-GB" sz="1000" b="0" dirty="0"/>
+                      <a:endParaRPr lang="en-GB" sz="1100" b="0" dirty="0"/>
                     </a:p>
                   </a:txBody>
                   <a:tcPr/>
@@ -13371,10 +13380,10 @@
                     <a:p>
                       <a:pPr algn="ctr"/>
                       <a:r>
-                        <a:rPr lang="en-US" sz="1000" b="0" dirty="0"/>
+                        <a:rPr lang="en-US" sz="1100" b="0" dirty="0"/>
                         <a:t>27</a:t>
                       </a:r>
-                      <a:endParaRPr lang="en-GB" sz="1000" b="0" dirty="0"/>
+                      <a:endParaRPr lang="en-GB" sz="1100" b="0" dirty="0"/>
                     </a:p>
                   </a:txBody>
                   <a:tcPr/>
@@ -13424,6 +13433,3185 @@
           <p:cNvPr id="2" name="Title 1">
             <a:extLst>
               <a:ext uri="{FF2B5EF4-FFF2-40B4-BE49-F238E27FC236}">
+                <a16:creationId xmlns:a16="http://schemas.microsoft.com/office/drawing/2014/main" id="{C7B88BF5-C73D-C2F9-DD20-DE6522FEBB0C}"/>
+              </a:ext>
+            </a:extLst>
+          </p:cNvPr>
+          <p:cNvSpPr>
+            <a:spLocks noGrp="1"/>
+          </p:cNvSpPr>
+          <p:nvPr>
+            <p:ph type="ctrTitle"/>
+          </p:nvPr>
+        </p:nvSpPr>
+        <p:spPr/>
+        <p:txBody>
+          <a:bodyPr/>
+          <a:lstStyle/>
+          <a:p>
+            <a:r>
+              <a:rPr lang="en-US" dirty="0"/>
+              <a:t>Correlation &amp; Covariance</a:t>
+            </a:r>
+            <a:endParaRPr lang="en-GB" dirty="0"/>
+          </a:p>
+        </p:txBody>
+      </p:sp>
+      <p:sp>
+        <p:nvSpPr>
+          <p:cNvPr id="3" name="Subtitle 2">
+            <a:extLst>
+              <a:ext uri="{FF2B5EF4-FFF2-40B4-BE49-F238E27FC236}">
+                <a16:creationId xmlns:a16="http://schemas.microsoft.com/office/drawing/2014/main" id="{7DC5E721-C1B6-45C1-7ACB-BA368382A9E9}"/>
+              </a:ext>
+            </a:extLst>
+          </p:cNvPr>
+          <p:cNvSpPr>
+            <a:spLocks noGrp="1"/>
+          </p:cNvSpPr>
+          <p:nvPr>
+            <p:ph type="subTitle" idx="1"/>
+          </p:nvPr>
+        </p:nvSpPr>
+        <p:spPr>
+          <a:xfrm>
+            <a:off x="581191" y="3275621"/>
+            <a:ext cx="10993546" cy="2873509"/>
+          </a:xfrm>
+        </p:spPr>
+        <p:txBody>
+          <a:bodyPr>
+            <a:normAutofit/>
+          </a:bodyPr>
+          <a:lstStyle/>
+          <a:p>
+            <a:r>
+              <a:rPr lang="en-US" dirty="0">
+                <a:solidFill>
+                  <a:schemeClr val="bg1"/>
+                </a:solidFill>
+              </a:rPr>
+              <a:t>Grade ~ Attendance</a:t>
+            </a:r>
+          </a:p>
+          <a:p>
+            <a:endParaRPr lang="en-US" dirty="0">
+              <a:solidFill>
+                <a:schemeClr val="bg1"/>
+              </a:solidFill>
+            </a:endParaRPr>
+          </a:p>
+          <a:p>
+            <a:r>
+              <a:rPr lang="en-US" dirty="0">
+                <a:solidFill>
+                  <a:schemeClr val="bg1"/>
+                </a:solidFill>
+              </a:rPr>
+              <a:t>Grade ~ Expected Attendance</a:t>
+            </a:r>
+          </a:p>
+          <a:p>
+            <a:endParaRPr lang="en-US" dirty="0">
+              <a:solidFill>
+                <a:schemeClr val="bg1"/>
+              </a:solidFill>
+            </a:endParaRPr>
+          </a:p>
+          <a:p>
+            <a:r>
+              <a:rPr lang="en-US" dirty="0">
+                <a:solidFill>
+                  <a:schemeClr val="bg1"/>
+                </a:solidFill>
+              </a:rPr>
+              <a:t>Grade ~ Practical Attendance</a:t>
+            </a:r>
+          </a:p>
+          <a:p>
+            <a:endParaRPr lang="en-US" dirty="0">
+              <a:solidFill>
+                <a:schemeClr val="bg1"/>
+              </a:solidFill>
+            </a:endParaRPr>
+          </a:p>
+          <a:p>
+            <a:r>
+              <a:rPr lang="en-US" dirty="0">
+                <a:solidFill>
+                  <a:schemeClr val="bg1"/>
+                </a:solidFill>
+              </a:rPr>
+              <a:t>Grade ~ Lecture Attendance</a:t>
+            </a:r>
+          </a:p>
+        </p:txBody>
+      </p:sp>
+    </p:spTree>
+    <p:extLst>
+      <p:ext uri="{BB962C8B-B14F-4D97-AF65-F5344CB8AC3E}">
+        <p14:creationId xmlns:p14="http://schemas.microsoft.com/office/powerpoint/2010/main" val="301691330"/>
+      </p:ext>
+    </p:extLst>
+  </p:cSld>
+  <p:clrMapOvr>
+    <a:masterClrMapping/>
+  </p:clrMapOvr>
+</p:sld>
+</file>
+
+<file path=ppt/slides/slide22.xml><?xml version="1.0" encoding="utf-8"?>
+<p:sld xmlns:a="http://schemas.openxmlformats.org/drawingml/2006/main" xmlns:r="http://schemas.openxmlformats.org/officeDocument/2006/relationships" xmlns:p="http://schemas.openxmlformats.org/presentationml/2006/main">
+  <p:cSld>
+    <p:spTree>
+      <p:nvGrpSpPr>
+        <p:cNvPr id="1" name=""/>
+        <p:cNvGrpSpPr/>
+        <p:nvPr/>
+      </p:nvGrpSpPr>
+      <p:grpSpPr>
+        <a:xfrm>
+          <a:off x="0" y="0"/>
+          <a:ext cx="0" cy="0"/>
+          <a:chOff x="0" y="0"/>
+          <a:chExt cx="0" cy="0"/>
+        </a:xfrm>
+      </p:grpSpPr>
+      <p:sp>
+        <p:nvSpPr>
+          <p:cNvPr id="2" name="Title 1">
+            <a:extLst>
+              <a:ext uri="{FF2B5EF4-FFF2-40B4-BE49-F238E27FC236}">
+                <a16:creationId xmlns:a16="http://schemas.microsoft.com/office/drawing/2014/main" id="{921633EB-7DCB-4DDC-80AF-C885A3EE1245}"/>
+              </a:ext>
+            </a:extLst>
+          </p:cNvPr>
+          <p:cNvSpPr>
+            <a:spLocks noGrp="1"/>
+          </p:cNvSpPr>
+          <p:nvPr>
+            <p:ph type="title"/>
+          </p:nvPr>
+        </p:nvSpPr>
+        <p:spPr/>
+        <p:txBody>
+          <a:bodyPr/>
+          <a:lstStyle/>
+          <a:p>
+            <a:r>
+              <a:rPr lang="en-US" dirty="0"/>
+              <a:t>Correlation &amp; Covariance TABLE</a:t>
+            </a:r>
+          </a:p>
+        </p:txBody>
+      </p:sp>
+      <p:sp>
+        <p:nvSpPr>
+          <p:cNvPr id="4" name="Content Placeholder 3">
+            <a:extLst>
+              <a:ext uri="{FF2B5EF4-FFF2-40B4-BE49-F238E27FC236}">
+                <a16:creationId xmlns:a16="http://schemas.microsoft.com/office/drawing/2014/main" id="{15465504-73D4-37DA-85FF-7C8DD5BC71AF}"/>
+              </a:ext>
+            </a:extLst>
+          </p:cNvPr>
+          <p:cNvSpPr>
+            <a:spLocks noGrp="1"/>
+          </p:cNvSpPr>
+          <p:nvPr>
+            <p:ph sz="half" idx="1"/>
+          </p:nvPr>
+        </p:nvSpPr>
+        <p:spPr>
+          <a:xfrm>
+            <a:off x="581193" y="2228003"/>
+            <a:ext cx="5089765" cy="3633047"/>
+          </a:xfrm>
+        </p:spPr>
+        <p:txBody>
+          <a:bodyPr/>
+          <a:lstStyle/>
+          <a:p>
+            <a:r>
+              <a:rPr lang="en-US" dirty="0"/>
+              <a:t>Use of Pearson’s correlation calculation</a:t>
+            </a:r>
+          </a:p>
+          <a:p>
+            <a:pPr lvl="1"/>
+            <a:r>
+              <a:rPr lang="en-US" dirty="0"/>
+              <a:t>Expected linear relationship</a:t>
+            </a:r>
+          </a:p>
+          <a:p>
+            <a:r>
+              <a:rPr lang="en-US" dirty="0"/>
+              <a:t>2021-2022 shows a very low correlation between attendance and grade. </a:t>
+            </a:r>
+          </a:p>
+          <a:p>
+            <a:pPr lvl="1"/>
+            <a:r>
+              <a:rPr lang="en-US" dirty="0"/>
+              <a:t>Negative relationship is suggested</a:t>
+            </a:r>
+          </a:p>
+          <a:p>
+            <a:r>
+              <a:rPr lang="en-US" dirty="0"/>
+              <a:t>2022-2023 shows a stronger positive relationship</a:t>
+            </a:r>
+          </a:p>
+          <a:p>
+            <a:r>
+              <a:rPr lang="en-US" dirty="0"/>
+              <a:t>Stronger relationship between lecture attendance and grades than others.</a:t>
+            </a:r>
+          </a:p>
+          <a:p>
+            <a:endParaRPr lang="en-US" dirty="0"/>
+          </a:p>
+        </p:txBody>
+      </p:sp>
+      <p:graphicFrame>
+        <p:nvGraphicFramePr>
+          <p:cNvPr id="6" name="Table 6">
+            <a:extLst>
+              <a:ext uri="{FF2B5EF4-FFF2-40B4-BE49-F238E27FC236}">
+                <a16:creationId xmlns:a16="http://schemas.microsoft.com/office/drawing/2014/main" id="{B8453F27-AEE6-A89E-BF2C-3CD4ADD328F2}"/>
+              </a:ext>
+            </a:extLst>
+          </p:cNvPr>
+          <p:cNvGraphicFramePr>
+            <a:graphicFrameLocks noGrp="1"/>
+          </p:cNvGraphicFramePr>
+          <p:nvPr>
+            <p:ph sz="half" idx="2"/>
+            <p:extLst>
+              <p:ext uri="{D42A27DB-BD31-4B8C-83A1-F6EECF244321}">
+                <p14:modId xmlns:p14="http://schemas.microsoft.com/office/powerpoint/2010/main" val="788959195"/>
+              </p:ext>
+            </p:extLst>
+          </p:nvPr>
+        </p:nvGraphicFramePr>
+        <p:xfrm>
+          <a:off x="5771627" y="2432806"/>
+          <a:ext cx="5839182" cy="2592200"/>
+        </p:xfrm>
+        <a:graphic>
+          <a:graphicData uri="http://schemas.openxmlformats.org/drawingml/2006/table">
+            <a:tbl>
+              <a:tblPr firstRow="1" bandRow="1">
+                <a:tableStyleId>{5C22544A-7EE6-4342-B048-85BDC9FD1C3A}</a:tableStyleId>
+              </a:tblPr>
+              <a:tblGrid>
+                <a:gridCol w="648798">
+                  <a:extLst>
+                    <a:ext uri="{9D8B030D-6E8A-4147-A177-3AD203B41FA5}">
+                      <a16:colId xmlns:a16="http://schemas.microsoft.com/office/drawing/2014/main" val="3175777426"/>
+                    </a:ext>
+                  </a:extLst>
+                </a:gridCol>
+                <a:gridCol w="648798">
+                  <a:extLst>
+                    <a:ext uri="{9D8B030D-6E8A-4147-A177-3AD203B41FA5}">
+                      <a16:colId xmlns:a16="http://schemas.microsoft.com/office/drawing/2014/main" val="3063281743"/>
+                    </a:ext>
+                  </a:extLst>
+                </a:gridCol>
+                <a:gridCol w="648798">
+                  <a:extLst>
+                    <a:ext uri="{9D8B030D-6E8A-4147-A177-3AD203B41FA5}">
+                      <a16:colId xmlns:a16="http://schemas.microsoft.com/office/drawing/2014/main" val="1912613166"/>
+                    </a:ext>
+                  </a:extLst>
+                </a:gridCol>
+                <a:gridCol w="648798">
+                  <a:extLst>
+                    <a:ext uri="{9D8B030D-6E8A-4147-A177-3AD203B41FA5}">
+                      <a16:colId xmlns:a16="http://schemas.microsoft.com/office/drawing/2014/main" val="627985694"/>
+                    </a:ext>
+                  </a:extLst>
+                </a:gridCol>
+                <a:gridCol w="648798">
+                  <a:extLst>
+                    <a:ext uri="{9D8B030D-6E8A-4147-A177-3AD203B41FA5}">
+                      <a16:colId xmlns:a16="http://schemas.microsoft.com/office/drawing/2014/main" val="2633129296"/>
+                    </a:ext>
+                  </a:extLst>
+                </a:gridCol>
+                <a:gridCol w="648798">
+                  <a:extLst>
+                    <a:ext uri="{9D8B030D-6E8A-4147-A177-3AD203B41FA5}">
+                      <a16:colId xmlns:a16="http://schemas.microsoft.com/office/drawing/2014/main" val="3459378517"/>
+                    </a:ext>
+                  </a:extLst>
+                </a:gridCol>
+                <a:gridCol w="648798">
+                  <a:extLst>
+                    <a:ext uri="{9D8B030D-6E8A-4147-A177-3AD203B41FA5}">
+                      <a16:colId xmlns:a16="http://schemas.microsoft.com/office/drawing/2014/main" val="4245219144"/>
+                    </a:ext>
+                  </a:extLst>
+                </a:gridCol>
+                <a:gridCol w="648798">
+                  <a:extLst>
+                    <a:ext uri="{9D8B030D-6E8A-4147-A177-3AD203B41FA5}">
+                      <a16:colId xmlns:a16="http://schemas.microsoft.com/office/drawing/2014/main" val="1553150276"/>
+                    </a:ext>
+                  </a:extLst>
+                </a:gridCol>
+                <a:gridCol w="648798">
+                  <a:extLst>
+                    <a:ext uri="{9D8B030D-6E8A-4147-A177-3AD203B41FA5}">
+                      <a16:colId xmlns:a16="http://schemas.microsoft.com/office/drawing/2014/main" val="3076180246"/>
+                    </a:ext>
+                  </a:extLst>
+                </a:gridCol>
+              </a:tblGrid>
+              <a:tr h="1411450">
+                <a:tc>
+                  <a:txBody>
+                    <a:bodyPr/>
+                    <a:lstStyle/>
+                    <a:p>
+                      <a:r>
+                        <a:rPr lang="en-US" sz="900" b="0" dirty="0"/>
+                        <a:t>Year</a:t>
+                      </a:r>
+                      <a:endParaRPr lang="en-GB" sz="900" b="0" dirty="0"/>
+                    </a:p>
+                  </a:txBody>
+                  <a:tcPr/>
+                </a:tc>
+                <a:tc>
+                  <a:txBody>
+                    <a:bodyPr/>
+                    <a:lstStyle/>
+                    <a:p>
+                      <a:r>
+                        <a:rPr lang="en-US" sz="900" b="0" dirty="0"/>
+                        <a:t>Grade ~ Attendance</a:t>
+                      </a:r>
+                    </a:p>
+                    <a:p>
+                      <a:r>
+                        <a:rPr lang="en-US" sz="900" b="0" dirty="0"/>
+                        <a:t>Correlation</a:t>
+                      </a:r>
+                      <a:endParaRPr lang="en-GB" sz="900" b="0" dirty="0"/>
+                    </a:p>
+                  </a:txBody>
+                  <a:tcPr vert="vert"/>
+                </a:tc>
+                <a:tc>
+                  <a:txBody>
+                    <a:bodyPr/>
+                    <a:lstStyle/>
+                    <a:p>
+                      <a:r>
+                        <a:rPr lang="en-US" sz="900" b="0" dirty="0"/>
+                        <a:t>Grade ~ Attendance Covariance</a:t>
+                      </a:r>
+                      <a:endParaRPr lang="en-GB" sz="900" b="0" dirty="0"/>
+                    </a:p>
+                  </a:txBody>
+                  <a:tcPr vert="vert"/>
+                </a:tc>
+                <a:tc>
+                  <a:txBody>
+                    <a:bodyPr/>
+                    <a:lstStyle/>
+                    <a:p>
+                      <a:pPr marL="0" marR="0" lvl="0" indent="0" algn="l" defTabSz="457200" rtl="0" eaLnBrk="1" fontAlgn="auto" latinLnBrk="0" hangingPunct="1">
+                        <a:lnSpc>
+                          <a:spcPct val="100000"/>
+                        </a:lnSpc>
+                        <a:spcBef>
+                          <a:spcPts val="0"/>
+                        </a:spcBef>
+                        <a:spcAft>
+                          <a:spcPts val="0"/>
+                        </a:spcAft>
+                        <a:buClrTx/>
+                        <a:buSzTx/>
+                        <a:buFontTx/>
+                        <a:buNone/>
+                        <a:tabLst/>
+                        <a:defRPr/>
+                      </a:pPr>
+                      <a:r>
+                        <a:rPr lang="en-US" sz="900" b="0" dirty="0"/>
+                        <a:t>Grade ~ E. Attendance Correlation</a:t>
+                      </a:r>
+                      <a:endParaRPr lang="en-GB" sz="900" b="0" dirty="0"/>
+                    </a:p>
+                    <a:p>
+                      <a:endParaRPr lang="en-GB" sz="900" b="0" dirty="0"/>
+                    </a:p>
+                  </a:txBody>
+                  <a:tcPr vert="vert"/>
+                </a:tc>
+                <a:tc>
+                  <a:txBody>
+                    <a:bodyPr/>
+                    <a:lstStyle/>
+                    <a:p>
+                      <a:r>
+                        <a:rPr lang="en-US" sz="900" b="0" dirty="0"/>
+                        <a:t>Grade ~ E. Attendance Covariance</a:t>
+                      </a:r>
+                      <a:endParaRPr lang="en-GB" sz="900" b="0" dirty="0"/>
+                    </a:p>
+                  </a:txBody>
+                  <a:tcPr vert="vert"/>
+                </a:tc>
+                <a:tc>
+                  <a:txBody>
+                    <a:bodyPr/>
+                    <a:lstStyle/>
+                    <a:p>
+                      <a:pPr marL="0" marR="0" lvl="0" indent="0" algn="l" defTabSz="457200" rtl="0" eaLnBrk="1" fontAlgn="auto" latinLnBrk="0" hangingPunct="1">
+                        <a:lnSpc>
+                          <a:spcPct val="100000"/>
+                        </a:lnSpc>
+                        <a:spcBef>
+                          <a:spcPts val="0"/>
+                        </a:spcBef>
+                        <a:spcAft>
+                          <a:spcPts val="0"/>
+                        </a:spcAft>
+                        <a:buClrTx/>
+                        <a:buSzTx/>
+                        <a:buFontTx/>
+                        <a:buNone/>
+                        <a:tabLst/>
+                        <a:defRPr/>
+                      </a:pPr>
+                      <a:r>
+                        <a:rPr lang="en-US" sz="900" b="0" dirty="0"/>
+                        <a:t>Grade ~ Lecture Attendance Correlation</a:t>
+                      </a:r>
+                      <a:endParaRPr lang="en-GB" sz="900" b="0" dirty="0"/>
+                    </a:p>
+                  </a:txBody>
+                  <a:tcPr vert="vert"/>
+                </a:tc>
+                <a:tc>
+                  <a:txBody>
+                    <a:bodyPr/>
+                    <a:lstStyle/>
+                    <a:p>
+                      <a:r>
+                        <a:rPr lang="en-US" sz="1000" b="0" dirty="0"/>
+                        <a:t>Grade ~ Lecture Attendance Covariance</a:t>
+                      </a:r>
+                      <a:endParaRPr lang="en-GB" sz="1000" b="0" dirty="0"/>
+                    </a:p>
+                    <a:p>
+                      <a:endParaRPr lang="en-GB" sz="1000" b="0" dirty="0"/>
+                    </a:p>
+                  </a:txBody>
+                  <a:tcPr vert="vert"/>
+                </a:tc>
+                <a:tc>
+                  <a:txBody>
+                    <a:bodyPr/>
+                    <a:lstStyle/>
+                    <a:p>
+                      <a:pPr marL="0" marR="0" lvl="0" indent="0" algn="l" defTabSz="457200" rtl="0" eaLnBrk="1" fontAlgn="auto" latinLnBrk="0" hangingPunct="1">
+                        <a:lnSpc>
+                          <a:spcPct val="100000"/>
+                        </a:lnSpc>
+                        <a:spcBef>
+                          <a:spcPts val="0"/>
+                        </a:spcBef>
+                        <a:spcAft>
+                          <a:spcPts val="0"/>
+                        </a:spcAft>
+                        <a:buClrTx/>
+                        <a:buSzTx/>
+                        <a:buFontTx/>
+                        <a:buNone/>
+                        <a:tabLst/>
+                        <a:defRPr/>
+                      </a:pPr>
+                      <a:r>
+                        <a:rPr lang="en-US" sz="1000" b="0" dirty="0"/>
+                        <a:t>Grade ~ Practical Attendance Correlation</a:t>
+                      </a:r>
+                      <a:endParaRPr lang="en-GB" sz="1000" b="0" dirty="0"/>
+                    </a:p>
+                    <a:p>
+                      <a:endParaRPr lang="en-GB" sz="1000" b="0" dirty="0"/>
+                    </a:p>
+                  </a:txBody>
+                  <a:tcPr vert="vert"/>
+                </a:tc>
+                <a:tc>
+                  <a:txBody>
+                    <a:bodyPr/>
+                    <a:lstStyle/>
+                    <a:p>
+                      <a:r>
+                        <a:rPr lang="en-US" sz="1000" b="0" dirty="0"/>
+                        <a:t>Grade ~ Practical Attendance Covariance</a:t>
+                      </a:r>
+                      <a:endParaRPr lang="en-GB" sz="1000" b="0" dirty="0"/>
+                    </a:p>
+                    <a:p>
+                      <a:endParaRPr lang="en-GB" sz="1000" b="0" dirty="0"/>
+                    </a:p>
+                    <a:p>
+                      <a:endParaRPr lang="en-GB" sz="1000" b="0" dirty="0"/>
+                    </a:p>
+                  </a:txBody>
+                  <a:tcPr vert="vert"/>
+                </a:tc>
+                <a:extLst>
+                  <a:ext uri="{0D108BD9-81ED-4DB2-BD59-A6C34878D82A}">
+                    <a16:rowId xmlns:a16="http://schemas.microsoft.com/office/drawing/2014/main" val="1487557583"/>
+                  </a:ext>
+                </a:extLst>
+              </a:tr>
+              <a:tr h="635465">
+                <a:tc>
+                  <a:txBody>
+                    <a:bodyPr/>
+                    <a:lstStyle/>
+                    <a:p>
+                      <a:pPr algn="ctr"/>
+                      <a:r>
+                        <a:rPr lang="en-US" sz="1200" b="0" dirty="0"/>
+                        <a:t>2021-2022</a:t>
+                      </a:r>
+                      <a:endParaRPr lang="en-GB" sz="1200" b="0" dirty="0"/>
+                    </a:p>
+                  </a:txBody>
+                  <a:tcPr/>
+                </a:tc>
+                <a:tc>
+                  <a:txBody>
+                    <a:bodyPr/>
+                    <a:lstStyle/>
+                    <a:p>
+                      <a:pPr algn="ctr"/>
+                      <a:r>
+                        <a:rPr lang="en-GB" sz="1200" b="0" i="0" kern="1200" dirty="0">
+                          <a:solidFill>
+                            <a:schemeClr val="dk1"/>
+                          </a:solidFill>
+                          <a:effectLst/>
+                          <a:latin typeface="+mn-lt"/>
+                          <a:ea typeface="+mn-ea"/>
+                          <a:cs typeface="+mn-cs"/>
+                        </a:rPr>
+                        <a:t>-0.0412</a:t>
+                      </a:r>
+                      <a:endParaRPr lang="en-GB" sz="700" b="0" dirty="0"/>
+                    </a:p>
+                  </a:txBody>
+                  <a:tcPr/>
+                </a:tc>
+                <a:tc>
+                  <a:txBody>
+                    <a:bodyPr/>
+                    <a:lstStyle/>
+                    <a:p>
+                      <a:pPr algn="ctr"/>
+                      <a:r>
+                        <a:rPr lang="en-GB" sz="1200" b="0" i="0" kern="1200" dirty="0">
+                          <a:solidFill>
+                            <a:schemeClr val="dk1"/>
+                          </a:solidFill>
+                          <a:effectLst/>
+                          <a:latin typeface="+mn-lt"/>
+                          <a:ea typeface="+mn-ea"/>
+                          <a:cs typeface="+mn-cs"/>
+                        </a:rPr>
+                        <a:t>-0.9010</a:t>
+                      </a:r>
+                      <a:endParaRPr lang="en-GB" sz="700" b="0" dirty="0"/>
+                    </a:p>
+                  </a:txBody>
+                  <a:tcPr/>
+                </a:tc>
+                <a:tc>
+                  <a:txBody>
+                    <a:bodyPr/>
+                    <a:lstStyle/>
+                    <a:p>
+                      <a:pPr algn="ctr"/>
+                      <a:r>
+                        <a:rPr lang="en-GB" sz="1200" b="0" i="0" kern="1200" dirty="0">
+                          <a:solidFill>
+                            <a:schemeClr val="dk1"/>
+                          </a:solidFill>
+                          <a:effectLst/>
+                          <a:latin typeface="+mn-lt"/>
+                          <a:ea typeface="+mn-ea"/>
+                          <a:cs typeface="+mn-cs"/>
+                        </a:rPr>
+                        <a:t>-0.038</a:t>
+                      </a:r>
+                      <a:endParaRPr lang="en-GB" sz="900" b="0" dirty="0"/>
+                    </a:p>
+                  </a:txBody>
+                  <a:tcPr/>
+                </a:tc>
+                <a:tc>
+                  <a:txBody>
+                    <a:bodyPr/>
+                    <a:lstStyle/>
+                    <a:p>
+                      <a:pPr algn="ctr"/>
+                      <a:r>
+                        <a:rPr lang="en-GB" sz="1200" b="0" i="0" kern="1200" dirty="0">
+                          <a:solidFill>
+                            <a:schemeClr val="dk1"/>
+                          </a:solidFill>
+                          <a:effectLst/>
+                          <a:latin typeface="+mn-lt"/>
+                          <a:ea typeface="+mn-ea"/>
+                          <a:cs typeface="+mn-cs"/>
+                        </a:rPr>
+                        <a:t>-1.2983</a:t>
+                      </a:r>
+                      <a:endParaRPr lang="en-GB" sz="900" b="0" dirty="0"/>
+                    </a:p>
+                  </a:txBody>
+                  <a:tcPr/>
+                </a:tc>
+                <a:tc>
+                  <a:txBody>
+                    <a:bodyPr/>
+                    <a:lstStyle/>
+                    <a:p>
+                      <a:pPr algn="ctr"/>
+                      <a:r>
+                        <a:rPr lang="en-GB" sz="1200" b="0" i="0" kern="1200" dirty="0">
+                          <a:solidFill>
+                            <a:schemeClr val="dk1"/>
+                          </a:solidFill>
+                          <a:effectLst/>
+                          <a:latin typeface="+mn-lt"/>
+                          <a:ea typeface="+mn-ea"/>
+                          <a:cs typeface="+mn-cs"/>
+                        </a:rPr>
+                        <a:t>0.0818</a:t>
+                      </a:r>
+                      <a:endParaRPr lang="en-GB" sz="900" b="0" dirty="0"/>
+                    </a:p>
+                  </a:txBody>
+                  <a:tcPr/>
+                </a:tc>
+                <a:tc>
+                  <a:txBody>
+                    <a:bodyPr/>
+                    <a:lstStyle/>
+                    <a:p>
+                      <a:pPr algn="ctr"/>
+                      <a:r>
+                        <a:rPr lang="en-GB" sz="1200" b="0" i="0" kern="1200" dirty="0">
+                          <a:solidFill>
+                            <a:schemeClr val="dk1"/>
+                          </a:solidFill>
+                          <a:effectLst/>
+                          <a:latin typeface="+mn-lt"/>
+                          <a:ea typeface="+mn-ea"/>
+                          <a:cs typeface="+mn-cs"/>
+                        </a:rPr>
+                        <a:t>3.4275</a:t>
+                      </a:r>
+                      <a:endParaRPr lang="en-GB" sz="900" b="0" dirty="0"/>
+                    </a:p>
+                  </a:txBody>
+                  <a:tcPr/>
+                </a:tc>
+                <a:tc>
+                  <a:txBody>
+                    <a:bodyPr/>
+                    <a:lstStyle/>
+                    <a:p>
+                      <a:pPr algn="ctr"/>
+                      <a:r>
+                        <a:rPr lang="en-GB" sz="1200" b="0" i="0" kern="1200" dirty="0">
+                          <a:solidFill>
+                            <a:schemeClr val="dk1"/>
+                          </a:solidFill>
+                          <a:effectLst/>
+                          <a:latin typeface="+mn-lt"/>
+                          <a:ea typeface="+mn-ea"/>
+                          <a:cs typeface="+mn-cs"/>
+                        </a:rPr>
+                        <a:t>-0.1318</a:t>
+                      </a:r>
+                      <a:endParaRPr lang="en-GB" sz="900" b="0" dirty="0"/>
+                    </a:p>
+                  </a:txBody>
+                  <a:tcPr/>
+                </a:tc>
+                <a:tc>
+                  <a:txBody>
+                    <a:bodyPr/>
+                    <a:lstStyle/>
+                    <a:p>
+                      <a:pPr algn="ctr"/>
+                      <a:r>
+                        <a:rPr lang="en-GB" sz="1200" b="0" i="0" kern="1200" dirty="0">
+                          <a:solidFill>
+                            <a:schemeClr val="dk1"/>
+                          </a:solidFill>
+                          <a:effectLst/>
+                          <a:latin typeface="+mn-lt"/>
+                          <a:ea typeface="+mn-ea"/>
+                          <a:cs typeface="+mn-cs"/>
+                        </a:rPr>
+                        <a:t>-4.8588</a:t>
+                      </a:r>
+                      <a:endParaRPr lang="en-GB" sz="900" b="0" dirty="0"/>
+                    </a:p>
+                  </a:txBody>
+                  <a:tcPr/>
+                </a:tc>
+                <a:extLst>
+                  <a:ext uri="{0D108BD9-81ED-4DB2-BD59-A6C34878D82A}">
+                    <a16:rowId xmlns:a16="http://schemas.microsoft.com/office/drawing/2014/main" val="3228881547"/>
+                  </a:ext>
+                </a:extLst>
+              </a:tr>
+              <a:tr h="545285">
+                <a:tc>
+                  <a:txBody>
+                    <a:bodyPr/>
+                    <a:lstStyle/>
+                    <a:p>
+                      <a:pPr algn="ctr"/>
+                      <a:r>
+                        <a:rPr lang="en-US" sz="1200" b="0" dirty="0"/>
+                        <a:t>2022-2023</a:t>
+                      </a:r>
+                      <a:endParaRPr lang="en-GB" sz="1200" b="0" dirty="0"/>
+                    </a:p>
+                  </a:txBody>
+                  <a:tcPr/>
+                </a:tc>
+                <a:tc>
+                  <a:txBody>
+                    <a:bodyPr/>
+                    <a:lstStyle/>
+                    <a:p>
+                      <a:pPr algn="ctr"/>
+                      <a:r>
+                        <a:rPr lang="en-GB" sz="1200" b="0" i="0" kern="1200" dirty="0">
+                          <a:solidFill>
+                            <a:schemeClr val="dk1"/>
+                          </a:solidFill>
+                          <a:effectLst/>
+                          <a:latin typeface="+mn-lt"/>
+                          <a:ea typeface="+mn-ea"/>
+                          <a:cs typeface="+mn-cs"/>
+                        </a:rPr>
+                        <a:t>0.5349</a:t>
+                      </a:r>
+                      <a:endParaRPr lang="en-GB" sz="700" b="0" dirty="0"/>
+                    </a:p>
+                  </a:txBody>
+                  <a:tcPr/>
+                </a:tc>
+                <a:tc>
+                  <a:txBody>
+                    <a:bodyPr/>
+                    <a:lstStyle/>
+                    <a:p>
+                      <a:pPr algn="ctr"/>
+                      <a:r>
+                        <a:rPr lang="en-GB" sz="1200" b="0" i="0" kern="1200" dirty="0">
+                          <a:solidFill>
+                            <a:schemeClr val="dk1"/>
+                          </a:solidFill>
+                          <a:effectLst/>
+                          <a:latin typeface="+mn-lt"/>
+                          <a:ea typeface="+mn-ea"/>
+                          <a:cs typeface="+mn-cs"/>
+                        </a:rPr>
+                        <a:t>12.703</a:t>
+                      </a:r>
+                      <a:endParaRPr lang="en-GB" sz="700" b="0" dirty="0"/>
+                    </a:p>
+                  </a:txBody>
+                  <a:tcPr/>
+                </a:tc>
+                <a:tc>
+                  <a:txBody>
+                    <a:bodyPr/>
+                    <a:lstStyle/>
+                    <a:p>
+                      <a:pPr algn="ctr"/>
+                      <a:r>
+                        <a:rPr lang="en-GB" sz="1200" b="0" i="0" kern="1200" dirty="0">
+                          <a:solidFill>
+                            <a:schemeClr val="dk1"/>
+                          </a:solidFill>
+                          <a:effectLst/>
+                          <a:latin typeface="+mn-lt"/>
+                          <a:ea typeface="+mn-ea"/>
+                          <a:cs typeface="+mn-cs"/>
+                        </a:rPr>
+                        <a:t>0.5356</a:t>
+                      </a:r>
+                      <a:endParaRPr lang="en-GB" sz="900" b="0" dirty="0"/>
+                    </a:p>
+                  </a:txBody>
+                  <a:tcPr/>
+                </a:tc>
+                <a:tc>
+                  <a:txBody>
+                    <a:bodyPr/>
+                    <a:lstStyle/>
+                    <a:p>
+                      <a:pPr algn="ctr"/>
+                      <a:r>
+                        <a:rPr lang="en-GB" sz="1200" b="0" i="0" kern="1200" dirty="0">
+                          <a:solidFill>
+                            <a:schemeClr val="dk1"/>
+                          </a:solidFill>
+                          <a:effectLst/>
+                          <a:latin typeface="+mn-lt"/>
+                          <a:ea typeface="+mn-ea"/>
+                          <a:cs typeface="+mn-cs"/>
+                        </a:rPr>
+                        <a:t>19.367</a:t>
+                      </a:r>
+                      <a:endParaRPr lang="en-GB" sz="900" b="0" dirty="0"/>
+                    </a:p>
+                  </a:txBody>
+                  <a:tcPr/>
+                </a:tc>
+                <a:tc>
+                  <a:txBody>
+                    <a:bodyPr/>
+                    <a:lstStyle/>
+                    <a:p>
+                      <a:pPr algn="ctr"/>
+                      <a:r>
+                        <a:rPr lang="en-GB" sz="1200" b="0" i="0" kern="1200" dirty="0">
+                          <a:solidFill>
+                            <a:schemeClr val="dk1"/>
+                          </a:solidFill>
+                          <a:effectLst/>
+                          <a:latin typeface="+mn-lt"/>
+                          <a:ea typeface="+mn-ea"/>
+                          <a:cs typeface="+mn-cs"/>
+                        </a:rPr>
+                        <a:t>0.5054</a:t>
+                      </a:r>
+                      <a:endParaRPr lang="en-GB" sz="900" b="0" dirty="0"/>
+                    </a:p>
+                  </a:txBody>
+                  <a:tcPr/>
+                </a:tc>
+                <a:tc>
+                  <a:txBody>
+                    <a:bodyPr/>
+                    <a:lstStyle/>
+                    <a:p>
+                      <a:pPr algn="ctr"/>
+                      <a:r>
+                        <a:rPr lang="en-GB" sz="1200" b="0" i="0" kern="1200" dirty="0">
+                          <a:solidFill>
+                            <a:schemeClr val="dk1"/>
+                          </a:solidFill>
+                          <a:effectLst/>
+                          <a:latin typeface="+mn-lt"/>
+                          <a:ea typeface="+mn-ea"/>
+                          <a:cs typeface="+mn-cs"/>
+                        </a:rPr>
+                        <a:t>22.384</a:t>
+                      </a:r>
+                      <a:endParaRPr lang="en-GB" sz="900" b="0" dirty="0"/>
+                    </a:p>
+                  </a:txBody>
+                  <a:tcPr/>
+                </a:tc>
+                <a:tc>
+                  <a:txBody>
+                    <a:bodyPr/>
+                    <a:lstStyle/>
+                    <a:p>
+                      <a:pPr algn="ctr"/>
+                      <a:r>
+                        <a:rPr lang="en-GB" sz="1200" b="0" i="0" kern="1200" dirty="0">
+                          <a:solidFill>
+                            <a:schemeClr val="dk1"/>
+                          </a:solidFill>
+                          <a:effectLst/>
+                          <a:latin typeface="+mn-lt"/>
+                          <a:ea typeface="+mn-ea"/>
+                          <a:cs typeface="+mn-cs"/>
+                        </a:rPr>
+                        <a:t>0.4052</a:t>
+                      </a:r>
+                      <a:endParaRPr lang="en-GB" sz="900" b="0" dirty="0"/>
+                    </a:p>
+                  </a:txBody>
+                  <a:tcPr/>
+                </a:tc>
+                <a:tc>
+                  <a:txBody>
+                    <a:bodyPr/>
+                    <a:lstStyle/>
+                    <a:p>
+                      <a:pPr algn="ctr"/>
+                      <a:r>
+                        <a:rPr lang="en-GB" sz="1200" b="0" i="0" kern="1200" dirty="0">
+                          <a:solidFill>
+                            <a:schemeClr val="dk1"/>
+                          </a:solidFill>
+                          <a:effectLst/>
+                          <a:latin typeface="+mn-lt"/>
+                          <a:ea typeface="+mn-ea"/>
+                          <a:cs typeface="+mn-cs"/>
+                        </a:rPr>
+                        <a:t>16.692</a:t>
+                      </a:r>
+                      <a:endParaRPr lang="en-GB" sz="900" b="0" dirty="0"/>
+                    </a:p>
+                  </a:txBody>
+                  <a:tcPr/>
+                </a:tc>
+                <a:extLst>
+                  <a:ext uri="{0D108BD9-81ED-4DB2-BD59-A6C34878D82A}">
+                    <a16:rowId xmlns:a16="http://schemas.microsoft.com/office/drawing/2014/main" val="859004804"/>
+                  </a:ext>
+                </a:extLst>
+              </a:tr>
+            </a:tbl>
+          </a:graphicData>
+        </a:graphic>
+      </p:graphicFrame>
+    </p:spTree>
+    <p:extLst>
+      <p:ext uri="{BB962C8B-B14F-4D97-AF65-F5344CB8AC3E}">
+        <p14:creationId xmlns:p14="http://schemas.microsoft.com/office/powerpoint/2010/main" val="4022326446"/>
+      </p:ext>
+    </p:extLst>
+  </p:cSld>
+  <p:clrMapOvr>
+    <a:masterClrMapping/>
+  </p:clrMapOvr>
+</p:sld>
+</file>
+
+<file path=ppt/slides/slide23.xml><?xml version="1.0" encoding="utf-8"?>
+<p:sld xmlns:a="http://schemas.openxmlformats.org/drawingml/2006/main" xmlns:r="http://schemas.openxmlformats.org/officeDocument/2006/relationships" xmlns:p="http://schemas.openxmlformats.org/presentationml/2006/main">
+  <p:cSld>
+    <p:spTree>
+      <p:nvGrpSpPr>
+        <p:cNvPr id="1" name=""/>
+        <p:cNvGrpSpPr/>
+        <p:nvPr/>
+      </p:nvGrpSpPr>
+      <p:grpSpPr>
+        <a:xfrm>
+          <a:off x="0" y="0"/>
+          <a:ext cx="0" cy="0"/>
+          <a:chOff x="0" y="0"/>
+          <a:chExt cx="0" cy="0"/>
+        </a:xfrm>
+      </p:grpSpPr>
+      <p:sp>
+        <p:nvSpPr>
+          <p:cNvPr id="2" name="Title 1">
+            <a:extLst>
+              <a:ext uri="{FF2B5EF4-FFF2-40B4-BE49-F238E27FC236}">
+                <a16:creationId xmlns:a16="http://schemas.microsoft.com/office/drawing/2014/main" id="{921633EB-7DCB-4DDC-80AF-C885A3EE1245}"/>
+              </a:ext>
+            </a:extLst>
+          </p:cNvPr>
+          <p:cNvSpPr>
+            <a:spLocks noGrp="1"/>
+          </p:cNvSpPr>
+          <p:nvPr>
+            <p:ph type="title"/>
+          </p:nvPr>
+        </p:nvSpPr>
+        <p:spPr/>
+        <p:txBody>
+          <a:bodyPr/>
+          <a:lstStyle/>
+          <a:p>
+            <a:r>
+              <a:rPr lang="en-US" dirty="0"/>
+              <a:t>Correlation &amp; Covariance TABLE</a:t>
+            </a:r>
+          </a:p>
+        </p:txBody>
+      </p:sp>
+      <p:sp>
+        <p:nvSpPr>
+          <p:cNvPr id="4" name="Content Placeholder 3">
+            <a:extLst>
+              <a:ext uri="{FF2B5EF4-FFF2-40B4-BE49-F238E27FC236}">
+                <a16:creationId xmlns:a16="http://schemas.microsoft.com/office/drawing/2014/main" id="{15465504-73D4-37DA-85FF-7C8DD5BC71AF}"/>
+              </a:ext>
+            </a:extLst>
+          </p:cNvPr>
+          <p:cNvSpPr>
+            <a:spLocks noGrp="1"/>
+          </p:cNvSpPr>
+          <p:nvPr>
+            <p:ph sz="half" idx="1"/>
+          </p:nvPr>
+        </p:nvSpPr>
+        <p:spPr>
+          <a:xfrm>
+            <a:off x="581193" y="2228003"/>
+            <a:ext cx="5089765" cy="4164408"/>
+          </a:xfrm>
+        </p:spPr>
+        <p:txBody>
+          <a:bodyPr>
+            <a:normAutofit/>
+          </a:bodyPr>
+          <a:lstStyle/>
+          <a:p>
+            <a:r>
+              <a:rPr lang="en-US" dirty="0"/>
+              <a:t>Use of Spearman’s Correlation</a:t>
+            </a:r>
+          </a:p>
+          <a:p>
+            <a:pPr lvl="1"/>
+            <a:r>
+              <a:rPr lang="en-US" dirty="0"/>
+              <a:t>Better for monotonic relationship identification</a:t>
+            </a:r>
+          </a:p>
+          <a:p>
+            <a:r>
+              <a:rPr lang="en-US" dirty="0"/>
+              <a:t>Higher correlation value suggests relationship is more linear than monotonic (2022-2023), though difference is very small, especially for lecture attendance.</a:t>
+            </a:r>
+          </a:p>
+          <a:p>
+            <a:r>
+              <a:rPr lang="en-US" dirty="0"/>
+              <a:t>2021-2022 data suggests otherwise, but difference is still very slight and correlation value is very close to zero in all four cases baring Practical attendance.</a:t>
+            </a:r>
+          </a:p>
+          <a:p>
+            <a:endParaRPr lang="en-US" dirty="0"/>
+          </a:p>
+        </p:txBody>
+      </p:sp>
+      <p:graphicFrame>
+        <p:nvGraphicFramePr>
+          <p:cNvPr id="6" name="Table 6">
+            <a:extLst>
+              <a:ext uri="{FF2B5EF4-FFF2-40B4-BE49-F238E27FC236}">
+                <a16:creationId xmlns:a16="http://schemas.microsoft.com/office/drawing/2014/main" id="{B8453F27-AEE6-A89E-BF2C-3CD4ADD328F2}"/>
+              </a:ext>
+            </a:extLst>
+          </p:cNvPr>
+          <p:cNvGraphicFramePr>
+            <a:graphicFrameLocks noGrp="1"/>
+          </p:cNvGraphicFramePr>
+          <p:nvPr>
+            <p:ph sz="half" idx="2"/>
+            <p:extLst>
+              <p:ext uri="{D42A27DB-BD31-4B8C-83A1-F6EECF244321}">
+                <p14:modId xmlns:p14="http://schemas.microsoft.com/office/powerpoint/2010/main" val="803107712"/>
+              </p:ext>
+            </p:extLst>
+          </p:nvPr>
+        </p:nvGraphicFramePr>
+        <p:xfrm>
+          <a:off x="5771627" y="2432806"/>
+          <a:ext cx="5839182" cy="2592200"/>
+        </p:xfrm>
+        <a:graphic>
+          <a:graphicData uri="http://schemas.openxmlformats.org/drawingml/2006/table">
+            <a:tbl>
+              <a:tblPr firstRow="1" bandRow="1">
+                <a:tableStyleId>{5C22544A-7EE6-4342-B048-85BDC9FD1C3A}</a:tableStyleId>
+              </a:tblPr>
+              <a:tblGrid>
+                <a:gridCol w="648798">
+                  <a:extLst>
+                    <a:ext uri="{9D8B030D-6E8A-4147-A177-3AD203B41FA5}">
+                      <a16:colId xmlns:a16="http://schemas.microsoft.com/office/drawing/2014/main" val="3175777426"/>
+                    </a:ext>
+                  </a:extLst>
+                </a:gridCol>
+                <a:gridCol w="648798">
+                  <a:extLst>
+                    <a:ext uri="{9D8B030D-6E8A-4147-A177-3AD203B41FA5}">
+                      <a16:colId xmlns:a16="http://schemas.microsoft.com/office/drawing/2014/main" val="3063281743"/>
+                    </a:ext>
+                  </a:extLst>
+                </a:gridCol>
+                <a:gridCol w="648798">
+                  <a:extLst>
+                    <a:ext uri="{9D8B030D-6E8A-4147-A177-3AD203B41FA5}">
+                      <a16:colId xmlns:a16="http://schemas.microsoft.com/office/drawing/2014/main" val="1912613166"/>
+                    </a:ext>
+                  </a:extLst>
+                </a:gridCol>
+                <a:gridCol w="648798">
+                  <a:extLst>
+                    <a:ext uri="{9D8B030D-6E8A-4147-A177-3AD203B41FA5}">
+                      <a16:colId xmlns:a16="http://schemas.microsoft.com/office/drawing/2014/main" val="627985694"/>
+                    </a:ext>
+                  </a:extLst>
+                </a:gridCol>
+                <a:gridCol w="648798">
+                  <a:extLst>
+                    <a:ext uri="{9D8B030D-6E8A-4147-A177-3AD203B41FA5}">
+                      <a16:colId xmlns:a16="http://schemas.microsoft.com/office/drawing/2014/main" val="2633129296"/>
+                    </a:ext>
+                  </a:extLst>
+                </a:gridCol>
+                <a:gridCol w="648798">
+                  <a:extLst>
+                    <a:ext uri="{9D8B030D-6E8A-4147-A177-3AD203B41FA5}">
+                      <a16:colId xmlns:a16="http://schemas.microsoft.com/office/drawing/2014/main" val="3459378517"/>
+                    </a:ext>
+                  </a:extLst>
+                </a:gridCol>
+                <a:gridCol w="648798">
+                  <a:extLst>
+                    <a:ext uri="{9D8B030D-6E8A-4147-A177-3AD203B41FA5}">
+                      <a16:colId xmlns:a16="http://schemas.microsoft.com/office/drawing/2014/main" val="4245219144"/>
+                    </a:ext>
+                  </a:extLst>
+                </a:gridCol>
+                <a:gridCol w="648798">
+                  <a:extLst>
+                    <a:ext uri="{9D8B030D-6E8A-4147-A177-3AD203B41FA5}">
+                      <a16:colId xmlns:a16="http://schemas.microsoft.com/office/drawing/2014/main" val="1553150276"/>
+                    </a:ext>
+                  </a:extLst>
+                </a:gridCol>
+                <a:gridCol w="648798">
+                  <a:extLst>
+                    <a:ext uri="{9D8B030D-6E8A-4147-A177-3AD203B41FA5}">
+                      <a16:colId xmlns:a16="http://schemas.microsoft.com/office/drawing/2014/main" val="3076180246"/>
+                    </a:ext>
+                  </a:extLst>
+                </a:gridCol>
+              </a:tblGrid>
+              <a:tr h="1411450">
+                <a:tc>
+                  <a:txBody>
+                    <a:bodyPr/>
+                    <a:lstStyle/>
+                    <a:p>
+                      <a:r>
+                        <a:rPr lang="en-US" sz="900" b="0" dirty="0"/>
+                        <a:t>Year</a:t>
+                      </a:r>
+                      <a:endParaRPr lang="en-GB" sz="900" b="0" dirty="0"/>
+                    </a:p>
+                  </a:txBody>
+                  <a:tcPr/>
+                </a:tc>
+                <a:tc>
+                  <a:txBody>
+                    <a:bodyPr/>
+                    <a:lstStyle/>
+                    <a:p>
+                      <a:r>
+                        <a:rPr lang="en-US" sz="900" b="0" dirty="0"/>
+                        <a:t>Grade ~ Attendance</a:t>
+                      </a:r>
+                    </a:p>
+                    <a:p>
+                      <a:r>
+                        <a:rPr lang="en-US" sz="900" b="0" dirty="0"/>
+                        <a:t>Correlation</a:t>
+                      </a:r>
+                      <a:endParaRPr lang="en-GB" sz="900" b="0" dirty="0"/>
+                    </a:p>
+                  </a:txBody>
+                  <a:tcPr vert="vert"/>
+                </a:tc>
+                <a:tc>
+                  <a:txBody>
+                    <a:bodyPr/>
+                    <a:lstStyle/>
+                    <a:p>
+                      <a:r>
+                        <a:rPr lang="en-US" sz="900" b="0" dirty="0"/>
+                        <a:t>Grade ~ Attendance Covariance</a:t>
+                      </a:r>
+                      <a:endParaRPr lang="en-GB" sz="900" b="0" dirty="0"/>
+                    </a:p>
+                  </a:txBody>
+                  <a:tcPr vert="vert"/>
+                </a:tc>
+                <a:tc>
+                  <a:txBody>
+                    <a:bodyPr/>
+                    <a:lstStyle/>
+                    <a:p>
+                      <a:pPr marL="0" marR="0" lvl="0" indent="0" algn="l" defTabSz="457200" rtl="0" eaLnBrk="1" fontAlgn="auto" latinLnBrk="0" hangingPunct="1">
+                        <a:lnSpc>
+                          <a:spcPct val="100000"/>
+                        </a:lnSpc>
+                        <a:spcBef>
+                          <a:spcPts val="0"/>
+                        </a:spcBef>
+                        <a:spcAft>
+                          <a:spcPts val="0"/>
+                        </a:spcAft>
+                        <a:buClrTx/>
+                        <a:buSzTx/>
+                        <a:buFontTx/>
+                        <a:buNone/>
+                        <a:tabLst/>
+                        <a:defRPr/>
+                      </a:pPr>
+                      <a:r>
+                        <a:rPr lang="en-US" sz="900" b="0" dirty="0"/>
+                        <a:t>Grade ~ E. Attendance Correlation</a:t>
+                      </a:r>
+                      <a:endParaRPr lang="en-GB" sz="900" b="0" dirty="0"/>
+                    </a:p>
+                    <a:p>
+                      <a:endParaRPr lang="en-GB" sz="900" b="0" dirty="0"/>
+                    </a:p>
+                  </a:txBody>
+                  <a:tcPr vert="vert"/>
+                </a:tc>
+                <a:tc>
+                  <a:txBody>
+                    <a:bodyPr/>
+                    <a:lstStyle/>
+                    <a:p>
+                      <a:r>
+                        <a:rPr lang="en-US" sz="900" b="0" dirty="0"/>
+                        <a:t>Grade ~ E. Attendance Covariance</a:t>
+                      </a:r>
+                      <a:endParaRPr lang="en-GB" sz="900" b="0" dirty="0"/>
+                    </a:p>
+                  </a:txBody>
+                  <a:tcPr vert="vert"/>
+                </a:tc>
+                <a:tc>
+                  <a:txBody>
+                    <a:bodyPr/>
+                    <a:lstStyle/>
+                    <a:p>
+                      <a:pPr marL="0" marR="0" lvl="0" indent="0" algn="l" defTabSz="457200" rtl="0" eaLnBrk="1" fontAlgn="auto" latinLnBrk="0" hangingPunct="1">
+                        <a:lnSpc>
+                          <a:spcPct val="100000"/>
+                        </a:lnSpc>
+                        <a:spcBef>
+                          <a:spcPts val="0"/>
+                        </a:spcBef>
+                        <a:spcAft>
+                          <a:spcPts val="0"/>
+                        </a:spcAft>
+                        <a:buClrTx/>
+                        <a:buSzTx/>
+                        <a:buFontTx/>
+                        <a:buNone/>
+                        <a:tabLst/>
+                        <a:defRPr/>
+                      </a:pPr>
+                      <a:r>
+                        <a:rPr lang="en-US" sz="900" b="0" dirty="0"/>
+                        <a:t>Grade ~ Lecture Attendance Correlation</a:t>
+                      </a:r>
+                      <a:endParaRPr lang="en-GB" sz="900" b="0" dirty="0"/>
+                    </a:p>
+                  </a:txBody>
+                  <a:tcPr vert="vert"/>
+                </a:tc>
+                <a:tc>
+                  <a:txBody>
+                    <a:bodyPr/>
+                    <a:lstStyle/>
+                    <a:p>
+                      <a:r>
+                        <a:rPr lang="en-US" sz="1000" b="0" dirty="0"/>
+                        <a:t>Grade ~ Lecture Attendance Covariance</a:t>
+                      </a:r>
+                      <a:endParaRPr lang="en-GB" sz="1000" b="0" dirty="0"/>
+                    </a:p>
+                    <a:p>
+                      <a:endParaRPr lang="en-GB" sz="1000" b="0" dirty="0"/>
+                    </a:p>
+                  </a:txBody>
+                  <a:tcPr vert="vert"/>
+                </a:tc>
+                <a:tc>
+                  <a:txBody>
+                    <a:bodyPr/>
+                    <a:lstStyle/>
+                    <a:p>
+                      <a:pPr marL="0" marR="0" lvl="0" indent="0" algn="l" defTabSz="457200" rtl="0" eaLnBrk="1" fontAlgn="auto" latinLnBrk="0" hangingPunct="1">
+                        <a:lnSpc>
+                          <a:spcPct val="100000"/>
+                        </a:lnSpc>
+                        <a:spcBef>
+                          <a:spcPts val="0"/>
+                        </a:spcBef>
+                        <a:spcAft>
+                          <a:spcPts val="0"/>
+                        </a:spcAft>
+                        <a:buClrTx/>
+                        <a:buSzTx/>
+                        <a:buFontTx/>
+                        <a:buNone/>
+                        <a:tabLst/>
+                        <a:defRPr/>
+                      </a:pPr>
+                      <a:r>
+                        <a:rPr lang="en-US" sz="1000" b="0" dirty="0"/>
+                        <a:t>Grade ~ Practical Attendance Correlation</a:t>
+                      </a:r>
+                      <a:endParaRPr lang="en-GB" sz="1000" b="0" dirty="0"/>
+                    </a:p>
+                    <a:p>
+                      <a:endParaRPr lang="en-GB" sz="1000" b="0" dirty="0"/>
+                    </a:p>
+                  </a:txBody>
+                  <a:tcPr vert="vert"/>
+                </a:tc>
+                <a:tc>
+                  <a:txBody>
+                    <a:bodyPr/>
+                    <a:lstStyle/>
+                    <a:p>
+                      <a:r>
+                        <a:rPr lang="en-US" sz="1000" b="0" dirty="0"/>
+                        <a:t>Grade ~ Practical Attendance Covariance</a:t>
+                      </a:r>
+                      <a:endParaRPr lang="en-GB" sz="1000" b="0" dirty="0"/>
+                    </a:p>
+                    <a:p>
+                      <a:endParaRPr lang="en-GB" sz="1000" b="0" dirty="0"/>
+                    </a:p>
+                    <a:p>
+                      <a:endParaRPr lang="en-GB" sz="1000" b="0" dirty="0"/>
+                    </a:p>
+                  </a:txBody>
+                  <a:tcPr vert="vert"/>
+                </a:tc>
+                <a:extLst>
+                  <a:ext uri="{0D108BD9-81ED-4DB2-BD59-A6C34878D82A}">
+                    <a16:rowId xmlns:a16="http://schemas.microsoft.com/office/drawing/2014/main" val="1487557583"/>
+                  </a:ext>
+                </a:extLst>
+              </a:tr>
+              <a:tr h="635465">
+                <a:tc>
+                  <a:txBody>
+                    <a:bodyPr/>
+                    <a:lstStyle/>
+                    <a:p>
+                      <a:pPr algn="ctr"/>
+                      <a:r>
+                        <a:rPr lang="en-US" sz="1200" b="0" dirty="0"/>
+                        <a:t>2021-2022</a:t>
+                      </a:r>
+                      <a:endParaRPr lang="en-GB" sz="1200" b="0" dirty="0"/>
+                    </a:p>
+                  </a:txBody>
+                  <a:tcPr/>
+                </a:tc>
+                <a:tc>
+                  <a:txBody>
+                    <a:bodyPr/>
+                    <a:lstStyle/>
+                    <a:p>
+                      <a:pPr algn="ctr"/>
+                      <a:r>
+                        <a:rPr lang="en-GB" sz="1200" b="0" i="0" kern="1200" dirty="0">
+                          <a:solidFill>
+                            <a:schemeClr val="dk1"/>
+                          </a:solidFill>
+                          <a:effectLst/>
+                          <a:latin typeface="+mn-lt"/>
+                          <a:ea typeface="+mn-ea"/>
+                          <a:cs typeface="+mn-cs"/>
+                        </a:rPr>
+                        <a:t>-0.057</a:t>
+                      </a:r>
+                      <a:endParaRPr lang="en-GB" sz="1200" b="0" dirty="0"/>
+                    </a:p>
+                  </a:txBody>
+                  <a:tcPr/>
+                </a:tc>
+                <a:tc>
+                  <a:txBody>
+                    <a:bodyPr/>
+                    <a:lstStyle/>
+                    <a:p>
+                      <a:pPr algn="ctr"/>
+                      <a:r>
+                        <a:rPr lang="en-GB" sz="1200" b="0" i="0" kern="1200" dirty="0">
+                          <a:solidFill>
+                            <a:schemeClr val="dk1"/>
+                          </a:solidFill>
+                          <a:effectLst/>
+                          <a:latin typeface="+mn-lt"/>
+                          <a:ea typeface="+mn-ea"/>
+                          <a:cs typeface="+mn-cs"/>
+                        </a:rPr>
+                        <a:t>-23.225</a:t>
+                      </a:r>
+                      <a:endParaRPr lang="en-GB" sz="1200" b="0" dirty="0"/>
+                    </a:p>
+                  </a:txBody>
+                  <a:tcPr/>
+                </a:tc>
+                <a:tc>
+                  <a:txBody>
+                    <a:bodyPr/>
+                    <a:lstStyle/>
+                    <a:p>
+                      <a:pPr algn="ctr"/>
+                      <a:r>
+                        <a:rPr lang="en-GB" sz="1200" b="0" i="0" kern="1200" dirty="0">
+                          <a:solidFill>
+                            <a:schemeClr val="dk1"/>
+                          </a:solidFill>
+                          <a:effectLst/>
+                          <a:latin typeface="+mn-lt"/>
+                          <a:ea typeface="+mn-ea"/>
+                          <a:cs typeface="+mn-cs"/>
+                        </a:rPr>
+                        <a:t>-0.057</a:t>
+                      </a:r>
+                      <a:endParaRPr lang="en-GB" sz="1200" b="0" dirty="0"/>
+                    </a:p>
+                  </a:txBody>
+                  <a:tcPr/>
+                </a:tc>
+                <a:tc>
+                  <a:txBody>
+                    <a:bodyPr/>
+                    <a:lstStyle/>
+                    <a:p>
+                      <a:pPr algn="ctr"/>
+                      <a:r>
+                        <a:rPr lang="en-GB" sz="1200" b="0" i="0" kern="1200" dirty="0">
+                          <a:solidFill>
+                            <a:schemeClr val="dk1"/>
+                          </a:solidFill>
+                          <a:effectLst/>
+                          <a:latin typeface="+mn-lt"/>
+                          <a:ea typeface="+mn-ea"/>
+                          <a:cs typeface="+mn-cs"/>
+                        </a:rPr>
+                        <a:t>-23.225</a:t>
+                      </a:r>
+                      <a:endParaRPr lang="en-GB" sz="1200" b="0" dirty="0"/>
+                    </a:p>
+                  </a:txBody>
+                  <a:tcPr/>
+                </a:tc>
+                <a:tc>
+                  <a:txBody>
+                    <a:bodyPr/>
+                    <a:lstStyle/>
+                    <a:p>
+                      <a:pPr algn="ctr"/>
+                      <a:r>
+                        <a:rPr lang="en-GB" sz="1200" b="0" i="0" kern="1200" dirty="0">
+                          <a:solidFill>
+                            <a:schemeClr val="dk1"/>
+                          </a:solidFill>
+                          <a:effectLst/>
+                          <a:latin typeface="+mn-lt"/>
+                          <a:ea typeface="+mn-ea"/>
+                          <a:cs typeface="+mn-cs"/>
+                        </a:rPr>
+                        <a:t>0.0844</a:t>
+                      </a:r>
+                      <a:endParaRPr lang="en-GB" sz="1200" b="0" dirty="0"/>
+                    </a:p>
+                  </a:txBody>
+                  <a:tcPr/>
+                </a:tc>
+                <a:tc>
+                  <a:txBody>
+                    <a:bodyPr/>
+                    <a:lstStyle/>
+                    <a:p>
+                      <a:pPr algn="ctr"/>
+                      <a:r>
+                        <a:rPr lang="en-GB" sz="1200" b="0" i="0" kern="1200" dirty="0">
+                          <a:solidFill>
+                            <a:schemeClr val="dk1"/>
+                          </a:solidFill>
+                          <a:effectLst/>
+                          <a:latin typeface="+mn-lt"/>
+                          <a:ea typeface="+mn-ea"/>
+                          <a:cs typeface="+mn-cs"/>
+                        </a:rPr>
+                        <a:t>34.047</a:t>
+                      </a:r>
+                      <a:endParaRPr lang="en-GB" sz="1200" b="0" dirty="0"/>
+                    </a:p>
+                  </a:txBody>
+                  <a:tcPr/>
+                </a:tc>
+                <a:tc>
+                  <a:txBody>
+                    <a:bodyPr/>
+                    <a:lstStyle/>
+                    <a:p>
+                      <a:pPr algn="ctr"/>
+                      <a:r>
+                        <a:rPr lang="en-GB" sz="1200" b="0" i="0" kern="1200" dirty="0">
+                          <a:solidFill>
+                            <a:schemeClr val="dk1"/>
+                          </a:solidFill>
+                          <a:effectLst/>
+                          <a:latin typeface="+mn-lt"/>
+                          <a:ea typeface="+mn-ea"/>
+                          <a:cs typeface="+mn-cs"/>
+                        </a:rPr>
+                        <a:t>-0.1798</a:t>
+                      </a:r>
+                      <a:endParaRPr lang="en-GB" sz="1200" b="0" dirty="0"/>
+                    </a:p>
+                  </a:txBody>
+                  <a:tcPr/>
+                </a:tc>
+                <a:tc>
+                  <a:txBody>
+                    <a:bodyPr/>
+                    <a:lstStyle/>
+                    <a:p>
+                      <a:pPr algn="ctr"/>
+                      <a:r>
+                        <a:rPr lang="en-GB" sz="1200" b="0" i="0" kern="1200" dirty="0">
+                          <a:solidFill>
+                            <a:schemeClr val="dk1"/>
+                          </a:solidFill>
+                          <a:effectLst/>
+                          <a:latin typeface="+mn-lt"/>
+                          <a:ea typeface="+mn-ea"/>
+                          <a:cs typeface="+mn-cs"/>
+                        </a:rPr>
+                        <a:t>-73.04</a:t>
+                      </a:r>
+                      <a:endParaRPr lang="en-GB" sz="1200" b="0" dirty="0"/>
+                    </a:p>
+                  </a:txBody>
+                  <a:tcPr/>
+                </a:tc>
+                <a:extLst>
+                  <a:ext uri="{0D108BD9-81ED-4DB2-BD59-A6C34878D82A}">
+                    <a16:rowId xmlns:a16="http://schemas.microsoft.com/office/drawing/2014/main" val="3228881547"/>
+                  </a:ext>
+                </a:extLst>
+              </a:tr>
+              <a:tr h="545285">
+                <a:tc>
+                  <a:txBody>
+                    <a:bodyPr/>
+                    <a:lstStyle/>
+                    <a:p>
+                      <a:pPr algn="ctr"/>
+                      <a:r>
+                        <a:rPr lang="en-US" sz="1200" b="0" dirty="0"/>
+                        <a:t>2022-2023</a:t>
+                      </a:r>
+                      <a:endParaRPr lang="en-GB" sz="1200" b="0" dirty="0"/>
+                    </a:p>
+                  </a:txBody>
+                  <a:tcPr/>
+                </a:tc>
+                <a:tc>
+                  <a:txBody>
+                    <a:bodyPr/>
+                    <a:lstStyle/>
+                    <a:p>
+                      <a:pPr algn="ctr"/>
+                      <a:r>
+                        <a:rPr lang="en-GB" sz="1200" b="0" i="0" kern="1200" dirty="0">
+                          <a:solidFill>
+                            <a:schemeClr val="dk1"/>
+                          </a:solidFill>
+                          <a:effectLst/>
+                          <a:latin typeface="+mn-lt"/>
+                          <a:ea typeface="+mn-ea"/>
+                          <a:cs typeface="+mn-cs"/>
+                        </a:rPr>
+                        <a:t>0.5108</a:t>
+                      </a:r>
+                      <a:endParaRPr lang="en-GB" sz="1200" b="0" dirty="0"/>
+                    </a:p>
+                  </a:txBody>
+                  <a:tcPr/>
+                </a:tc>
+                <a:tc>
+                  <a:txBody>
+                    <a:bodyPr/>
+                    <a:lstStyle/>
+                    <a:p>
+                      <a:pPr algn="ctr"/>
+                      <a:r>
+                        <a:rPr lang="en-GB" sz="1200" b="0" i="0" kern="1200" dirty="0">
+                          <a:solidFill>
+                            <a:schemeClr val="dk1"/>
+                          </a:solidFill>
+                          <a:effectLst/>
+                          <a:latin typeface="+mn-lt"/>
+                          <a:ea typeface="+mn-ea"/>
+                          <a:cs typeface="+mn-cs"/>
+                        </a:rPr>
+                        <a:t>169.5</a:t>
+                      </a:r>
+                      <a:endParaRPr lang="en-GB" sz="1200" b="0" dirty="0"/>
+                    </a:p>
+                  </a:txBody>
+                  <a:tcPr/>
+                </a:tc>
+                <a:tc>
+                  <a:txBody>
+                    <a:bodyPr/>
+                    <a:lstStyle/>
+                    <a:p>
+                      <a:pPr algn="ctr"/>
+                      <a:r>
+                        <a:rPr lang="en-GB" sz="1200" b="0" i="0" kern="1200" dirty="0">
+                          <a:solidFill>
+                            <a:schemeClr val="dk1"/>
+                          </a:solidFill>
+                          <a:effectLst/>
+                          <a:latin typeface="+mn-lt"/>
+                          <a:ea typeface="+mn-ea"/>
+                          <a:cs typeface="+mn-cs"/>
+                        </a:rPr>
+                        <a:t>0.5108</a:t>
+                      </a:r>
+                      <a:endParaRPr lang="en-GB" sz="1200" b="0" dirty="0"/>
+                    </a:p>
+                  </a:txBody>
+                  <a:tcPr/>
+                </a:tc>
+                <a:tc>
+                  <a:txBody>
+                    <a:bodyPr/>
+                    <a:lstStyle/>
+                    <a:p>
+                      <a:pPr algn="ctr"/>
+                      <a:r>
+                        <a:rPr lang="en-GB" sz="1200" b="0" i="0" kern="1200" dirty="0">
+                          <a:solidFill>
+                            <a:schemeClr val="dk1"/>
+                          </a:solidFill>
+                          <a:effectLst/>
+                          <a:latin typeface="+mn-lt"/>
+                          <a:ea typeface="+mn-ea"/>
+                          <a:cs typeface="+mn-cs"/>
+                        </a:rPr>
+                        <a:t>169.5</a:t>
+                      </a:r>
+                      <a:endParaRPr lang="en-GB" sz="1200" b="0" dirty="0"/>
+                    </a:p>
+                  </a:txBody>
+                  <a:tcPr/>
+                </a:tc>
+                <a:tc>
+                  <a:txBody>
+                    <a:bodyPr/>
+                    <a:lstStyle/>
+                    <a:p>
+                      <a:pPr algn="ctr"/>
+                      <a:r>
+                        <a:rPr lang="en-GB" sz="1200" b="0" i="0" kern="1200" dirty="0">
+                          <a:solidFill>
+                            <a:schemeClr val="dk1"/>
+                          </a:solidFill>
+                          <a:effectLst/>
+                          <a:latin typeface="+mn-lt"/>
+                          <a:ea typeface="+mn-ea"/>
+                          <a:cs typeface="+mn-cs"/>
+                        </a:rPr>
+                        <a:t>0.5021</a:t>
+                      </a:r>
+                      <a:endParaRPr lang="en-GB" sz="1200" b="0" dirty="0"/>
+                    </a:p>
+                  </a:txBody>
+                  <a:tcPr/>
+                </a:tc>
+                <a:tc>
+                  <a:txBody>
+                    <a:bodyPr/>
+                    <a:lstStyle/>
+                    <a:p>
+                      <a:pPr algn="ctr"/>
+                      <a:r>
+                        <a:rPr lang="en-GB" sz="1200" b="0" i="0" kern="1200" dirty="0">
+                          <a:solidFill>
+                            <a:schemeClr val="dk1"/>
+                          </a:solidFill>
+                          <a:effectLst/>
+                          <a:latin typeface="+mn-lt"/>
+                          <a:ea typeface="+mn-ea"/>
+                          <a:cs typeface="+mn-cs"/>
+                        </a:rPr>
+                        <a:t>166.06</a:t>
+                      </a:r>
+                      <a:endParaRPr lang="en-GB" sz="1200" b="0" dirty="0"/>
+                    </a:p>
+                  </a:txBody>
+                  <a:tcPr/>
+                </a:tc>
+                <a:tc>
+                  <a:txBody>
+                    <a:bodyPr/>
+                    <a:lstStyle/>
+                    <a:p>
+                      <a:pPr algn="ctr"/>
+                      <a:r>
+                        <a:rPr lang="en-GB" sz="1200" b="0" i="0" kern="1200" dirty="0">
+                          <a:solidFill>
+                            <a:schemeClr val="dk1"/>
+                          </a:solidFill>
+                          <a:effectLst/>
+                          <a:latin typeface="+mn-lt"/>
+                          <a:ea typeface="+mn-ea"/>
+                          <a:cs typeface="+mn-cs"/>
+                        </a:rPr>
+                        <a:t>0.3713</a:t>
+                      </a:r>
+                      <a:endParaRPr lang="en-GB" sz="1200" b="0" dirty="0"/>
+                    </a:p>
+                  </a:txBody>
+                  <a:tcPr/>
+                </a:tc>
+                <a:tc>
+                  <a:txBody>
+                    <a:bodyPr/>
+                    <a:lstStyle/>
+                    <a:p>
+                      <a:pPr algn="ctr"/>
+                      <a:r>
+                        <a:rPr lang="en-GB" sz="1200" b="0" i="0" kern="1200" dirty="0">
+                          <a:solidFill>
+                            <a:schemeClr val="dk1"/>
+                          </a:solidFill>
+                          <a:effectLst/>
+                          <a:latin typeface="+mn-lt"/>
+                          <a:ea typeface="+mn-ea"/>
+                          <a:cs typeface="+mn-cs"/>
+                        </a:rPr>
+                        <a:t>122.7</a:t>
+                      </a:r>
+                      <a:endParaRPr lang="en-GB" sz="1200" b="0" dirty="0"/>
+                    </a:p>
+                  </a:txBody>
+                  <a:tcPr/>
+                </a:tc>
+                <a:extLst>
+                  <a:ext uri="{0D108BD9-81ED-4DB2-BD59-A6C34878D82A}">
+                    <a16:rowId xmlns:a16="http://schemas.microsoft.com/office/drawing/2014/main" val="859004804"/>
+                  </a:ext>
+                </a:extLst>
+              </a:tr>
+            </a:tbl>
+          </a:graphicData>
+        </a:graphic>
+      </p:graphicFrame>
+    </p:spTree>
+    <p:extLst>
+      <p:ext uri="{BB962C8B-B14F-4D97-AF65-F5344CB8AC3E}">
+        <p14:creationId xmlns:p14="http://schemas.microsoft.com/office/powerpoint/2010/main" val="1130694288"/>
+      </p:ext>
+    </p:extLst>
+  </p:cSld>
+  <p:clrMapOvr>
+    <a:masterClrMapping/>
+  </p:clrMapOvr>
+</p:sld>
+</file>
+
+<file path=ppt/slides/slide24.xml><?xml version="1.0" encoding="utf-8"?>
+<p:sld xmlns:a="http://schemas.openxmlformats.org/drawingml/2006/main" xmlns:r="http://schemas.openxmlformats.org/officeDocument/2006/relationships" xmlns:p="http://schemas.openxmlformats.org/presentationml/2006/main">
+  <p:cSld>
+    <p:spTree>
+      <p:nvGrpSpPr>
+        <p:cNvPr id="1" name=""/>
+        <p:cNvGrpSpPr/>
+        <p:nvPr/>
+      </p:nvGrpSpPr>
+      <p:grpSpPr>
+        <a:xfrm>
+          <a:off x="0" y="0"/>
+          <a:ext cx="0" cy="0"/>
+          <a:chOff x="0" y="0"/>
+          <a:chExt cx="0" cy="0"/>
+        </a:xfrm>
+      </p:grpSpPr>
+      <p:sp>
+        <p:nvSpPr>
+          <p:cNvPr id="2" name="Title 1">
+            <a:extLst>
+              <a:ext uri="{FF2B5EF4-FFF2-40B4-BE49-F238E27FC236}">
+                <a16:creationId xmlns:a16="http://schemas.microsoft.com/office/drawing/2014/main" id="{921633EB-7DCB-4DDC-80AF-C885A3EE1245}"/>
+              </a:ext>
+            </a:extLst>
+          </p:cNvPr>
+          <p:cNvSpPr>
+            <a:spLocks noGrp="1"/>
+          </p:cNvSpPr>
+          <p:nvPr>
+            <p:ph type="title"/>
+          </p:nvPr>
+        </p:nvSpPr>
+        <p:spPr/>
+        <p:txBody>
+          <a:bodyPr/>
+          <a:lstStyle/>
+          <a:p>
+            <a:r>
+              <a:rPr lang="en-US" dirty="0"/>
+              <a:t>LINEAR REGRESSION MODEL - ATTENDANCE</a:t>
+            </a:r>
+          </a:p>
+        </p:txBody>
+      </p:sp>
+      <p:pic>
+        <p:nvPicPr>
+          <p:cNvPr id="20" name="Content Placeholder 19">
+            <a:extLst>
+              <a:ext uri="{FF2B5EF4-FFF2-40B4-BE49-F238E27FC236}">
+                <a16:creationId xmlns:a16="http://schemas.microsoft.com/office/drawing/2014/main" id="{996B68EB-BA2A-A868-4AE5-26A32E6156DF}"/>
+              </a:ext>
+            </a:extLst>
+          </p:cNvPr>
+          <p:cNvPicPr>
+            <a:picLocks noGrp="1" noChangeAspect="1"/>
+          </p:cNvPicPr>
+          <p:nvPr>
+            <p:ph sz="half" idx="2"/>
+          </p:nvPr>
+        </p:nvPicPr>
+        <p:blipFill>
+          <a:blip r:embed="rId2"/>
+          <a:srcRect/>
+          <a:stretch/>
+        </p:blipFill>
+        <p:spPr>
+          <a:xfrm>
+            <a:off x="4279106" y="2227262"/>
+            <a:ext cx="3633787" cy="3633787"/>
+          </a:xfrm>
+        </p:spPr>
+      </p:pic>
+      <p:pic>
+        <p:nvPicPr>
+          <p:cNvPr id="22" name="Picture 21">
+            <a:extLst>
+              <a:ext uri="{FF2B5EF4-FFF2-40B4-BE49-F238E27FC236}">
+                <a16:creationId xmlns:a16="http://schemas.microsoft.com/office/drawing/2014/main" id="{A2645ED6-F5DD-B44C-6AF8-A1ECB0E6B71D}"/>
+              </a:ext>
+            </a:extLst>
+          </p:cNvPr>
+          <p:cNvPicPr>
+            <a:picLocks noChangeAspect="1"/>
+          </p:cNvPicPr>
+          <p:nvPr/>
+        </p:nvPicPr>
+        <p:blipFill>
+          <a:blip r:embed="rId3"/>
+          <a:srcRect/>
+          <a:stretch/>
+        </p:blipFill>
+        <p:spPr>
+          <a:xfrm>
+            <a:off x="7977020" y="2227261"/>
+            <a:ext cx="3633787" cy="3633787"/>
+          </a:xfrm>
+          <a:prstGeom prst="rect">
+            <a:avLst/>
+          </a:prstGeom>
+        </p:spPr>
+      </p:pic>
+      <p:sp>
+        <p:nvSpPr>
+          <p:cNvPr id="4" name="Content Placeholder 3">
+            <a:extLst>
+              <a:ext uri="{FF2B5EF4-FFF2-40B4-BE49-F238E27FC236}">
+                <a16:creationId xmlns:a16="http://schemas.microsoft.com/office/drawing/2014/main" id="{89066F11-6868-47D7-FDD2-F251B0B320C8}"/>
+              </a:ext>
+            </a:extLst>
+          </p:cNvPr>
+          <p:cNvSpPr>
+            <a:spLocks noGrp="1"/>
+          </p:cNvSpPr>
+          <p:nvPr>
+            <p:ph sz="half" idx="1"/>
+          </p:nvPr>
+        </p:nvSpPr>
+        <p:spPr>
+          <a:xfrm>
+            <a:off x="581193" y="2228003"/>
+            <a:ext cx="3633787" cy="3633047"/>
+          </a:xfrm>
+        </p:spPr>
+        <p:txBody>
+          <a:bodyPr>
+            <a:normAutofit/>
+          </a:bodyPr>
+          <a:lstStyle/>
+          <a:p>
+            <a:r>
+              <a:rPr lang="en-US" dirty="0"/>
+              <a:t>Attendance Percentage for last two years.</a:t>
+            </a:r>
+          </a:p>
+          <a:p>
+            <a:r>
+              <a:rPr lang="en-US" dirty="0"/>
+              <a:t>General attendance is similar, slightly lowered</a:t>
+            </a:r>
+          </a:p>
+          <a:p>
+            <a:r>
+              <a:rPr lang="en-US" dirty="0"/>
+              <a:t>Decrease in size of interquartile range, lower median.</a:t>
+            </a:r>
+          </a:p>
+        </p:txBody>
+      </p:sp>
+    </p:spTree>
+    <p:extLst>
+      <p:ext uri="{BB962C8B-B14F-4D97-AF65-F5344CB8AC3E}">
+        <p14:creationId xmlns:p14="http://schemas.microsoft.com/office/powerpoint/2010/main" val="838385386"/>
+      </p:ext>
+    </p:extLst>
+  </p:cSld>
+  <p:clrMapOvr>
+    <a:masterClrMapping/>
+  </p:clrMapOvr>
+</p:sld>
+</file>
+
+<file path=ppt/slides/slide25.xml><?xml version="1.0" encoding="utf-8"?>
+<p:sld xmlns:a="http://schemas.openxmlformats.org/drawingml/2006/main" xmlns:r="http://schemas.openxmlformats.org/officeDocument/2006/relationships" xmlns:p="http://schemas.openxmlformats.org/presentationml/2006/main">
+  <p:cSld>
+    <p:spTree>
+      <p:nvGrpSpPr>
+        <p:cNvPr id="1" name=""/>
+        <p:cNvGrpSpPr/>
+        <p:nvPr/>
+      </p:nvGrpSpPr>
+      <p:grpSpPr>
+        <a:xfrm>
+          <a:off x="0" y="0"/>
+          <a:ext cx="0" cy="0"/>
+          <a:chOff x="0" y="0"/>
+          <a:chExt cx="0" cy="0"/>
+        </a:xfrm>
+      </p:grpSpPr>
+      <p:sp>
+        <p:nvSpPr>
+          <p:cNvPr id="2" name="Title 1">
+            <a:extLst>
+              <a:ext uri="{FF2B5EF4-FFF2-40B4-BE49-F238E27FC236}">
+                <a16:creationId xmlns:a16="http://schemas.microsoft.com/office/drawing/2014/main" id="{921633EB-7DCB-4DDC-80AF-C885A3EE1245}"/>
+              </a:ext>
+            </a:extLst>
+          </p:cNvPr>
+          <p:cNvSpPr>
+            <a:spLocks noGrp="1"/>
+          </p:cNvSpPr>
+          <p:nvPr>
+            <p:ph type="title"/>
+          </p:nvPr>
+        </p:nvSpPr>
+        <p:spPr/>
+        <p:txBody>
+          <a:bodyPr/>
+          <a:lstStyle/>
+          <a:p>
+            <a:r>
+              <a:rPr lang="en-US" dirty="0"/>
+              <a:t>LINEAR REGRESSION MODEL – Expected ATTENDANCE</a:t>
+            </a:r>
+          </a:p>
+        </p:txBody>
+      </p:sp>
+      <p:pic>
+        <p:nvPicPr>
+          <p:cNvPr id="20" name="Content Placeholder 19">
+            <a:extLst>
+              <a:ext uri="{FF2B5EF4-FFF2-40B4-BE49-F238E27FC236}">
+                <a16:creationId xmlns:a16="http://schemas.microsoft.com/office/drawing/2014/main" id="{996B68EB-BA2A-A868-4AE5-26A32E6156DF}"/>
+              </a:ext>
+            </a:extLst>
+          </p:cNvPr>
+          <p:cNvPicPr>
+            <a:picLocks noGrp="1" noChangeAspect="1"/>
+          </p:cNvPicPr>
+          <p:nvPr>
+            <p:ph sz="half" idx="2"/>
+          </p:nvPr>
+        </p:nvPicPr>
+        <p:blipFill>
+          <a:blip r:embed="rId2"/>
+          <a:srcRect/>
+          <a:stretch/>
+        </p:blipFill>
+        <p:spPr>
+          <a:xfrm>
+            <a:off x="4279106" y="2227262"/>
+            <a:ext cx="3633787" cy="3633787"/>
+          </a:xfrm>
+        </p:spPr>
+      </p:pic>
+      <p:pic>
+        <p:nvPicPr>
+          <p:cNvPr id="22" name="Picture 21">
+            <a:extLst>
+              <a:ext uri="{FF2B5EF4-FFF2-40B4-BE49-F238E27FC236}">
+                <a16:creationId xmlns:a16="http://schemas.microsoft.com/office/drawing/2014/main" id="{A2645ED6-F5DD-B44C-6AF8-A1ECB0E6B71D}"/>
+              </a:ext>
+            </a:extLst>
+          </p:cNvPr>
+          <p:cNvPicPr>
+            <a:picLocks noChangeAspect="1"/>
+          </p:cNvPicPr>
+          <p:nvPr/>
+        </p:nvPicPr>
+        <p:blipFill>
+          <a:blip r:embed="rId3"/>
+          <a:srcRect/>
+          <a:stretch/>
+        </p:blipFill>
+        <p:spPr>
+          <a:xfrm>
+            <a:off x="7977020" y="2227261"/>
+            <a:ext cx="3633787" cy="3633787"/>
+          </a:xfrm>
+          <a:prstGeom prst="rect">
+            <a:avLst/>
+          </a:prstGeom>
+        </p:spPr>
+      </p:pic>
+      <p:sp>
+        <p:nvSpPr>
+          <p:cNvPr id="4" name="Content Placeholder 3">
+            <a:extLst>
+              <a:ext uri="{FF2B5EF4-FFF2-40B4-BE49-F238E27FC236}">
+                <a16:creationId xmlns:a16="http://schemas.microsoft.com/office/drawing/2014/main" id="{89066F11-6868-47D7-FDD2-F251B0B320C8}"/>
+              </a:ext>
+            </a:extLst>
+          </p:cNvPr>
+          <p:cNvSpPr>
+            <a:spLocks noGrp="1"/>
+          </p:cNvSpPr>
+          <p:nvPr>
+            <p:ph sz="half" idx="1"/>
+          </p:nvPr>
+        </p:nvSpPr>
+        <p:spPr>
+          <a:xfrm>
+            <a:off x="581193" y="2228003"/>
+            <a:ext cx="3633787" cy="3633047"/>
+          </a:xfrm>
+        </p:spPr>
+        <p:txBody>
+          <a:bodyPr>
+            <a:normAutofit/>
+          </a:bodyPr>
+          <a:lstStyle/>
+          <a:p>
+            <a:r>
+              <a:rPr lang="en-US" dirty="0"/>
+              <a:t>Attendance Percentage for last two years.</a:t>
+            </a:r>
+          </a:p>
+          <a:p>
+            <a:r>
+              <a:rPr lang="en-US" dirty="0"/>
+              <a:t>General attendance is similar, slightly lowered</a:t>
+            </a:r>
+          </a:p>
+          <a:p>
+            <a:r>
+              <a:rPr lang="en-US" dirty="0"/>
+              <a:t>Decrease in size of interquartile range, lower median.</a:t>
+            </a:r>
+          </a:p>
+        </p:txBody>
+      </p:sp>
+    </p:spTree>
+    <p:extLst>
+      <p:ext uri="{BB962C8B-B14F-4D97-AF65-F5344CB8AC3E}">
+        <p14:creationId xmlns:p14="http://schemas.microsoft.com/office/powerpoint/2010/main" val="1951675439"/>
+      </p:ext>
+    </p:extLst>
+  </p:cSld>
+  <p:clrMapOvr>
+    <a:masterClrMapping/>
+  </p:clrMapOvr>
+</p:sld>
+</file>
+
+<file path=ppt/slides/slide26.xml><?xml version="1.0" encoding="utf-8"?>
+<p:sld xmlns:a="http://schemas.openxmlformats.org/drawingml/2006/main" xmlns:r="http://schemas.openxmlformats.org/officeDocument/2006/relationships" xmlns:p="http://schemas.openxmlformats.org/presentationml/2006/main">
+  <p:cSld>
+    <p:spTree>
+      <p:nvGrpSpPr>
+        <p:cNvPr id="1" name=""/>
+        <p:cNvGrpSpPr/>
+        <p:nvPr/>
+      </p:nvGrpSpPr>
+      <p:grpSpPr>
+        <a:xfrm>
+          <a:off x="0" y="0"/>
+          <a:ext cx="0" cy="0"/>
+          <a:chOff x="0" y="0"/>
+          <a:chExt cx="0" cy="0"/>
+        </a:xfrm>
+      </p:grpSpPr>
+      <p:sp>
+        <p:nvSpPr>
+          <p:cNvPr id="2" name="Title 1">
+            <a:extLst>
+              <a:ext uri="{FF2B5EF4-FFF2-40B4-BE49-F238E27FC236}">
+                <a16:creationId xmlns:a16="http://schemas.microsoft.com/office/drawing/2014/main" id="{921633EB-7DCB-4DDC-80AF-C885A3EE1245}"/>
+              </a:ext>
+            </a:extLst>
+          </p:cNvPr>
+          <p:cNvSpPr>
+            <a:spLocks noGrp="1"/>
+          </p:cNvSpPr>
+          <p:nvPr>
+            <p:ph type="title"/>
+          </p:nvPr>
+        </p:nvSpPr>
+        <p:spPr/>
+        <p:txBody>
+          <a:bodyPr/>
+          <a:lstStyle/>
+          <a:p>
+            <a:r>
+              <a:rPr lang="en-US" dirty="0"/>
+              <a:t>LINEAR REGRESSION MODEL – LECTURE ATTENDANCE</a:t>
+            </a:r>
+          </a:p>
+        </p:txBody>
+      </p:sp>
+      <p:pic>
+        <p:nvPicPr>
+          <p:cNvPr id="20" name="Content Placeholder 19">
+            <a:extLst>
+              <a:ext uri="{FF2B5EF4-FFF2-40B4-BE49-F238E27FC236}">
+                <a16:creationId xmlns:a16="http://schemas.microsoft.com/office/drawing/2014/main" id="{996B68EB-BA2A-A868-4AE5-26A32E6156DF}"/>
+              </a:ext>
+            </a:extLst>
+          </p:cNvPr>
+          <p:cNvPicPr>
+            <a:picLocks noGrp="1" noChangeAspect="1"/>
+          </p:cNvPicPr>
+          <p:nvPr>
+            <p:ph sz="half" idx="2"/>
+          </p:nvPr>
+        </p:nvPicPr>
+        <p:blipFill>
+          <a:blip r:embed="rId2"/>
+          <a:srcRect/>
+          <a:stretch/>
+        </p:blipFill>
+        <p:spPr>
+          <a:xfrm>
+            <a:off x="4279106" y="2227262"/>
+            <a:ext cx="3633787" cy="3633787"/>
+          </a:xfrm>
+        </p:spPr>
+      </p:pic>
+      <p:pic>
+        <p:nvPicPr>
+          <p:cNvPr id="22" name="Picture 21">
+            <a:extLst>
+              <a:ext uri="{FF2B5EF4-FFF2-40B4-BE49-F238E27FC236}">
+                <a16:creationId xmlns:a16="http://schemas.microsoft.com/office/drawing/2014/main" id="{A2645ED6-F5DD-B44C-6AF8-A1ECB0E6B71D}"/>
+              </a:ext>
+            </a:extLst>
+          </p:cNvPr>
+          <p:cNvPicPr>
+            <a:picLocks noChangeAspect="1"/>
+          </p:cNvPicPr>
+          <p:nvPr/>
+        </p:nvPicPr>
+        <p:blipFill>
+          <a:blip r:embed="rId3"/>
+          <a:srcRect/>
+          <a:stretch/>
+        </p:blipFill>
+        <p:spPr>
+          <a:xfrm>
+            <a:off x="7977020" y="2227261"/>
+            <a:ext cx="3633787" cy="3633787"/>
+          </a:xfrm>
+          <a:prstGeom prst="rect">
+            <a:avLst/>
+          </a:prstGeom>
+        </p:spPr>
+      </p:pic>
+      <p:sp>
+        <p:nvSpPr>
+          <p:cNvPr id="4" name="Content Placeholder 3">
+            <a:extLst>
+              <a:ext uri="{FF2B5EF4-FFF2-40B4-BE49-F238E27FC236}">
+                <a16:creationId xmlns:a16="http://schemas.microsoft.com/office/drawing/2014/main" id="{89066F11-6868-47D7-FDD2-F251B0B320C8}"/>
+              </a:ext>
+            </a:extLst>
+          </p:cNvPr>
+          <p:cNvSpPr>
+            <a:spLocks noGrp="1"/>
+          </p:cNvSpPr>
+          <p:nvPr>
+            <p:ph sz="half" idx="1"/>
+          </p:nvPr>
+        </p:nvSpPr>
+        <p:spPr>
+          <a:xfrm>
+            <a:off x="581193" y="2228003"/>
+            <a:ext cx="3633787" cy="3633047"/>
+          </a:xfrm>
+        </p:spPr>
+        <p:txBody>
+          <a:bodyPr>
+            <a:normAutofit/>
+          </a:bodyPr>
+          <a:lstStyle/>
+          <a:p>
+            <a:r>
+              <a:rPr lang="en-US" dirty="0"/>
+              <a:t>Attendance Percentage for last two years.</a:t>
+            </a:r>
+          </a:p>
+          <a:p>
+            <a:r>
+              <a:rPr lang="en-US" dirty="0"/>
+              <a:t>General attendance is similar, slightly lowered</a:t>
+            </a:r>
+          </a:p>
+          <a:p>
+            <a:r>
+              <a:rPr lang="en-US" dirty="0"/>
+              <a:t>Decrease in size of interquartile range, lower median.</a:t>
+            </a:r>
+          </a:p>
+        </p:txBody>
+      </p:sp>
+    </p:spTree>
+    <p:extLst>
+      <p:ext uri="{BB962C8B-B14F-4D97-AF65-F5344CB8AC3E}">
+        <p14:creationId xmlns:p14="http://schemas.microsoft.com/office/powerpoint/2010/main" val="2121259094"/>
+      </p:ext>
+    </p:extLst>
+  </p:cSld>
+  <p:clrMapOvr>
+    <a:masterClrMapping/>
+  </p:clrMapOvr>
+</p:sld>
+</file>
+
+<file path=ppt/slides/slide27.xml><?xml version="1.0" encoding="utf-8"?>
+<p:sld xmlns:a="http://schemas.openxmlformats.org/drawingml/2006/main" xmlns:r="http://schemas.openxmlformats.org/officeDocument/2006/relationships" xmlns:p="http://schemas.openxmlformats.org/presentationml/2006/main">
+  <p:cSld>
+    <p:spTree>
+      <p:nvGrpSpPr>
+        <p:cNvPr id="1" name=""/>
+        <p:cNvGrpSpPr/>
+        <p:nvPr/>
+      </p:nvGrpSpPr>
+      <p:grpSpPr>
+        <a:xfrm>
+          <a:off x="0" y="0"/>
+          <a:ext cx="0" cy="0"/>
+          <a:chOff x="0" y="0"/>
+          <a:chExt cx="0" cy="0"/>
+        </a:xfrm>
+      </p:grpSpPr>
+      <p:sp>
+        <p:nvSpPr>
+          <p:cNvPr id="2" name="Title 1">
+            <a:extLst>
+              <a:ext uri="{FF2B5EF4-FFF2-40B4-BE49-F238E27FC236}">
+                <a16:creationId xmlns:a16="http://schemas.microsoft.com/office/drawing/2014/main" id="{921633EB-7DCB-4DDC-80AF-C885A3EE1245}"/>
+              </a:ext>
+            </a:extLst>
+          </p:cNvPr>
+          <p:cNvSpPr>
+            <a:spLocks noGrp="1"/>
+          </p:cNvSpPr>
+          <p:nvPr>
+            <p:ph type="title"/>
+          </p:nvPr>
+        </p:nvSpPr>
+        <p:spPr/>
+        <p:txBody>
+          <a:bodyPr/>
+          <a:lstStyle/>
+          <a:p>
+            <a:r>
+              <a:rPr lang="en-US" dirty="0"/>
+              <a:t>LINEAR REGRESSION MODEL – PRACTICAL ATTENDANCE</a:t>
+            </a:r>
+          </a:p>
+        </p:txBody>
+      </p:sp>
+      <p:pic>
+        <p:nvPicPr>
+          <p:cNvPr id="20" name="Content Placeholder 19">
+            <a:extLst>
+              <a:ext uri="{FF2B5EF4-FFF2-40B4-BE49-F238E27FC236}">
+                <a16:creationId xmlns:a16="http://schemas.microsoft.com/office/drawing/2014/main" id="{996B68EB-BA2A-A868-4AE5-26A32E6156DF}"/>
+              </a:ext>
+            </a:extLst>
+          </p:cNvPr>
+          <p:cNvPicPr>
+            <a:picLocks noGrp="1" noChangeAspect="1"/>
+          </p:cNvPicPr>
+          <p:nvPr>
+            <p:ph sz="half" idx="2"/>
+          </p:nvPr>
+        </p:nvPicPr>
+        <p:blipFill>
+          <a:blip r:embed="rId2"/>
+          <a:srcRect/>
+          <a:stretch/>
+        </p:blipFill>
+        <p:spPr>
+          <a:xfrm>
+            <a:off x="4279106" y="2227262"/>
+            <a:ext cx="3633787" cy="3633787"/>
+          </a:xfrm>
+        </p:spPr>
+      </p:pic>
+      <p:pic>
+        <p:nvPicPr>
+          <p:cNvPr id="22" name="Picture 21">
+            <a:extLst>
+              <a:ext uri="{FF2B5EF4-FFF2-40B4-BE49-F238E27FC236}">
+                <a16:creationId xmlns:a16="http://schemas.microsoft.com/office/drawing/2014/main" id="{A2645ED6-F5DD-B44C-6AF8-A1ECB0E6B71D}"/>
+              </a:ext>
+            </a:extLst>
+          </p:cNvPr>
+          <p:cNvPicPr>
+            <a:picLocks noChangeAspect="1"/>
+          </p:cNvPicPr>
+          <p:nvPr/>
+        </p:nvPicPr>
+        <p:blipFill>
+          <a:blip r:embed="rId3"/>
+          <a:srcRect/>
+          <a:stretch/>
+        </p:blipFill>
+        <p:spPr>
+          <a:xfrm>
+            <a:off x="7977020" y="2227261"/>
+            <a:ext cx="3633787" cy="3633787"/>
+          </a:xfrm>
+          <a:prstGeom prst="rect">
+            <a:avLst/>
+          </a:prstGeom>
+        </p:spPr>
+      </p:pic>
+      <p:sp>
+        <p:nvSpPr>
+          <p:cNvPr id="4" name="Content Placeholder 3">
+            <a:extLst>
+              <a:ext uri="{FF2B5EF4-FFF2-40B4-BE49-F238E27FC236}">
+                <a16:creationId xmlns:a16="http://schemas.microsoft.com/office/drawing/2014/main" id="{89066F11-6868-47D7-FDD2-F251B0B320C8}"/>
+              </a:ext>
+            </a:extLst>
+          </p:cNvPr>
+          <p:cNvSpPr>
+            <a:spLocks noGrp="1"/>
+          </p:cNvSpPr>
+          <p:nvPr>
+            <p:ph sz="half" idx="1"/>
+          </p:nvPr>
+        </p:nvSpPr>
+        <p:spPr>
+          <a:xfrm>
+            <a:off x="581193" y="2228003"/>
+            <a:ext cx="3633787" cy="3633047"/>
+          </a:xfrm>
+        </p:spPr>
+        <p:txBody>
+          <a:bodyPr>
+            <a:normAutofit/>
+          </a:bodyPr>
+          <a:lstStyle/>
+          <a:p>
+            <a:r>
+              <a:rPr lang="en-US" dirty="0"/>
+              <a:t>Attendance Percentage for last two years.</a:t>
+            </a:r>
+          </a:p>
+          <a:p>
+            <a:r>
+              <a:rPr lang="en-US" dirty="0"/>
+              <a:t>General attendance is similar, slightly lowered</a:t>
+            </a:r>
+          </a:p>
+          <a:p>
+            <a:r>
+              <a:rPr lang="en-US" dirty="0"/>
+              <a:t>Decrease in size of interquartile range, lower median.</a:t>
+            </a:r>
+          </a:p>
+        </p:txBody>
+      </p:sp>
+    </p:spTree>
+    <p:extLst>
+      <p:ext uri="{BB962C8B-B14F-4D97-AF65-F5344CB8AC3E}">
+        <p14:creationId xmlns:p14="http://schemas.microsoft.com/office/powerpoint/2010/main" val="2913232876"/>
+      </p:ext>
+    </p:extLst>
+  </p:cSld>
+  <p:clrMapOvr>
+    <a:masterClrMapping/>
+  </p:clrMapOvr>
+</p:sld>
+</file>
+
+<file path=ppt/slides/slide28.xml><?xml version="1.0" encoding="utf-8"?>
+<p:sld xmlns:a="http://schemas.openxmlformats.org/drawingml/2006/main" xmlns:r="http://schemas.openxmlformats.org/officeDocument/2006/relationships" xmlns:p="http://schemas.openxmlformats.org/presentationml/2006/main">
+  <p:cSld>
+    <p:spTree>
+      <p:nvGrpSpPr>
+        <p:cNvPr id="1" name=""/>
+        <p:cNvGrpSpPr/>
+        <p:nvPr/>
+      </p:nvGrpSpPr>
+      <p:grpSpPr>
+        <a:xfrm>
+          <a:off x="0" y="0"/>
+          <a:ext cx="0" cy="0"/>
+          <a:chOff x="0" y="0"/>
+          <a:chExt cx="0" cy="0"/>
+        </a:xfrm>
+      </p:grpSpPr>
+      <p:sp>
+        <p:nvSpPr>
+          <p:cNvPr id="2" name="Title 1">
+            <a:extLst>
+              <a:ext uri="{FF2B5EF4-FFF2-40B4-BE49-F238E27FC236}">
+                <a16:creationId xmlns:a16="http://schemas.microsoft.com/office/drawing/2014/main" id="{C7B88BF5-C73D-C2F9-DD20-DE6522FEBB0C}"/>
+              </a:ext>
+            </a:extLst>
+          </p:cNvPr>
+          <p:cNvSpPr>
+            <a:spLocks noGrp="1"/>
+          </p:cNvSpPr>
+          <p:nvPr>
+            <p:ph type="ctrTitle"/>
+          </p:nvPr>
+        </p:nvSpPr>
+        <p:spPr/>
+        <p:txBody>
+          <a:bodyPr/>
+          <a:lstStyle/>
+          <a:p>
+            <a:r>
+              <a:rPr lang="en-US" dirty="0"/>
+              <a:t>PREDICTIONS</a:t>
+            </a:r>
+            <a:endParaRPr lang="en-GB" dirty="0"/>
+          </a:p>
+        </p:txBody>
+      </p:sp>
+      <p:sp>
+        <p:nvSpPr>
+          <p:cNvPr id="3" name="Subtitle 2">
+            <a:extLst>
+              <a:ext uri="{FF2B5EF4-FFF2-40B4-BE49-F238E27FC236}">
+                <a16:creationId xmlns:a16="http://schemas.microsoft.com/office/drawing/2014/main" id="{7DC5E721-C1B6-45C1-7ACB-BA368382A9E9}"/>
+              </a:ext>
+            </a:extLst>
+          </p:cNvPr>
+          <p:cNvSpPr>
+            <a:spLocks noGrp="1"/>
+          </p:cNvSpPr>
+          <p:nvPr>
+            <p:ph type="subTitle" idx="1"/>
+          </p:nvPr>
+        </p:nvSpPr>
+        <p:spPr>
+          <a:xfrm>
+            <a:off x="581191" y="3275621"/>
+            <a:ext cx="10993546" cy="2873509"/>
+          </a:xfrm>
+        </p:spPr>
+        <p:txBody>
+          <a:bodyPr>
+            <a:normAutofit/>
+          </a:bodyPr>
+          <a:lstStyle/>
+          <a:p>
+            <a:r>
+              <a:rPr lang="en-US" dirty="0">
+                <a:solidFill>
+                  <a:schemeClr val="bg1"/>
+                </a:solidFill>
+              </a:rPr>
+              <a:t>Grade ~ Attendance</a:t>
+            </a:r>
+          </a:p>
+          <a:p>
+            <a:endParaRPr lang="en-US" dirty="0">
+              <a:solidFill>
+                <a:schemeClr val="bg1"/>
+              </a:solidFill>
+            </a:endParaRPr>
+          </a:p>
+          <a:p>
+            <a:r>
+              <a:rPr lang="en-US" dirty="0">
+                <a:solidFill>
+                  <a:schemeClr val="bg1"/>
+                </a:solidFill>
+              </a:rPr>
+              <a:t>Grade ~ Expected Attendance</a:t>
+            </a:r>
+          </a:p>
+          <a:p>
+            <a:endParaRPr lang="en-US" dirty="0">
+              <a:solidFill>
+                <a:schemeClr val="bg1"/>
+              </a:solidFill>
+            </a:endParaRPr>
+          </a:p>
+          <a:p>
+            <a:r>
+              <a:rPr lang="en-US" dirty="0">
+                <a:solidFill>
+                  <a:schemeClr val="bg1"/>
+                </a:solidFill>
+              </a:rPr>
+              <a:t>Grade ~ Practical Attendance</a:t>
+            </a:r>
+          </a:p>
+          <a:p>
+            <a:endParaRPr lang="en-US" dirty="0">
+              <a:solidFill>
+                <a:schemeClr val="bg1"/>
+              </a:solidFill>
+            </a:endParaRPr>
+          </a:p>
+          <a:p>
+            <a:r>
+              <a:rPr lang="en-US" dirty="0">
+                <a:solidFill>
+                  <a:schemeClr val="bg1"/>
+                </a:solidFill>
+              </a:rPr>
+              <a:t>Grade ~ Lecture Attendance</a:t>
+            </a:r>
+          </a:p>
+        </p:txBody>
+      </p:sp>
+    </p:spTree>
+    <p:extLst>
+      <p:ext uri="{BB962C8B-B14F-4D97-AF65-F5344CB8AC3E}">
+        <p14:creationId xmlns:p14="http://schemas.microsoft.com/office/powerpoint/2010/main" val="1683191166"/>
+      </p:ext>
+    </p:extLst>
+  </p:cSld>
+  <p:clrMapOvr>
+    <a:masterClrMapping/>
+  </p:clrMapOvr>
+</p:sld>
+</file>
+
+<file path=ppt/slides/slide29.xml><?xml version="1.0" encoding="utf-8"?>
+<p:sld xmlns:a="http://schemas.openxmlformats.org/drawingml/2006/main" xmlns:r="http://schemas.openxmlformats.org/officeDocument/2006/relationships" xmlns:p="http://schemas.openxmlformats.org/presentationml/2006/main">
+  <p:cSld>
+    <p:spTree>
+      <p:nvGrpSpPr>
+        <p:cNvPr id="1" name=""/>
+        <p:cNvGrpSpPr/>
+        <p:nvPr/>
+      </p:nvGrpSpPr>
+      <p:grpSpPr>
+        <a:xfrm>
+          <a:off x="0" y="0"/>
+          <a:ext cx="0" cy="0"/>
+          <a:chOff x="0" y="0"/>
+          <a:chExt cx="0" cy="0"/>
+        </a:xfrm>
+      </p:grpSpPr>
+      <p:sp>
+        <p:nvSpPr>
+          <p:cNvPr id="2" name="Title 1">
+            <a:extLst>
+              <a:ext uri="{FF2B5EF4-FFF2-40B4-BE49-F238E27FC236}">
+                <a16:creationId xmlns:a16="http://schemas.microsoft.com/office/drawing/2014/main" id="{C7B88BF5-C73D-C2F9-DD20-DE6522FEBB0C}"/>
+              </a:ext>
+            </a:extLst>
+          </p:cNvPr>
+          <p:cNvSpPr>
+            <a:spLocks noGrp="1"/>
+          </p:cNvSpPr>
+          <p:nvPr>
+            <p:ph type="ctrTitle"/>
+          </p:nvPr>
+        </p:nvSpPr>
+        <p:spPr/>
+        <p:txBody>
+          <a:bodyPr/>
+          <a:lstStyle/>
+          <a:p>
+            <a:r>
+              <a:rPr lang="en-US" dirty="0"/>
+              <a:t>CONCLUSION</a:t>
+            </a:r>
+            <a:endParaRPr lang="en-GB" dirty="0"/>
+          </a:p>
+        </p:txBody>
+      </p:sp>
+      <p:sp>
+        <p:nvSpPr>
+          <p:cNvPr id="3" name="Subtitle 2">
+            <a:extLst>
+              <a:ext uri="{FF2B5EF4-FFF2-40B4-BE49-F238E27FC236}">
+                <a16:creationId xmlns:a16="http://schemas.microsoft.com/office/drawing/2014/main" id="{7DC5E721-C1B6-45C1-7ACB-BA368382A9E9}"/>
+              </a:ext>
+            </a:extLst>
+          </p:cNvPr>
+          <p:cNvSpPr>
+            <a:spLocks noGrp="1"/>
+          </p:cNvSpPr>
+          <p:nvPr>
+            <p:ph type="subTitle" idx="1"/>
+          </p:nvPr>
+        </p:nvSpPr>
+        <p:spPr>
+          <a:xfrm>
+            <a:off x="581191" y="3275621"/>
+            <a:ext cx="10993546" cy="2873509"/>
+          </a:xfrm>
+        </p:spPr>
+        <p:txBody>
+          <a:bodyPr>
+            <a:normAutofit/>
+          </a:bodyPr>
+          <a:lstStyle/>
+          <a:p>
+            <a:r>
+              <a:rPr lang="en-US" dirty="0">
+                <a:solidFill>
+                  <a:schemeClr val="bg1"/>
+                </a:solidFill>
+              </a:rPr>
+              <a:t>SUMMARY</a:t>
+            </a:r>
+          </a:p>
+          <a:p>
+            <a:endParaRPr lang="en-US" dirty="0">
+              <a:solidFill>
+                <a:schemeClr val="bg1"/>
+              </a:solidFill>
+            </a:endParaRPr>
+          </a:p>
+          <a:p>
+            <a:r>
+              <a:rPr lang="en-US" dirty="0">
+                <a:solidFill>
+                  <a:schemeClr val="bg1"/>
+                </a:solidFill>
+              </a:rPr>
+              <a:t>HYPOTHESIS ANSWER</a:t>
+            </a:r>
+          </a:p>
+          <a:p>
+            <a:endParaRPr lang="en-US" dirty="0">
+              <a:solidFill>
+                <a:schemeClr val="bg1"/>
+              </a:solidFill>
+            </a:endParaRPr>
+          </a:p>
+          <a:p>
+            <a:r>
+              <a:rPr lang="en-US" dirty="0">
+                <a:solidFill>
+                  <a:schemeClr val="bg1"/>
+                </a:solidFill>
+              </a:rPr>
+              <a:t>FURTHER DEVELOPMENT</a:t>
+            </a:r>
+          </a:p>
+        </p:txBody>
+      </p:sp>
+    </p:spTree>
+    <p:extLst>
+      <p:ext uri="{BB962C8B-B14F-4D97-AF65-F5344CB8AC3E}">
+        <p14:creationId xmlns:p14="http://schemas.microsoft.com/office/powerpoint/2010/main" val="1590490258"/>
+      </p:ext>
+    </p:extLst>
+  </p:cSld>
+  <p:clrMapOvr>
+    <a:masterClrMapping/>
+  </p:clrMapOvr>
+</p:sld>
+</file>
+
+<file path=ppt/slides/slide3.xml><?xml version="1.0" encoding="utf-8"?>
+<p:sld xmlns:a="http://schemas.openxmlformats.org/drawingml/2006/main" xmlns:r="http://schemas.openxmlformats.org/officeDocument/2006/relationships" xmlns:p="http://schemas.openxmlformats.org/presentationml/2006/main">
+  <p:cSld>
+    <p:spTree>
+      <p:nvGrpSpPr>
+        <p:cNvPr id="1" name=""/>
+        <p:cNvGrpSpPr/>
+        <p:nvPr/>
+      </p:nvGrpSpPr>
+      <p:grpSpPr>
+        <a:xfrm>
+          <a:off x="0" y="0"/>
+          <a:ext cx="0" cy="0"/>
+          <a:chOff x="0" y="0"/>
+          <a:chExt cx="0" cy="0"/>
+        </a:xfrm>
+      </p:grpSpPr>
+      <p:sp>
+        <p:nvSpPr>
+          <p:cNvPr id="2" name="Title 1">
+            <a:extLst>
+              <a:ext uri="{FF2B5EF4-FFF2-40B4-BE49-F238E27FC236}">
+                <a16:creationId xmlns:a16="http://schemas.microsoft.com/office/drawing/2014/main" id="{C7E0A70A-A506-742E-79FF-CCC404CE65C7}"/>
+              </a:ext>
+            </a:extLst>
+          </p:cNvPr>
+          <p:cNvSpPr>
+            <a:spLocks noGrp="1"/>
+          </p:cNvSpPr>
+          <p:nvPr>
+            <p:ph type="title"/>
+          </p:nvPr>
+        </p:nvSpPr>
+        <p:spPr/>
+        <p:txBody>
+          <a:bodyPr/>
+          <a:lstStyle/>
+          <a:p>
+            <a:r>
+              <a:rPr lang="en-US" dirty="0"/>
+              <a:t>External Research</a:t>
+            </a:r>
+            <a:endParaRPr lang="en-GB" dirty="0"/>
+          </a:p>
+        </p:txBody>
+      </p:sp>
+      <p:sp>
+        <p:nvSpPr>
+          <p:cNvPr id="3" name="Content Placeholder 2">
+            <a:extLst>
+              <a:ext uri="{FF2B5EF4-FFF2-40B4-BE49-F238E27FC236}">
+                <a16:creationId xmlns:a16="http://schemas.microsoft.com/office/drawing/2014/main" id="{DAE9E2D5-3E7C-12B5-F2B4-4D153305E279}"/>
+              </a:ext>
+            </a:extLst>
+          </p:cNvPr>
+          <p:cNvSpPr>
+            <a:spLocks noGrp="1"/>
+          </p:cNvSpPr>
+          <p:nvPr>
+            <p:ph idx="1"/>
+          </p:nvPr>
+        </p:nvSpPr>
+        <p:spPr/>
+        <p:txBody>
+          <a:bodyPr>
+            <a:normAutofit fontScale="62500" lnSpcReduction="20000"/>
+          </a:bodyPr>
+          <a:lstStyle/>
+          <a:p>
+            <a:r>
+              <a:rPr lang="en-US" dirty="0"/>
+              <a:t>Attendance vs Grades</a:t>
+            </a:r>
+          </a:p>
+          <a:p>
+            <a:pPr marL="0" indent="0">
+              <a:buNone/>
+            </a:pPr>
+            <a:endParaRPr lang="en-US" dirty="0"/>
+          </a:p>
+          <a:p>
+            <a:pPr marL="0" indent="0">
+              <a:buNone/>
+            </a:pPr>
+            <a:r>
+              <a:rPr lang="en-GB" dirty="0">
+                <a:hlinkClick r:id="rId2"/>
+              </a:rPr>
+              <a:t>Class Attendance in College (sagepub.com)</a:t>
+            </a:r>
+            <a:r>
+              <a:rPr lang="en-GB" dirty="0"/>
+              <a:t> </a:t>
+            </a:r>
+          </a:p>
+          <a:p>
+            <a:pPr marL="0" indent="0">
+              <a:buNone/>
+            </a:pPr>
+            <a:r>
+              <a:rPr lang="en-GB" b="0" i="0" dirty="0" err="1">
+                <a:solidFill>
+                  <a:srgbClr val="222222"/>
+                </a:solidFill>
+                <a:effectLst/>
+                <a:latin typeface="Arial" panose="020B0604020202020204" pitchFamily="34" charset="0"/>
+              </a:rPr>
+              <a:t>Credé</a:t>
+            </a:r>
+            <a:r>
+              <a:rPr lang="en-GB" b="0" i="0" dirty="0">
+                <a:solidFill>
+                  <a:srgbClr val="222222"/>
+                </a:solidFill>
+                <a:effectLst/>
+                <a:latin typeface="Arial" panose="020B0604020202020204" pitchFamily="34" charset="0"/>
+              </a:rPr>
+              <a:t>, M., </a:t>
+            </a:r>
+            <a:r>
+              <a:rPr lang="en-GB" b="0" i="0" dirty="0" err="1">
+                <a:solidFill>
+                  <a:srgbClr val="222222"/>
+                </a:solidFill>
+                <a:effectLst/>
+                <a:latin typeface="Arial" panose="020B0604020202020204" pitchFamily="34" charset="0"/>
+              </a:rPr>
+              <a:t>Roch</a:t>
+            </a:r>
+            <a:r>
+              <a:rPr lang="en-GB" b="0" i="0" dirty="0">
+                <a:solidFill>
+                  <a:srgbClr val="222222"/>
+                </a:solidFill>
+                <a:effectLst/>
+                <a:latin typeface="Arial" panose="020B0604020202020204" pitchFamily="34" charset="0"/>
+              </a:rPr>
+              <a:t>, S.G. and </a:t>
+            </a:r>
+            <a:r>
+              <a:rPr lang="en-GB" b="0" i="0" dirty="0" err="1">
+                <a:solidFill>
+                  <a:srgbClr val="222222"/>
+                </a:solidFill>
+                <a:effectLst/>
+                <a:latin typeface="Arial" panose="020B0604020202020204" pitchFamily="34" charset="0"/>
+              </a:rPr>
+              <a:t>Kieszczynka</a:t>
+            </a:r>
+            <a:r>
+              <a:rPr lang="en-GB" b="0" i="0" dirty="0">
+                <a:solidFill>
+                  <a:srgbClr val="222222"/>
+                </a:solidFill>
+                <a:effectLst/>
+                <a:latin typeface="Arial" panose="020B0604020202020204" pitchFamily="34" charset="0"/>
+              </a:rPr>
+              <a:t>, U.M., 2010. Class attendance in college: A meta-analytic review of the relationship of class attendance with grades and student characteristics. </a:t>
+            </a:r>
+            <a:r>
+              <a:rPr lang="en-GB" b="0" i="1" dirty="0">
+                <a:solidFill>
+                  <a:srgbClr val="222222"/>
+                </a:solidFill>
+                <a:effectLst/>
+                <a:latin typeface="Arial" panose="020B0604020202020204" pitchFamily="34" charset="0"/>
+              </a:rPr>
+              <a:t>Review of Educational Research</a:t>
+            </a:r>
+            <a:r>
+              <a:rPr lang="en-GB" b="0" i="0" dirty="0">
+                <a:solidFill>
+                  <a:srgbClr val="222222"/>
+                </a:solidFill>
+                <a:effectLst/>
+                <a:latin typeface="Arial" panose="020B0604020202020204" pitchFamily="34" charset="0"/>
+              </a:rPr>
+              <a:t>, </a:t>
+            </a:r>
+            <a:r>
+              <a:rPr lang="en-GB" b="0" i="1" dirty="0">
+                <a:solidFill>
+                  <a:srgbClr val="222222"/>
+                </a:solidFill>
+                <a:effectLst/>
+                <a:latin typeface="Arial" panose="020B0604020202020204" pitchFamily="34" charset="0"/>
+              </a:rPr>
+              <a:t>80</a:t>
+            </a:r>
+            <a:r>
+              <a:rPr lang="en-GB" b="0" i="0" dirty="0">
+                <a:solidFill>
+                  <a:srgbClr val="222222"/>
+                </a:solidFill>
+                <a:effectLst/>
+                <a:latin typeface="Arial" panose="020B0604020202020204" pitchFamily="34" charset="0"/>
+              </a:rPr>
+              <a:t>(2), pp.272-295.</a:t>
+            </a:r>
+          </a:p>
+          <a:p>
+            <a:pPr marL="0" indent="0">
+              <a:buNone/>
+            </a:pPr>
+            <a:endParaRPr lang="en-US" dirty="0"/>
+          </a:p>
+          <a:p>
+            <a:pPr marL="0" indent="0">
+              <a:buNone/>
+            </a:pPr>
+            <a:r>
+              <a:rPr lang="en-GB" dirty="0">
+                <a:hlinkClick r:id="rId3"/>
+              </a:rPr>
+              <a:t>A correlation between attendance and grades in a first-year psychology class. (apa.org)</a:t>
+            </a:r>
+            <a:endParaRPr lang="en-US" dirty="0"/>
+          </a:p>
+          <a:p>
+            <a:pPr marL="0" indent="0">
+              <a:buNone/>
+            </a:pPr>
+            <a:r>
+              <a:rPr lang="en-GB" b="0" i="0" dirty="0">
+                <a:solidFill>
+                  <a:srgbClr val="333333"/>
+                </a:solidFill>
+                <a:effectLst/>
+                <a:latin typeface="Arial" panose="020B0604020202020204" pitchFamily="34" charset="0"/>
+              </a:rPr>
+              <a:t>Gunn, K. P. (1993). A correlation between attendance and grades in a first-year psychology class. </a:t>
+            </a:r>
+            <a:r>
+              <a:rPr lang="en-GB" b="0" i="1" dirty="0">
+                <a:solidFill>
+                  <a:srgbClr val="333333"/>
+                </a:solidFill>
+                <a:effectLst/>
+                <a:latin typeface="Arial" panose="020B0604020202020204" pitchFamily="34" charset="0"/>
+              </a:rPr>
+              <a:t>Canadian Psychology / </a:t>
+            </a:r>
+            <a:r>
+              <a:rPr lang="en-GB" b="0" i="1" dirty="0" err="1">
+                <a:solidFill>
+                  <a:srgbClr val="333333"/>
+                </a:solidFill>
+                <a:effectLst/>
+                <a:latin typeface="Arial" panose="020B0604020202020204" pitchFamily="34" charset="0"/>
+              </a:rPr>
+              <a:t>Psychologie</a:t>
+            </a:r>
+            <a:r>
+              <a:rPr lang="en-GB" b="0" i="1" dirty="0">
+                <a:solidFill>
+                  <a:srgbClr val="333333"/>
+                </a:solidFill>
+                <a:effectLst/>
+                <a:latin typeface="Arial" panose="020B0604020202020204" pitchFamily="34" charset="0"/>
+              </a:rPr>
+              <a:t> </a:t>
+            </a:r>
+            <a:r>
+              <a:rPr lang="en-GB" b="0" i="1" dirty="0" err="1">
+                <a:solidFill>
+                  <a:srgbClr val="333333"/>
+                </a:solidFill>
+                <a:effectLst/>
+                <a:latin typeface="Arial" panose="020B0604020202020204" pitchFamily="34" charset="0"/>
+              </a:rPr>
+              <a:t>canadienne</a:t>
+            </a:r>
+            <a:r>
+              <a:rPr lang="en-GB" b="0" i="1" dirty="0">
+                <a:solidFill>
+                  <a:srgbClr val="333333"/>
+                </a:solidFill>
+                <a:effectLst/>
+                <a:latin typeface="Arial" panose="020B0604020202020204" pitchFamily="34" charset="0"/>
+              </a:rPr>
+              <a:t>, 34</a:t>
+            </a:r>
+            <a:r>
+              <a:rPr lang="en-GB" b="0" i="0" dirty="0">
+                <a:solidFill>
+                  <a:srgbClr val="333333"/>
+                </a:solidFill>
+                <a:effectLst/>
+                <a:latin typeface="Arial" panose="020B0604020202020204" pitchFamily="34" charset="0"/>
+              </a:rPr>
+              <a:t>(2), 201–202. </a:t>
+            </a:r>
+            <a:r>
+              <a:rPr lang="en-GB" b="0" i="0" u="none" strike="noStrike" dirty="0">
+                <a:solidFill>
+                  <a:srgbClr val="2C72B7"/>
+                </a:solidFill>
+                <a:effectLst/>
+                <a:latin typeface="Arial" panose="020B0604020202020204" pitchFamily="34" charset="0"/>
+                <a:hlinkClick r:id="rId4"/>
+              </a:rPr>
+              <a:t>https://doi.org/10.1037/h0078770</a:t>
+            </a:r>
+            <a:endParaRPr lang="en-GB" b="0" i="0" u="none" strike="noStrike" dirty="0">
+              <a:solidFill>
+                <a:srgbClr val="2C72B7"/>
+              </a:solidFill>
+              <a:effectLst/>
+              <a:latin typeface="Arial" panose="020B0604020202020204" pitchFamily="34" charset="0"/>
+            </a:endParaRPr>
+          </a:p>
+          <a:p>
+            <a:pPr marL="0" indent="0">
+              <a:buNone/>
+            </a:pPr>
+            <a:endParaRPr lang="en-US" dirty="0"/>
+          </a:p>
+          <a:p>
+            <a:pPr marL="0" indent="0">
+              <a:buNone/>
+            </a:pPr>
+            <a:r>
+              <a:rPr lang="en-GB" dirty="0">
+                <a:hlinkClick r:id="rId5"/>
+              </a:rPr>
+              <a:t>Attendance and performance – ProQuest</a:t>
+            </a:r>
+            <a:endParaRPr lang="en-GB" dirty="0"/>
+          </a:p>
+          <a:p>
+            <a:pPr marL="0" indent="0">
+              <a:buNone/>
+            </a:pPr>
+            <a:r>
+              <a:rPr lang="en-GB" b="0" i="0" dirty="0">
+                <a:solidFill>
+                  <a:srgbClr val="555555"/>
+                </a:solidFill>
+                <a:effectLst/>
+                <a:latin typeface="verdana" panose="020B0604030504040204" pitchFamily="34" charset="0"/>
+              </a:rPr>
+              <a:t>MOORE, R., 2003. Attendance and performance. </a:t>
+            </a:r>
+            <a:r>
+              <a:rPr lang="en-GB" b="0" i="1" dirty="0">
+                <a:solidFill>
+                  <a:srgbClr val="555555"/>
+                </a:solidFill>
+                <a:effectLst/>
+                <a:latin typeface="verdana" panose="020B0604030504040204" pitchFamily="34" charset="0"/>
+              </a:rPr>
+              <a:t>Journal of College Science Teaching, </a:t>
+            </a:r>
+            <a:r>
+              <a:rPr lang="en-GB" b="1" i="0" dirty="0">
+                <a:solidFill>
+                  <a:srgbClr val="555555"/>
+                </a:solidFill>
+                <a:effectLst/>
+                <a:latin typeface="verdana" panose="020B0604030504040204" pitchFamily="34" charset="0"/>
+              </a:rPr>
+              <a:t>32</a:t>
+            </a:r>
+            <a:r>
+              <a:rPr lang="en-GB" b="0" i="0" dirty="0">
+                <a:solidFill>
+                  <a:srgbClr val="555555"/>
+                </a:solidFill>
+                <a:effectLst/>
+                <a:latin typeface="verdana" panose="020B0604030504040204" pitchFamily="34" charset="0"/>
+              </a:rPr>
+              <a:t>(6), pp. </a:t>
+            </a:r>
+            <a:r>
+              <a:rPr lang="en-GB" b="0" i="0">
+                <a:solidFill>
+                  <a:srgbClr val="555555"/>
+                </a:solidFill>
+                <a:effectLst/>
+                <a:latin typeface="verdana" panose="020B0604030504040204" pitchFamily="34" charset="0"/>
+              </a:rPr>
+              <a:t>367-371.</a:t>
+            </a:r>
+            <a:endParaRPr lang="en-US" dirty="0"/>
+          </a:p>
+          <a:p>
+            <a:pPr marL="0" indent="0">
+              <a:buNone/>
+            </a:pPr>
+            <a:endParaRPr lang="en-US" dirty="0"/>
+          </a:p>
+          <a:p>
+            <a:r>
+              <a:rPr lang="en-US" dirty="0"/>
+              <a:t>Pedagogic positives of recording </a:t>
+            </a:r>
+            <a:r>
+              <a:rPr lang="en-US" dirty="0" err="1"/>
+              <a:t>matierall</a:t>
+            </a:r>
+            <a:endParaRPr lang="en-US" dirty="0"/>
+          </a:p>
+          <a:p>
+            <a:r>
+              <a:rPr lang="en-US" dirty="0"/>
+              <a:t>Multiple approaches available</a:t>
+            </a:r>
+          </a:p>
+          <a:p>
+            <a:endParaRPr lang="en-GB" dirty="0"/>
+          </a:p>
+        </p:txBody>
+      </p:sp>
+    </p:spTree>
+    <p:extLst>
+      <p:ext uri="{BB962C8B-B14F-4D97-AF65-F5344CB8AC3E}">
+        <p14:creationId xmlns:p14="http://schemas.microsoft.com/office/powerpoint/2010/main" val="215993404"/>
+      </p:ext>
+    </p:extLst>
+  </p:cSld>
+  <p:clrMapOvr>
+    <a:masterClrMapping/>
+  </p:clrMapOvr>
+</p:sld>
+</file>
+
+<file path=ppt/slides/slide30.xml><?xml version="1.0" encoding="utf-8"?>
+<p:sld xmlns:a="http://schemas.openxmlformats.org/drawingml/2006/main" xmlns:r="http://schemas.openxmlformats.org/officeDocument/2006/relationships" xmlns:p="http://schemas.openxmlformats.org/presentationml/2006/main">
+  <p:cSld>
+    <p:spTree>
+      <p:nvGrpSpPr>
+        <p:cNvPr id="1" name=""/>
+        <p:cNvGrpSpPr/>
+        <p:nvPr/>
+      </p:nvGrpSpPr>
+      <p:grpSpPr>
+        <a:xfrm>
+          <a:off x="0" y="0"/>
+          <a:ext cx="0" cy="0"/>
+          <a:chOff x="0" y="0"/>
+          <a:chExt cx="0" cy="0"/>
+        </a:xfrm>
+      </p:grpSpPr>
+      <p:sp>
+        <p:nvSpPr>
+          <p:cNvPr id="2" name="Title 1">
+            <a:extLst>
+              <a:ext uri="{FF2B5EF4-FFF2-40B4-BE49-F238E27FC236}">
                 <a16:creationId xmlns:a16="http://schemas.microsoft.com/office/drawing/2014/main" id="{893057A3-A04F-232F-0FAC-02C377A544EC}"/>
               </a:ext>
             </a:extLst>
@@ -13583,7 +16771,7 @@
 </p:sld>
 </file>
 
-<file path=ppt/slides/slide22.xml><?xml version="1.0" encoding="utf-8"?>
+<file path=ppt/slides/slide31.xml><?xml version="1.0" encoding="utf-8"?>
 <p:sld xmlns:a="http://schemas.openxmlformats.org/drawingml/2006/main" xmlns:r="http://schemas.openxmlformats.org/officeDocument/2006/relationships" xmlns:p="http://schemas.openxmlformats.org/presentationml/2006/main">
   <p:cSld>
     <p:bg>
@@ -14073,432 +17261,6 @@
 </p:sld>
 </file>
 
-<file path=ppt/slides/slide3.xml><?xml version="1.0" encoding="utf-8"?>
-<p:sld xmlns:a="http://schemas.openxmlformats.org/drawingml/2006/main" xmlns:r="http://schemas.openxmlformats.org/officeDocument/2006/relationships" xmlns:p="http://schemas.openxmlformats.org/presentationml/2006/main">
-  <p:cSld>
-    <p:spTree>
-      <p:nvGrpSpPr>
-        <p:cNvPr id="1" name=""/>
-        <p:cNvGrpSpPr/>
-        <p:nvPr/>
-      </p:nvGrpSpPr>
-      <p:grpSpPr>
-        <a:xfrm>
-          <a:off x="0" y="0"/>
-          <a:ext cx="0" cy="0"/>
-          <a:chOff x="0" y="0"/>
-          <a:chExt cx="0" cy="0"/>
-        </a:xfrm>
-      </p:grpSpPr>
-      <p:sp>
-        <p:nvSpPr>
-          <p:cNvPr id="2" name="Title 1">
-            <a:extLst>
-              <a:ext uri="{FF2B5EF4-FFF2-40B4-BE49-F238E27FC236}">
-                <a16:creationId xmlns:a16="http://schemas.microsoft.com/office/drawing/2014/main" id="{C7E0A70A-A506-742E-79FF-CCC404CE65C7}"/>
-              </a:ext>
-            </a:extLst>
-          </p:cNvPr>
-          <p:cNvSpPr>
-            <a:spLocks noGrp="1"/>
-          </p:cNvSpPr>
-          <p:nvPr>
-            <p:ph type="title"/>
-          </p:nvPr>
-        </p:nvSpPr>
-        <p:spPr/>
-        <p:txBody>
-          <a:bodyPr/>
-          <a:lstStyle/>
-          <a:p>
-            <a:r>
-              <a:rPr lang="en-US" dirty="0"/>
-              <a:t>External Research</a:t>
-            </a:r>
-            <a:endParaRPr lang="en-GB" dirty="0"/>
-          </a:p>
-        </p:txBody>
-      </p:sp>
-      <p:sp>
-        <p:nvSpPr>
-          <p:cNvPr id="3" name="Content Placeholder 2">
-            <a:extLst>
-              <a:ext uri="{FF2B5EF4-FFF2-40B4-BE49-F238E27FC236}">
-                <a16:creationId xmlns:a16="http://schemas.microsoft.com/office/drawing/2014/main" id="{DAE9E2D5-3E7C-12B5-F2B4-4D153305E279}"/>
-              </a:ext>
-            </a:extLst>
-          </p:cNvPr>
-          <p:cNvSpPr>
-            <a:spLocks noGrp="1"/>
-          </p:cNvSpPr>
-          <p:nvPr>
-            <p:ph idx="1"/>
-          </p:nvPr>
-        </p:nvSpPr>
-        <p:spPr/>
-        <p:txBody>
-          <a:bodyPr>
-            <a:normAutofit fontScale="62500" lnSpcReduction="20000"/>
-          </a:bodyPr>
-          <a:lstStyle/>
-          <a:p>
-            <a:r>
-              <a:rPr lang="en-US" dirty="0"/>
-              <a:t>Attendance vs Grades</a:t>
-            </a:r>
-          </a:p>
-          <a:p>
-            <a:pPr marL="0" indent="0">
-              <a:buNone/>
-            </a:pPr>
-            <a:endParaRPr lang="en-US" dirty="0"/>
-          </a:p>
-          <a:p>
-            <a:pPr marL="0" indent="0">
-              <a:buNone/>
-            </a:pPr>
-            <a:r>
-              <a:rPr lang="en-GB" dirty="0">
-                <a:hlinkClick r:id="rId2"/>
-              </a:rPr>
-              <a:t>Class Attendance in College (sagepub.com)</a:t>
-            </a:r>
-            <a:r>
-              <a:rPr lang="en-GB" dirty="0"/>
-              <a:t> </a:t>
-            </a:r>
-          </a:p>
-          <a:p>
-            <a:pPr marL="0" indent="0">
-              <a:buNone/>
-            </a:pPr>
-            <a:r>
-              <a:rPr lang="en-GB" b="0" i="0" dirty="0" err="1">
-                <a:solidFill>
-                  <a:srgbClr val="222222"/>
-                </a:solidFill>
-                <a:effectLst/>
-                <a:latin typeface="Arial" panose="020B0604020202020204" pitchFamily="34" charset="0"/>
-              </a:rPr>
-              <a:t>Credé</a:t>
-            </a:r>
-            <a:r>
-              <a:rPr lang="en-GB" b="0" i="0" dirty="0">
-                <a:solidFill>
-                  <a:srgbClr val="222222"/>
-                </a:solidFill>
-                <a:effectLst/>
-                <a:latin typeface="Arial" panose="020B0604020202020204" pitchFamily="34" charset="0"/>
-              </a:rPr>
-              <a:t>, M., </a:t>
-            </a:r>
-            <a:r>
-              <a:rPr lang="en-GB" b="0" i="0" dirty="0" err="1">
-                <a:solidFill>
-                  <a:srgbClr val="222222"/>
-                </a:solidFill>
-                <a:effectLst/>
-                <a:latin typeface="Arial" panose="020B0604020202020204" pitchFamily="34" charset="0"/>
-              </a:rPr>
-              <a:t>Roch</a:t>
-            </a:r>
-            <a:r>
-              <a:rPr lang="en-GB" b="0" i="0" dirty="0">
-                <a:solidFill>
-                  <a:srgbClr val="222222"/>
-                </a:solidFill>
-                <a:effectLst/>
-                <a:latin typeface="Arial" panose="020B0604020202020204" pitchFamily="34" charset="0"/>
-              </a:rPr>
-              <a:t>, S.G. and </a:t>
-            </a:r>
-            <a:r>
-              <a:rPr lang="en-GB" b="0" i="0" dirty="0" err="1">
-                <a:solidFill>
-                  <a:srgbClr val="222222"/>
-                </a:solidFill>
-                <a:effectLst/>
-                <a:latin typeface="Arial" panose="020B0604020202020204" pitchFamily="34" charset="0"/>
-              </a:rPr>
-              <a:t>Kieszczynka</a:t>
-            </a:r>
-            <a:r>
-              <a:rPr lang="en-GB" b="0" i="0" dirty="0">
-                <a:solidFill>
-                  <a:srgbClr val="222222"/>
-                </a:solidFill>
-                <a:effectLst/>
-                <a:latin typeface="Arial" panose="020B0604020202020204" pitchFamily="34" charset="0"/>
-              </a:rPr>
-              <a:t>, U.M., 2010. Class attendance in college: A meta-analytic review of the relationship of class attendance with grades and student characteristics. </a:t>
-            </a:r>
-            <a:r>
-              <a:rPr lang="en-GB" b="0" i="1" dirty="0">
-                <a:solidFill>
-                  <a:srgbClr val="222222"/>
-                </a:solidFill>
-                <a:effectLst/>
-                <a:latin typeface="Arial" panose="020B0604020202020204" pitchFamily="34" charset="0"/>
-              </a:rPr>
-              <a:t>Review of Educational Research</a:t>
-            </a:r>
-            <a:r>
-              <a:rPr lang="en-GB" b="0" i="0" dirty="0">
-                <a:solidFill>
-                  <a:srgbClr val="222222"/>
-                </a:solidFill>
-                <a:effectLst/>
-                <a:latin typeface="Arial" panose="020B0604020202020204" pitchFamily="34" charset="0"/>
-              </a:rPr>
-              <a:t>, </a:t>
-            </a:r>
-            <a:r>
-              <a:rPr lang="en-GB" b="0" i="1" dirty="0">
-                <a:solidFill>
-                  <a:srgbClr val="222222"/>
-                </a:solidFill>
-                <a:effectLst/>
-                <a:latin typeface="Arial" panose="020B0604020202020204" pitchFamily="34" charset="0"/>
-              </a:rPr>
-              <a:t>80</a:t>
-            </a:r>
-            <a:r>
-              <a:rPr lang="en-GB" b="0" i="0" dirty="0">
-                <a:solidFill>
-                  <a:srgbClr val="222222"/>
-                </a:solidFill>
-                <a:effectLst/>
-                <a:latin typeface="Arial" panose="020B0604020202020204" pitchFamily="34" charset="0"/>
-              </a:rPr>
-              <a:t>(2), pp.272-295.</a:t>
-            </a:r>
-          </a:p>
-          <a:p>
-            <a:pPr marL="0" indent="0">
-              <a:buNone/>
-            </a:pPr>
-            <a:endParaRPr lang="en-US" dirty="0"/>
-          </a:p>
-          <a:p>
-            <a:pPr marL="0" indent="0">
-              <a:buNone/>
-            </a:pPr>
-            <a:r>
-              <a:rPr lang="en-GB" dirty="0">
-                <a:hlinkClick r:id="rId3"/>
-              </a:rPr>
-              <a:t>A correlation between attendance and grades in a first-year psychology class. (apa.org)</a:t>
-            </a:r>
-            <a:endParaRPr lang="en-US" dirty="0"/>
-          </a:p>
-          <a:p>
-            <a:pPr marL="0" indent="0">
-              <a:buNone/>
-            </a:pPr>
-            <a:r>
-              <a:rPr lang="en-GB" b="0" i="0" dirty="0">
-                <a:solidFill>
-                  <a:srgbClr val="333333"/>
-                </a:solidFill>
-                <a:effectLst/>
-                <a:latin typeface="Arial" panose="020B0604020202020204" pitchFamily="34" charset="0"/>
-              </a:rPr>
-              <a:t>Gunn, K. P. (1993). A correlation between attendance and grades in a first-year psychology class. </a:t>
-            </a:r>
-            <a:r>
-              <a:rPr lang="en-GB" b="0" i="1" dirty="0">
-                <a:solidFill>
-                  <a:srgbClr val="333333"/>
-                </a:solidFill>
-                <a:effectLst/>
-                <a:latin typeface="Arial" panose="020B0604020202020204" pitchFamily="34" charset="0"/>
-              </a:rPr>
-              <a:t>Canadian Psychology / </a:t>
-            </a:r>
-            <a:r>
-              <a:rPr lang="en-GB" b="0" i="1" dirty="0" err="1">
-                <a:solidFill>
-                  <a:srgbClr val="333333"/>
-                </a:solidFill>
-                <a:effectLst/>
-                <a:latin typeface="Arial" panose="020B0604020202020204" pitchFamily="34" charset="0"/>
-              </a:rPr>
-              <a:t>Psychologie</a:t>
-            </a:r>
-            <a:r>
-              <a:rPr lang="en-GB" b="0" i="1" dirty="0">
-                <a:solidFill>
-                  <a:srgbClr val="333333"/>
-                </a:solidFill>
-                <a:effectLst/>
-                <a:latin typeface="Arial" panose="020B0604020202020204" pitchFamily="34" charset="0"/>
-              </a:rPr>
-              <a:t> </a:t>
-            </a:r>
-            <a:r>
-              <a:rPr lang="en-GB" b="0" i="1" dirty="0" err="1">
-                <a:solidFill>
-                  <a:srgbClr val="333333"/>
-                </a:solidFill>
-                <a:effectLst/>
-                <a:latin typeface="Arial" panose="020B0604020202020204" pitchFamily="34" charset="0"/>
-              </a:rPr>
-              <a:t>canadienne</a:t>
-            </a:r>
-            <a:r>
-              <a:rPr lang="en-GB" b="0" i="1" dirty="0">
-                <a:solidFill>
-                  <a:srgbClr val="333333"/>
-                </a:solidFill>
-                <a:effectLst/>
-                <a:latin typeface="Arial" panose="020B0604020202020204" pitchFamily="34" charset="0"/>
-              </a:rPr>
-              <a:t>, 34</a:t>
-            </a:r>
-            <a:r>
-              <a:rPr lang="en-GB" b="0" i="0" dirty="0">
-                <a:solidFill>
-                  <a:srgbClr val="333333"/>
-                </a:solidFill>
-                <a:effectLst/>
-                <a:latin typeface="Arial" panose="020B0604020202020204" pitchFamily="34" charset="0"/>
-              </a:rPr>
-              <a:t>(2), 201–202. </a:t>
-            </a:r>
-            <a:r>
-              <a:rPr lang="en-GB" b="0" i="0" u="none" strike="noStrike" dirty="0">
-                <a:solidFill>
-                  <a:srgbClr val="2C72B7"/>
-                </a:solidFill>
-                <a:effectLst/>
-                <a:latin typeface="Arial" panose="020B0604020202020204" pitchFamily="34" charset="0"/>
-                <a:hlinkClick r:id="rId4"/>
-              </a:rPr>
-              <a:t>https://doi.org/10.1037/h0078770</a:t>
-            </a:r>
-            <a:endParaRPr lang="en-GB" b="0" i="0" u="none" strike="noStrike" dirty="0">
-              <a:solidFill>
-                <a:srgbClr val="2C72B7"/>
-              </a:solidFill>
-              <a:effectLst/>
-              <a:latin typeface="Arial" panose="020B0604020202020204" pitchFamily="34" charset="0"/>
-            </a:endParaRPr>
-          </a:p>
-          <a:p>
-            <a:pPr marL="0" indent="0">
-              <a:buNone/>
-            </a:pPr>
-            <a:endParaRPr lang="en-US" dirty="0"/>
-          </a:p>
-          <a:p>
-            <a:pPr marL="0" indent="0">
-              <a:buNone/>
-            </a:pPr>
-            <a:r>
-              <a:rPr lang="en-GB" dirty="0">
-                <a:hlinkClick r:id="rId5"/>
-              </a:rPr>
-              <a:t>Attendance and performance – ProQuest</a:t>
-            </a:r>
-            <a:endParaRPr lang="en-GB" dirty="0"/>
-          </a:p>
-          <a:p>
-            <a:pPr marL="0" indent="0">
-              <a:buNone/>
-            </a:pPr>
-            <a:r>
-              <a:rPr lang="en-GB" b="0" i="0" dirty="0">
-                <a:solidFill>
-                  <a:srgbClr val="555555"/>
-                </a:solidFill>
-                <a:effectLst/>
-                <a:latin typeface="verdana" panose="020B0604030504040204" pitchFamily="34" charset="0"/>
-              </a:rPr>
-              <a:t>MOORE, R., 2003. Attendance and performance. </a:t>
-            </a:r>
-            <a:r>
-              <a:rPr lang="en-GB" b="0" i="1" dirty="0">
-                <a:solidFill>
-                  <a:srgbClr val="555555"/>
-                </a:solidFill>
-                <a:effectLst/>
-                <a:latin typeface="verdana" panose="020B0604030504040204" pitchFamily="34" charset="0"/>
-              </a:rPr>
-              <a:t>Journal of College Science Teaching, </a:t>
-            </a:r>
-            <a:r>
-              <a:rPr lang="en-GB" b="1" i="0" dirty="0">
-                <a:solidFill>
-                  <a:srgbClr val="555555"/>
-                </a:solidFill>
-                <a:effectLst/>
-                <a:latin typeface="verdana" panose="020B0604030504040204" pitchFamily="34" charset="0"/>
-              </a:rPr>
-              <a:t>32</a:t>
-            </a:r>
-            <a:r>
-              <a:rPr lang="en-GB" b="0" i="0" dirty="0">
-                <a:solidFill>
-                  <a:srgbClr val="555555"/>
-                </a:solidFill>
-                <a:effectLst/>
-                <a:latin typeface="verdana" panose="020B0604030504040204" pitchFamily="34" charset="0"/>
-              </a:rPr>
-              <a:t>(6), pp. </a:t>
-            </a:r>
-            <a:r>
-              <a:rPr lang="en-GB" b="0" i="0">
-                <a:solidFill>
-                  <a:srgbClr val="555555"/>
-                </a:solidFill>
-                <a:effectLst/>
-                <a:latin typeface="verdana" panose="020B0604030504040204" pitchFamily="34" charset="0"/>
-              </a:rPr>
-              <a:t>367-371.</a:t>
-            </a:r>
-            <a:endParaRPr lang="en-US" dirty="0"/>
-          </a:p>
-          <a:p>
-            <a:pPr marL="0" indent="0">
-              <a:buNone/>
-            </a:pPr>
-            <a:endParaRPr lang="en-US" dirty="0"/>
-          </a:p>
-          <a:p>
-            <a:r>
-              <a:rPr lang="en-US" dirty="0"/>
-              <a:t>Pedagogic positives of recording </a:t>
-            </a:r>
-            <a:r>
-              <a:rPr lang="en-US" dirty="0" err="1"/>
-              <a:t>matierall</a:t>
-            </a:r>
-            <a:endParaRPr lang="en-US" dirty="0"/>
-          </a:p>
-          <a:p>
-            <a:r>
-              <a:rPr lang="en-US" dirty="0"/>
-              <a:t>Multiple approaches available</a:t>
-            </a:r>
-          </a:p>
-          <a:p>
-            <a:endParaRPr lang="en-GB" dirty="0"/>
-          </a:p>
-        </p:txBody>
-      </p:sp>
-    </p:spTree>
-    <p:extLst>
-      <p:ext uri="{BB962C8B-B14F-4D97-AF65-F5344CB8AC3E}">
-        <p14:creationId xmlns:p14="http://schemas.microsoft.com/office/powerpoint/2010/main" val="215993404"/>
-      </p:ext>
-    </p:extLst>
-  </p:cSld>
-  <p:clrMapOvr>
-    <a:masterClrMapping/>
-  </p:clrMapOvr>
-</p:sld>
-</file>
-
 <file path=ppt/slides/slide4.xml><?xml version="1.0" encoding="utf-8"?>
 <p:sld xmlns:a="http://schemas.openxmlformats.org/drawingml/2006/main" xmlns:r="http://schemas.openxmlformats.org/officeDocument/2006/relationships" xmlns:p="http://schemas.openxmlformats.org/presentationml/2006/main">
   <p:cSld>
@@ -15191,6 +17953,11 @@
           </p:cNvGraphicFramePr>
           <p:nvPr>
             <p:ph idx="1"/>
+            <p:extLst>
+              <p:ext uri="{D42A27DB-BD31-4B8C-83A1-F6EECF244321}">
+                <p14:modId xmlns:p14="http://schemas.microsoft.com/office/powerpoint/2010/main" val="3045117078"/>
+              </p:ext>
+            </p:extLst>
           </p:nvPr>
         </p:nvGraphicFramePr>
         <p:xfrm>

</xml_diff>